<commit_message>
apre metodologia e team
</commit_message>
<xml_diff>
--- a/Apresentação/inSensor.pptx
+++ b/Apresentação/inSensor.pptx
@@ -9,6 +9,7 @@
     <p:sldId id="256" r:id="rId3"/>
     <p:sldId id="258" r:id="rId4"/>
     <p:sldId id="260" r:id="rId5"/>
+    <p:sldId id="261" r:id="rId6"/>
   </p:sldIdLst>
   <p:sldSz cx="12192000" cy="6858000"/>
   <p:notesSz cx="6858000" cy="9144000"/>
@@ -3973,6 +3974,18 @@
   <p:clrMapOvr>
     <a:masterClrMapping/>
   </p:clrMapOvr>
+  <mc:AlternateContent xmlns:mc="http://schemas.openxmlformats.org/markup-compatibility/2006">
+    <mc:Choice xmlns:p14="http://schemas.microsoft.com/office/powerpoint/2010/main" Requires="p14">
+      <p:transition spd="med" p14:dur="700">
+        <p:fade/>
+      </p:transition>
+    </mc:Choice>
+    <mc:Fallback>
+      <p:transition spd="med">
+        <p:fade/>
+      </p:transition>
+    </mc:Fallback>
+  </mc:AlternateContent>
   <p:timing>
     <p:tnLst>
       <p:par>
@@ -4332,13 +4345,13 @@
   <p:clrMapOvr>
     <a:masterClrMapping/>
   </p:clrMapOvr>
-  <mc:AlternateContent xmlns:mc="http://schemas.openxmlformats.org/markup-compatibility/2006">
-    <mc:Choice xmlns:p14="http://schemas.microsoft.com/office/powerpoint/2010/main" Requires="p14">
+  <mc:AlternateContent xmlns:mc="http://schemas.openxmlformats.org/markup-compatibility/2006" xmlns:p14="http://schemas.microsoft.com/office/powerpoint/2010/main">
+    <mc:Choice Requires="p14">
       <p:transition spd="med" p14:dur="700">
         <p:fade/>
       </p:transition>
     </mc:Choice>
-    <mc:Fallback>
+    <mc:Fallback xmlns="">
       <p:transition spd="med">
         <p:fade/>
       </p:transition>
@@ -4578,454 +4591,754 @@
           </a:fontRef>
         </p:style>
       </p:cxnSp>
-      <p:sp>
-        <p:nvSpPr>
-          <p:cNvPr id="10" name="Elipse 9"/>
-          <p:cNvSpPr/>
+      <p:grpSp>
+        <p:nvGrpSpPr>
+          <p:cNvPr id="2" name="Agrupar 1"/>
+          <p:cNvGrpSpPr/>
           <p:nvPr/>
-        </p:nvSpPr>
-        <p:spPr>
+        </p:nvGrpSpPr>
+        <p:grpSpPr>
           <a:xfrm>
-            <a:off x="746874" y="2312259"/>
+            <a:off x="734174" y="2338243"/>
             <a:ext cx="2178122" cy="2178122"/>
+            <a:chOff x="734174" y="2338243"/>
+            <a:chExt cx="2178122" cy="2178122"/>
           </a:xfrm>
-          <a:prstGeom prst="ellipse">
-            <a:avLst/>
-          </a:prstGeom>
-          <a:solidFill>
-            <a:schemeClr val="bg1"/>
-          </a:solidFill>
-          <a:ln>
-            <a:noFill/>
-          </a:ln>
-          <a:effectLst>
-            <a:outerShdw blurRad="50800" dist="38100" dir="2700000" algn="tl" rotWithShape="0">
-              <a:prstClr val="black">
-                <a:alpha val="40000"/>
-              </a:prstClr>
-            </a:outerShdw>
-          </a:effectLst>
-        </p:spPr>
-        <p:style>
-          <a:lnRef idx="2">
-            <a:schemeClr val="accent1">
-              <a:shade val="50000"/>
-            </a:schemeClr>
-          </a:lnRef>
-          <a:fillRef idx="1">
-            <a:schemeClr val="accent1"/>
-          </a:fillRef>
-          <a:effectRef idx="0">
-            <a:schemeClr val="accent1"/>
-          </a:effectRef>
-          <a:fontRef idx="minor">
-            <a:schemeClr val="lt1"/>
-          </a:fontRef>
-        </p:style>
-        <p:txBody>
-          <a:bodyPr rtlCol="0" anchor="ctr"/>
-          <a:lstStyle/>
-          <a:p>
-            <a:pPr algn="ctr"/>
-            <a:endParaRPr lang="pt-BR"/>
-          </a:p>
-        </p:txBody>
-      </p:sp>
-      <p:sp>
-        <p:nvSpPr>
-          <p:cNvPr id="15" name="Elipse 14"/>
-          <p:cNvSpPr/>
+        </p:grpSpPr>
+        <p:sp>
+          <p:nvSpPr>
+            <p:cNvPr id="17" name="Elipse 16"/>
+            <p:cNvSpPr/>
+            <p:nvPr/>
+          </p:nvSpPr>
+          <p:spPr>
+            <a:xfrm>
+              <a:off x="734174" y="2338243"/>
+              <a:ext cx="2178122" cy="2178122"/>
+            </a:xfrm>
+            <a:prstGeom prst="ellipse">
+              <a:avLst/>
+            </a:prstGeom>
+            <a:solidFill>
+              <a:schemeClr val="bg1"/>
+            </a:solidFill>
+            <a:ln>
+              <a:noFill/>
+            </a:ln>
+            <a:effectLst>
+              <a:outerShdw blurRad="50800" dist="38100" dir="2700000" algn="tl" rotWithShape="0">
+                <a:prstClr val="black">
+                  <a:alpha val="40000"/>
+                </a:prstClr>
+              </a:outerShdw>
+            </a:effectLst>
+          </p:spPr>
+          <p:style>
+            <a:lnRef idx="2">
+              <a:schemeClr val="accent1">
+                <a:shade val="50000"/>
+              </a:schemeClr>
+            </a:lnRef>
+            <a:fillRef idx="1">
+              <a:schemeClr val="accent1"/>
+            </a:fillRef>
+            <a:effectRef idx="0">
+              <a:schemeClr val="accent1"/>
+            </a:effectRef>
+            <a:fontRef idx="minor">
+              <a:schemeClr val="lt1"/>
+            </a:fontRef>
+          </p:style>
+          <p:txBody>
+            <a:bodyPr rtlCol="0" anchor="ctr"/>
+            <a:lstStyle/>
+            <a:p>
+              <a:pPr algn="ctr"/>
+              <a:endParaRPr lang="pt-BR"/>
+            </a:p>
+          </p:txBody>
+        </p:sp>
+        <p:pic>
+          <p:nvPicPr>
+            <p:cNvPr id="23" name="Imagem 22"/>
+            <p:cNvPicPr>
+              <a:picLocks noChangeAspect="1"/>
+            </p:cNvPicPr>
+            <p:nvPr/>
+          </p:nvPicPr>
+          <p:blipFill>
+            <a:blip r:embed="rId4" cstate="print">
+              <a:extLst>
+                <a:ext uri="{28A0092B-C50C-407E-A947-70E740481C1C}">
+                  <a14:useLocalDpi xmlns:a14="http://schemas.microsoft.com/office/drawing/2010/main" val="0"/>
+                </a:ext>
+              </a:extLst>
+            </a:blip>
+            <a:stretch>
+              <a:fillRect/>
+            </a:stretch>
+          </p:blipFill>
+          <p:spPr>
+            <a:xfrm>
+              <a:off x="1022293" y="2444571"/>
+              <a:ext cx="1601884" cy="1601884"/>
+            </a:xfrm>
+            <a:prstGeom prst="rect">
+              <a:avLst/>
+            </a:prstGeom>
+          </p:spPr>
+        </p:pic>
+      </p:grpSp>
+      <p:grpSp>
+        <p:nvGrpSpPr>
+          <p:cNvPr id="3" name="Agrupar 2"/>
+          <p:cNvGrpSpPr/>
           <p:nvPr/>
-        </p:nvSpPr>
-        <p:spPr>
+        </p:nvGrpSpPr>
+        <p:grpSpPr>
           <a:xfrm>
             <a:off x="3576620" y="2312259"/>
             <a:ext cx="2178122" cy="2178122"/>
+            <a:chOff x="3576620" y="2312259"/>
+            <a:chExt cx="2178122" cy="2178122"/>
           </a:xfrm>
-          <a:prstGeom prst="ellipse">
-            <a:avLst/>
-          </a:prstGeom>
-          <a:solidFill>
-            <a:schemeClr val="bg1"/>
-          </a:solidFill>
-          <a:ln>
-            <a:noFill/>
-          </a:ln>
-          <a:effectLst>
-            <a:outerShdw blurRad="50800" dist="38100" dir="2700000" algn="tl" rotWithShape="0">
-              <a:prstClr val="black">
-                <a:alpha val="40000"/>
-              </a:prstClr>
-            </a:outerShdw>
-          </a:effectLst>
-        </p:spPr>
-        <p:style>
-          <a:lnRef idx="2">
-            <a:schemeClr val="accent1">
-              <a:shade val="50000"/>
-            </a:schemeClr>
-          </a:lnRef>
-          <a:fillRef idx="1">
-            <a:schemeClr val="accent1"/>
-          </a:fillRef>
-          <a:effectRef idx="0">
-            <a:schemeClr val="accent1"/>
-          </a:effectRef>
-          <a:fontRef idx="minor">
-            <a:schemeClr val="lt1"/>
-          </a:fontRef>
-        </p:style>
-        <p:txBody>
-          <a:bodyPr rtlCol="0" anchor="ctr"/>
-          <a:lstStyle/>
-          <a:p>
-            <a:pPr algn="ctr"/>
-            <a:endParaRPr lang="pt-BR"/>
-          </a:p>
-        </p:txBody>
-      </p:sp>
-      <p:sp>
-        <p:nvSpPr>
-          <p:cNvPr id="16" name="Elipse 15"/>
+        </p:grpSpPr>
+        <p:sp>
+          <p:nvSpPr>
+            <p:cNvPr id="15" name="Elipse 14"/>
+            <p:cNvSpPr/>
+            <p:nvPr/>
+          </p:nvSpPr>
+          <p:spPr>
+            <a:xfrm>
+              <a:off x="3576620" y="2312259"/>
+              <a:ext cx="2178122" cy="2178122"/>
+            </a:xfrm>
+            <a:prstGeom prst="ellipse">
+              <a:avLst/>
+            </a:prstGeom>
+            <a:solidFill>
+              <a:schemeClr val="bg1"/>
+            </a:solidFill>
+            <a:ln>
+              <a:noFill/>
+            </a:ln>
+            <a:effectLst>
+              <a:outerShdw blurRad="50800" dist="38100" dir="2700000" algn="tl" rotWithShape="0">
+                <a:prstClr val="black">
+                  <a:alpha val="40000"/>
+                </a:prstClr>
+              </a:outerShdw>
+            </a:effectLst>
+          </p:spPr>
+          <p:style>
+            <a:lnRef idx="2">
+              <a:schemeClr val="accent1">
+                <a:shade val="50000"/>
+              </a:schemeClr>
+            </a:lnRef>
+            <a:fillRef idx="1">
+              <a:schemeClr val="accent1"/>
+            </a:fillRef>
+            <a:effectRef idx="0">
+              <a:schemeClr val="accent1"/>
+            </a:effectRef>
+            <a:fontRef idx="minor">
+              <a:schemeClr val="lt1"/>
+            </a:fontRef>
+          </p:style>
+          <p:txBody>
+            <a:bodyPr rtlCol="0" anchor="ctr"/>
+            <a:lstStyle/>
+            <a:p>
+              <a:pPr algn="ctr"/>
+              <a:endParaRPr lang="pt-BR"/>
+            </a:p>
+          </p:txBody>
+        </p:sp>
+        <p:pic>
+          <p:nvPicPr>
+            <p:cNvPr id="26" name="Imagem 25"/>
+            <p:cNvPicPr>
+              <a:picLocks noChangeAspect="1"/>
+            </p:cNvPicPr>
+            <p:nvPr/>
+          </p:nvPicPr>
+          <p:blipFill>
+            <a:blip r:embed="rId5" cstate="print">
+              <a:extLst>
+                <a:ext uri="{28A0092B-C50C-407E-A947-70E740481C1C}">
+                  <a14:useLocalDpi xmlns:a14="http://schemas.microsoft.com/office/drawing/2010/main" val="0"/>
+                </a:ext>
+              </a:extLst>
+            </a:blip>
+            <a:stretch>
+              <a:fillRect/>
+            </a:stretch>
+          </p:blipFill>
+          <p:spPr>
+            <a:xfrm>
+              <a:off x="3857458" y="2438645"/>
+              <a:ext cx="1607810" cy="1607810"/>
+            </a:xfrm>
+            <a:prstGeom prst="rect">
+              <a:avLst/>
+            </a:prstGeom>
+          </p:spPr>
+        </p:pic>
+      </p:grpSp>
+      <p:sp>
+        <p:nvSpPr>
+          <p:cNvPr id="19" name="Retângulo 18"/>
           <p:cNvSpPr/>
           <p:nvPr/>
         </p:nvSpPr>
         <p:spPr>
           <a:xfrm>
-            <a:off x="9261512" y="2312259"/>
-            <a:ext cx="2178122" cy="2178122"/>
-          </a:xfrm>
-          <a:prstGeom prst="ellipse">
-            <a:avLst/>
-          </a:prstGeom>
-          <a:solidFill>
-            <a:schemeClr val="bg1"/>
-          </a:solidFill>
-          <a:ln>
-            <a:noFill/>
-          </a:ln>
-          <a:effectLst>
-            <a:outerShdw blurRad="50800" dist="38100" dir="2700000" algn="tl" rotWithShape="0">
-              <a:prstClr val="black">
-                <a:alpha val="40000"/>
-              </a:prstClr>
-            </a:outerShdw>
-          </a:effectLst>
-        </p:spPr>
-        <p:style>
-          <a:lnRef idx="2">
-            <a:schemeClr val="accent1">
-              <a:shade val="50000"/>
-            </a:schemeClr>
-          </a:lnRef>
-          <a:fillRef idx="1">
-            <a:schemeClr val="accent1"/>
-          </a:fillRef>
-          <a:effectRef idx="0">
-            <a:schemeClr val="accent1"/>
-          </a:effectRef>
-          <a:fontRef idx="minor">
-            <a:schemeClr val="lt1"/>
-          </a:fontRef>
-        </p:style>
-        <p:txBody>
-          <a:bodyPr rtlCol="0" anchor="ctr"/>
-          <a:lstStyle/>
-          <a:p>
-            <a:pPr algn="ctr"/>
-            <a:endParaRPr lang="pt-BR"/>
-          </a:p>
-        </p:txBody>
-      </p:sp>
-      <p:sp>
-        <p:nvSpPr>
-          <p:cNvPr id="17" name="Elipse 16"/>
-          <p:cNvSpPr/>
-          <p:nvPr/>
-        </p:nvSpPr>
-        <p:spPr>
-          <a:xfrm>
-            <a:off x="6431766" y="2312259"/>
-            <a:ext cx="2178122" cy="2178122"/>
-          </a:xfrm>
-          <a:prstGeom prst="ellipse">
-            <a:avLst/>
-          </a:prstGeom>
-          <a:solidFill>
-            <a:schemeClr val="bg1"/>
-          </a:solidFill>
-          <a:ln>
-            <a:noFill/>
-          </a:ln>
-          <a:effectLst>
-            <a:outerShdw blurRad="50800" dist="38100" dir="2700000" algn="tl" rotWithShape="0">
-              <a:prstClr val="black">
-                <a:alpha val="40000"/>
-              </a:prstClr>
-            </a:outerShdw>
-          </a:effectLst>
-        </p:spPr>
-        <p:style>
-          <a:lnRef idx="2">
-            <a:schemeClr val="accent1">
-              <a:shade val="50000"/>
-            </a:schemeClr>
-          </a:lnRef>
-          <a:fillRef idx="1">
-            <a:schemeClr val="accent1"/>
-          </a:fillRef>
-          <a:effectRef idx="0">
-            <a:schemeClr val="accent1"/>
-          </a:effectRef>
-          <a:fontRef idx="minor">
-            <a:schemeClr val="lt1"/>
-          </a:fontRef>
-        </p:style>
-        <p:txBody>
-          <a:bodyPr rtlCol="0" anchor="ctr"/>
-          <a:lstStyle/>
-          <a:p>
-            <a:pPr algn="ctr"/>
-            <a:endParaRPr lang="pt-BR"/>
-          </a:p>
-        </p:txBody>
-      </p:sp>
-      <p:pic>
-        <p:nvPicPr>
-          <p:cNvPr id="22" name="Imagem 21"/>
-          <p:cNvPicPr>
-            <a:picLocks noChangeAspect="1"/>
-          </p:cNvPicPr>
-          <p:nvPr/>
-        </p:nvPicPr>
-        <p:blipFill>
-          <a:blip r:embed="rId4" cstate="print">
-            <a:extLst>
-              <a:ext uri="{28A0092B-C50C-407E-A947-70E740481C1C}">
-                <a14:useLocalDpi xmlns:a14="http://schemas.microsoft.com/office/drawing/2010/main" val="0"/>
-              </a:ext>
-            </a:extLst>
-          </a:blip>
-          <a:stretch>
-            <a:fillRect/>
-          </a:stretch>
-        </p:blipFill>
-        <p:spPr>
-          <a:xfrm>
-            <a:off x="1029735" y="2444571"/>
-            <a:ext cx="1601884" cy="1601884"/>
-          </a:xfrm>
-          <a:prstGeom prst="rect">
-            <a:avLst/>
-          </a:prstGeom>
-        </p:spPr>
-      </p:pic>
-      <p:pic>
-        <p:nvPicPr>
-          <p:cNvPr id="23" name="Imagem 22"/>
-          <p:cNvPicPr>
-            <a:picLocks noChangeAspect="1"/>
-          </p:cNvPicPr>
-          <p:nvPr/>
-        </p:nvPicPr>
-        <p:blipFill>
-          <a:blip r:embed="rId5" cstate="print">
-            <a:extLst>
-              <a:ext uri="{28A0092B-C50C-407E-A947-70E740481C1C}">
-                <a14:useLocalDpi xmlns:a14="http://schemas.microsoft.com/office/drawing/2010/main" val="0"/>
-              </a:ext>
-            </a:extLst>
-          </a:blip>
-          <a:stretch>
-            <a:fillRect/>
-          </a:stretch>
-        </p:blipFill>
-        <p:spPr>
-          <a:xfrm>
-            <a:off x="6719885" y="2444571"/>
-            <a:ext cx="1601884" cy="1601884"/>
-          </a:xfrm>
-          <a:prstGeom prst="rect">
-            <a:avLst/>
-          </a:prstGeom>
-        </p:spPr>
-      </p:pic>
-      <p:pic>
-        <p:nvPicPr>
-          <p:cNvPr id="25" name="Imagem 24"/>
-          <p:cNvPicPr>
-            <a:picLocks noChangeAspect="1"/>
-          </p:cNvPicPr>
-          <p:nvPr/>
-        </p:nvPicPr>
-        <p:blipFill>
-          <a:blip r:embed="rId6" cstate="print">
-            <a:extLst>
-              <a:ext uri="{28A0092B-C50C-407E-A947-70E740481C1C}">
-                <a14:useLocalDpi xmlns:a14="http://schemas.microsoft.com/office/drawing/2010/main" val="0"/>
-              </a:ext>
-            </a:extLst>
-          </a:blip>
-          <a:stretch>
-            <a:fillRect/>
-          </a:stretch>
-        </p:blipFill>
-        <p:spPr>
-          <a:xfrm>
-            <a:off x="9549631" y="2444571"/>
-            <a:ext cx="1601884" cy="1601884"/>
-          </a:xfrm>
-          <a:prstGeom prst="rect">
-            <a:avLst/>
-          </a:prstGeom>
-        </p:spPr>
-      </p:pic>
-      <p:pic>
-        <p:nvPicPr>
-          <p:cNvPr id="2056" name="Picture 8" descr="https://3dsupply.de/en/composition/noob-cap-cap-cap-front~eJwdijkKgDAQRa8SppYwk_xsXkUsBC0CggHTiXc3Y_mWh1qn2QhySbGIE8uToToU7Uff6kkD-78ElwEW7_6lXbdKnbUughgSPEdYXrUPGQW6ag8Z6f0Ad2cYzg==.png"/>
-          <p:cNvPicPr>
-            <a:picLocks noChangeAspect="1" noChangeArrowheads="1"/>
-          </p:cNvPicPr>
-          <p:nvPr/>
-        </p:nvPicPr>
-        <p:blipFill>
-          <a:blip r:embed="rId7" cstate="print">
-            <a:extLst>
-              <a:ext uri="{BEBA8EAE-BF5A-486C-A8C5-ECC9F3942E4B}">
-                <a14:imgProps xmlns:a14="http://schemas.microsoft.com/office/drawing/2010/main">
-                  <a14:imgLayer r:embed="rId8">
-                    <a14:imgEffect>
-                      <a14:saturation sat="0"/>
-                    </a14:imgEffect>
-                    <a14:imgEffect>
-                      <a14:brightnessContrast bright="-20000" contrast="40000"/>
-                    </a14:imgEffect>
-                  </a14:imgLayer>
-                </a14:imgProps>
-              </a:ext>
-              <a:ext uri="{28A0092B-C50C-407E-A947-70E740481C1C}">
-                <a14:useLocalDpi xmlns:a14="http://schemas.microsoft.com/office/drawing/2010/main" val="0"/>
-              </a:ext>
-            </a:extLst>
-          </a:blip>
-          <a:srcRect/>
-          <a:stretch>
-            <a:fillRect/>
-          </a:stretch>
-        </p:blipFill>
-        <p:spPr bwMode="auto">
-          <a:xfrm>
-            <a:off x="9874817" y="2350360"/>
-            <a:ext cx="945583" cy="640312"/>
+            <a:off x="6542635" y="4654574"/>
+            <a:ext cx="1927568" cy="461665"/>
           </a:xfrm>
           <a:prstGeom prst="rect">
             <a:avLst/>
           </a:prstGeom>
           <a:noFill/>
-          <a:extLst>
-            <a:ext uri="{909E8E84-426E-40DD-AFC4-6F175D3DCCD1}">
-              <a14:hiddenFill xmlns:a14="http://schemas.microsoft.com/office/drawing/2010/main">
+          <a:effectLst/>
+        </p:spPr>
+        <p:txBody>
+          <a:bodyPr wrap="square" lIns="91440" tIns="45720" rIns="91440" bIns="45720">
+            <a:spAutoFit/>
+          </a:bodyPr>
+          <a:lstStyle/>
+          <a:p>
+            <a:pPr algn="ctr"/>
+            <a:r>
+              <a:rPr lang="pt-BR" sz="2400" b="1" dirty="0" smtClean="0">
+                <a:ln w="0"/>
                 <a:solidFill>
-                  <a:srgbClr val="FFFFFF"/>
+                  <a:schemeClr val="bg1"/>
                 </a:solidFill>
-              </a14:hiddenFill>
-            </a:ext>
-          </a:extLst>
-        </p:spPr>
-      </p:pic>
-      <p:pic>
-        <p:nvPicPr>
-          <p:cNvPr id="2060" name="Picture 12" descr="Resultado de imagem para toca de cabeÃ§a"/>
-          <p:cNvPicPr>
-            <a:picLocks noChangeAspect="1" noChangeArrowheads="1"/>
-          </p:cNvPicPr>
+                <a:effectLst>
+                  <a:outerShdw blurRad="38100" dist="19050" dir="2700000" algn="tl" rotWithShape="0">
+                    <a:schemeClr val="dk1">
+                      <a:alpha val="40000"/>
+                    </a:schemeClr>
+                  </a:outerShdw>
+                </a:effectLst>
+                <a:latin typeface="Exo 2 Medium" panose="00000600000000000000" pitchFamily="50" charset="0"/>
+              </a:rPr>
+              <a:t>DEV TEAM</a:t>
+            </a:r>
+            <a:endParaRPr lang="pt-BR" sz="2400" b="1" cap="none" spc="0" dirty="0">
+              <a:ln w="0"/>
+              <a:solidFill>
+                <a:schemeClr val="bg1"/>
+              </a:solidFill>
+              <a:effectLst>
+                <a:outerShdw blurRad="38100" dist="19050" dir="2700000" algn="tl" rotWithShape="0">
+                  <a:schemeClr val="dk1">
+                    <a:alpha val="40000"/>
+                  </a:schemeClr>
+                </a:outerShdw>
+              </a:effectLst>
+              <a:latin typeface="Exo 2 Medium" panose="00000600000000000000" pitchFamily="50" charset="0"/>
+            </a:endParaRPr>
+          </a:p>
+        </p:txBody>
+      </p:sp>
+      <p:sp>
+        <p:nvSpPr>
+          <p:cNvPr id="20" name="Retângulo 19"/>
+          <p:cNvSpPr/>
           <p:nvPr/>
-        </p:nvPicPr>
-        <p:blipFill>
-          <a:blip r:embed="rId9" cstate="print">
-            <a:duotone>
-              <a:prstClr val="black"/>
-              <a:schemeClr val="accent1">
-                <a:tint val="45000"/>
-                <a:satMod val="400000"/>
-              </a:schemeClr>
-            </a:duotone>
-            <a:extLst>
-              <a:ext uri="{BEBA8EAE-BF5A-486C-A8C5-ECC9F3942E4B}">
-                <a14:imgProps xmlns:a14="http://schemas.microsoft.com/office/drawing/2010/main">
-                  <a14:imgLayer r:embed="rId10">
-                    <a14:imgEffect>
-                      <a14:sharpenSoften amount="-25000"/>
-                    </a14:imgEffect>
-                    <a14:imgEffect>
-                      <a14:colorTemperature colorTemp="4700"/>
-                    </a14:imgEffect>
-                    <a14:imgEffect>
-                      <a14:brightnessContrast bright="-20000" contrast="20000"/>
-                    </a14:imgEffect>
-                  </a14:imgLayer>
-                </a14:imgProps>
-              </a:ext>
-              <a:ext uri="{28A0092B-C50C-407E-A947-70E740481C1C}">
-                <a14:useLocalDpi xmlns:a14="http://schemas.microsoft.com/office/drawing/2010/main" val="0"/>
-              </a:ext>
-            </a:extLst>
-          </a:blip>
-          <a:srcRect/>
-          <a:stretch>
-            <a:fillRect/>
-          </a:stretch>
-        </p:blipFill>
-        <p:spPr bwMode="auto">
-          <a:xfrm rot="671248">
-            <a:off x="898712" y="2377341"/>
-            <a:ext cx="1850510" cy="756602"/>
+        </p:nvSpPr>
+        <p:spPr>
+          <a:xfrm>
+            <a:off x="9383824" y="4653044"/>
+            <a:ext cx="1927568" cy="461665"/>
           </a:xfrm>
           <a:prstGeom prst="rect">
             <a:avLst/>
           </a:prstGeom>
           <a:noFill/>
-          <a:extLst>
-            <a:ext uri="{909E8E84-426E-40DD-AFC4-6F175D3DCCD1}">
-              <a14:hiddenFill xmlns:a14="http://schemas.microsoft.com/office/drawing/2010/main">
+          <a:effectLst/>
+        </p:spPr>
+        <p:txBody>
+          <a:bodyPr wrap="square" lIns="91440" tIns="45720" rIns="91440" bIns="45720">
+            <a:spAutoFit/>
+          </a:bodyPr>
+          <a:lstStyle/>
+          <a:p>
+            <a:pPr algn="ctr"/>
+            <a:r>
+              <a:rPr lang="pt-BR" sz="2400" b="1" dirty="0" smtClean="0">
+                <a:ln w="0"/>
                 <a:solidFill>
-                  <a:srgbClr val="FFFFFF"/>
+                  <a:schemeClr val="bg1"/>
                 </a:solidFill>
-              </a14:hiddenFill>
-            </a:ext>
-          </a:extLst>
-        </p:spPr>
-      </p:pic>
-      <p:pic>
-        <p:nvPicPr>
-          <p:cNvPr id="26" name="Imagem 25"/>
-          <p:cNvPicPr>
-            <a:picLocks noChangeAspect="1"/>
-          </p:cNvPicPr>
+                <a:effectLst>
+                  <a:outerShdw blurRad="38100" dist="19050" dir="2700000" algn="tl" rotWithShape="0">
+                    <a:schemeClr val="dk1">
+                      <a:alpha val="40000"/>
+                    </a:schemeClr>
+                  </a:outerShdw>
+                </a:effectLst>
+                <a:latin typeface="Exo 2 Medium" panose="00000600000000000000" pitchFamily="50" charset="0"/>
+              </a:rPr>
+              <a:t>DEV TEAM</a:t>
+            </a:r>
+            <a:endParaRPr lang="pt-BR" sz="2400" b="1" cap="none" spc="0" dirty="0">
+              <a:ln w="0"/>
+              <a:solidFill>
+                <a:schemeClr val="bg1"/>
+              </a:solidFill>
+              <a:effectLst>
+                <a:outerShdw blurRad="38100" dist="19050" dir="2700000" algn="tl" rotWithShape="0">
+                  <a:schemeClr val="dk1">
+                    <a:alpha val="40000"/>
+                  </a:schemeClr>
+                </a:outerShdw>
+              </a:effectLst>
+              <a:latin typeface="Exo 2 Medium" panose="00000600000000000000" pitchFamily="50" charset="0"/>
+            </a:endParaRPr>
+          </a:p>
+        </p:txBody>
+      </p:sp>
+      <p:sp>
+        <p:nvSpPr>
+          <p:cNvPr id="29" name="Retângulo 28"/>
+          <p:cNvSpPr/>
           <p:nvPr/>
-        </p:nvPicPr>
-        <p:blipFill>
-          <a:blip r:embed="rId11" cstate="print">
-            <a:extLst>
-              <a:ext uri="{28A0092B-C50C-407E-A947-70E740481C1C}">
-                <a14:useLocalDpi xmlns:a14="http://schemas.microsoft.com/office/drawing/2010/main" val="0"/>
-              </a:ext>
-            </a:extLst>
-          </a:blip>
-          <a:stretch>
-            <a:fillRect/>
-          </a:stretch>
-        </p:blipFill>
+        </p:nvSpPr>
         <p:spPr>
           <a:xfrm>
-            <a:off x="3857458" y="2438645"/>
-            <a:ext cx="1607810" cy="1607810"/>
+            <a:off x="859451" y="4653043"/>
+            <a:ext cx="1927568" cy="830997"/>
           </a:xfrm>
           <a:prstGeom prst="rect">
             <a:avLst/>
           </a:prstGeom>
+          <a:noFill/>
+          <a:effectLst/>
         </p:spPr>
-      </p:pic>
+        <p:txBody>
+          <a:bodyPr wrap="square" lIns="91440" tIns="45720" rIns="91440" bIns="45720">
+            <a:spAutoFit/>
+          </a:bodyPr>
+          <a:lstStyle/>
+          <a:p>
+            <a:pPr algn="ctr"/>
+            <a:r>
+              <a:rPr lang="pt-BR" sz="2400" b="1" dirty="0" smtClean="0">
+                <a:ln w="0"/>
+                <a:solidFill>
+                  <a:schemeClr val="bg1"/>
+                </a:solidFill>
+                <a:effectLst>
+                  <a:outerShdw blurRad="38100" dist="19050" dir="2700000" algn="tl" rotWithShape="0">
+                    <a:schemeClr val="dk1">
+                      <a:alpha val="40000"/>
+                    </a:schemeClr>
+                  </a:outerShdw>
+                </a:effectLst>
+                <a:latin typeface="Exo 2 Medium" panose="00000600000000000000" pitchFamily="50" charset="0"/>
+              </a:rPr>
+              <a:t>PRODUCT OWNER</a:t>
+            </a:r>
+            <a:endParaRPr lang="pt-BR" sz="2400" b="1" cap="none" spc="0" dirty="0">
+              <a:ln w="0"/>
+              <a:solidFill>
+                <a:schemeClr val="bg1"/>
+              </a:solidFill>
+              <a:effectLst>
+                <a:outerShdw blurRad="38100" dist="19050" dir="2700000" algn="tl" rotWithShape="0">
+                  <a:schemeClr val="dk1">
+                    <a:alpha val="40000"/>
+                  </a:schemeClr>
+                </a:outerShdw>
+              </a:effectLst>
+              <a:latin typeface="Exo 2 Medium" panose="00000600000000000000" pitchFamily="50" charset="0"/>
+            </a:endParaRPr>
+          </a:p>
+        </p:txBody>
+      </p:sp>
+      <p:sp>
+        <p:nvSpPr>
+          <p:cNvPr id="30" name="Retângulo 29"/>
+          <p:cNvSpPr/>
+          <p:nvPr/>
+        </p:nvSpPr>
+        <p:spPr>
+          <a:xfrm>
+            <a:off x="3701446" y="4653043"/>
+            <a:ext cx="1927568" cy="830997"/>
+          </a:xfrm>
+          <a:prstGeom prst="rect">
+            <a:avLst/>
+          </a:prstGeom>
+          <a:noFill/>
+          <a:effectLst/>
+        </p:spPr>
+        <p:txBody>
+          <a:bodyPr wrap="square" lIns="91440" tIns="45720" rIns="91440" bIns="45720">
+            <a:spAutoFit/>
+          </a:bodyPr>
+          <a:lstStyle/>
+          <a:p>
+            <a:pPr algn="ctr"/>
+            <a:r>
+              <a:rPr lang="pt-BR" sz="2400" b="1" dirty="0" smtClean="0">
+                <a:ln w="0"/>
+                <a:solidFill>
+                  <a:schemeClr val="bg1"/>
+                </a:solidFill>
+                <a:effectLst>
+                  <a:outerShdw blurRad="38100" dist="19050" dir="2700000" algn="tl" rotWithShape="0">
+                    <a:schemeClr val="dk1">
+                      <a:alpha val="40000"/>
+                    </a:schemeClr>
+                  </a:outerShdw>
+                </a:effectLst>
+                <a:latin typeface="Exo 2 Medium" panose="00000600000000000000" pitchFamily="50" charset="0"/>
+              </a:rPr>
+              <a:t>SCRUM MASTER</a:t>
+            </a:r>
+            <a:endParaRPr lang="pt-BR" sz="2400" b="1" cap="none" spc="0" dirty="0">
+              <a:ln w="0"/>
+              <a:solidFill>
+                <a:schemeClr val="bg1"/>
+              </a:solidFill>
+              <a:effectLst>
+                <a:outerShdw blurRad="38100" dist="19050" dir="2700000" algn="tl" rotWithShape="0">
+                  <a:schemeClr val="dk1">
+                    <a:alpha val="40000"/>
+                  </a:schemeClr>
+                </a:outerShdw>
+              </a:effectLst>
+              <a:latin typeface="Exo 2 Medium" panose="00000600000000000000" pitchFamily="50" charset="0"/>
+            </a:endParaRPr>
+          </a:p>
+        </p:txBody>
+      </p:sp>
+      <p:grpSp>
+        <p:nvGrpSpPr>
+          <p:cNvPr id="36" name="Agrupar 35"/>
+          <p:cNvGrpSpPr/>
+          <p:nvPr/>
+        </p:nvGrpSpPr>
+        <p:grpSpPr>
+          <a:xfrm>
+            <a:off x="6419066" y="2211400"/>
+            <a:ext cx="2178122" cy="2275319"/>
+            <a:chOff x="6419066" y="2211400"/>
+            <a:chExt cx="2178122" cy="2275319"/>
+          </a:xfrm>
+        </p:grpSpPr>
+        <p:sp>
+          <p:nvSpPr>
+            <p:cNvPr id="10" name="Elipse 9"/>
+            <p:cNvSpPr/>
+            <p:nvPr/>
+          </p:nvSpPr>
+          <p:spPr>
+            <a:xfrm>
+              <a:off x="6419066" y="2308597"/>
+              <a:ext cx="2178122" cy="2178122"/>
+            </a:xfrm>
+            <a:prstGeom prst="ellipse">
+              <a:avLst/>
+            </a:prstGeom>
+            <a:solidFill>
+              <a:schemeClr val="bg1"/>
+            </a:solidFill>
+            <a:ln>
+              <a:noFill/>
+            </a:ln>
+            <a:effectLst>
+              <a:outerShdw blurRad="50800" dist="38100" dir="2700000" algn="tl" rotWithShape="0">
+                <a:prstClr val="black">
+                  <a:alpha val="40000"/>
+                </a:prstClr>
+              </a:outerShdw>
+            </a:effectLst>
+          </p:spPr>
+          <p:style>
+            <a:lnRef idx="2">
+              <a:schemeClr val="accent1">
+                <a:shade val="50000"/>
+              </a:schemeClr>
+            </a:lnRef>
+            <a:fillRef idx="1">
+              <a:schemeClr val="accent1"/>
+            </a:fillRef>
+            <a:effectRef idx="0">
+              <a:schemeClr val="accent1"/>
+            </a:effectRef>
+            <a:fontRef idx="minor">
+              <a:schemeClr val="lt1"/>
+            </a:fontRef>
+          </p:style>
+          <p:txBody>
+            <a:bodyPr rtlCol="0" anchor="ctr"/>
+            <a:lstStyle/>
+            <a:p>
+              <a:pPr algn="ctr"/>
+              <a:endParaRPr lang="pt-BR"/>
+            </a:p>
+          </p:txBody>
+        </p:sp>
+        <p:pic>
+          <p:nvPicPr>
+            <p:cNvPr id="14" name="Imagem 13"/>
+            <p:cNvPicPr>
+              <a:picLocks noChangeAspect="1"/>
+            </p:cNvPicPr>
+            <p:nvPr/>
+          </p:nvPicPr>
+          <p:blipFill>
+            <a:blip r:embed="rId6">
+              <a:extLst>
+                <a:ext uri="{28A0092B-C50C-407E-A947-70E740481C1C}">
+                  <a14:useLocalDpi xmlns:a14="http://schemas.microsoft.com/office/drawing/2010/main" val="0"/>
+                </a:ext>
+              </a:extLst>
+            </a:blip>
+            <a:stretch>
+              <a:fillRect/>
+            </a:stretch>
+          </p:blipFill>
+          <p:spPr>
+            <a:xfrm>
+              <a:off x="6706433" y="2211400"/>
+              <a:ext cx="1603387" cy="1835055"/>
+            </a:xfrm>
+            <a:prstGeom prst="rect">
+              <a:avLst/>
+            </a:prstGeom>
+          </p:spPr>
+        </p:pic>
+      </p:grpSp>
+      <p:grpSp>
+        <p:nvGrpSpPr>
+          <p:cNvPr id="35" name="Agrupar 34"/>
+          <p:cNvGrpSpPr/>
+          <p:nvPr/>
+        </p:nvGrpSpPr>
+        <p:grpSpPr>
+          <a:xfrm>
+            <a:off x="9261512" y="2312259"/>
+            <a:ext cx="2178122" cy="2178122"/>
+            <a:chOff x="9261512" y="2312259"/>
+            <a:chExt cx="2178122" cy="2178122"/>
+          </a:xfrm>
+        </p:grpSpPr>
+        <p:sp>
+          <p:nvSpPr>
+            <p:cNvPr id="16" name="Elipse 15"/>
+            <p:cNvSpPr/>
+            <p:nvPr/>
+          </p:nvSpPr>
+          <p:spPr>
+            <a:xfrm>
+              <a:off x="9261512" y="2312259"/>
+              <a:ext cx="2178122" cy="2178122"/>
+            </a:xfrm>
+            <a:prstGeom prst="ellipse">
+              <a:avLst/>
+            </a:prstGeom>
+            <a:solidFill>
+              <a:schemeClr val="bg1"/>
+            </a:solidFill>
+            <a:ln>
+              <a:noFill/>
+            </a:ln>
+            <a:effectLst>
+              <a:outerShdw blurRad="50800" dist="38100" dir="2700000" algn="tl" rotWithShape="0">
+                <a:prstClr val="black">
+                  <a:alpha val="40000"/>
+                </a:prstClr>
+              </a:outerShdw>
+            </a:effectLst>
+          </p:spPr>
+          <p:style>
+            <a:lnRef idx="2">
+              <a:schemeClr val="accent1">
+                <a:shade val="50000"/>
+              </a:schemeClr>
+            </a:lnRef>
+            <a:fillRef idx="1">
+              <a:schemeClr val="accent1"/>
+            </a:fillRef>
+            <a:effectRef idx="0">
+              <a:schemeClr val="accent1"/>
+            </a:effectRef>
+            <a:fontRef idx="minor">
+              <a:schemeClr val="lt1"/>
+            </a:fontRef>
+          </p:style>
+          <p:txBody>
+            <a:bodyPr rtlCol="0" anchor="ctr"/>
+            <a:lstStyle/>
+            <a:p>
+              <a:pPr algn="ctr"/>
+              <a:endParaRPr lang="pt-BR"/>
+            </a:p>
+          </p:txBody>
+        </p:sp>
+        <p:pic>
+          <p:nvPicPr>
+            <p:cNvPr id="18" name="Imagem 17"/>
+            <p:cNvPicPr>
+              <a:picLocks noChangeAspect="1"/>
+            </p:cNvPicPr>
+            <p:nvPr/>
+          </p:nvPicPr>
+          <p:blipFill>
+            <a:blip r:embed="rId7">
+              <a:extLst>
+                <a:ext uri="{28A0092B-C50C-407E-A947-70E740481C1C}">
+                  <a14:useLocalDpi xmlns:a14="http://schemas.microsoft.com/office/drawing/2010/main" val="0"/>
+                </a:ext>
+              </a:extLst>
+            </a:blip>
+            <a:stretch>
+              <a:fillRect/>
+            </a:stretch>
+          </p:blipFill>
+          <p:spPr>
+            <a:xfrm>
+              <a:off x="9548963" y="2351620"/>
+              <a:ext cx="1597290" cy="1694835"/>
+            </a:xfrm>
+            <a:prstGeom prst="rect">
+              <a:avLst/>
+            </a:prstGeom>
+          </p:spPr>
+        </p:pic>
+      </p:grpSp>
+      <p:grpSp>
+        <p:nvGrpSpPr>
+          <p:cNvPr id="38" name="Agrupar 37"/>
+          <p:cNvGrpSpPr/>
+          <p:nvPr/>
+        </p:nvGrpSpPr>
+        <p:grpSpPr>
+          <a:xfrm>
+            <a:off x="210693" y="1321858"/>
+            <a:ext cx="11750315" cy="5142442"/>
+            <a:chOff x="210693" y="1321858"/>
+            <a:chExt cx="11750315" cy="5142442"/>
+          </a:xfrm>
+        </p:grpSpPr>
+        <p:pic>
+          <p:nvPicPr>
+            <p:cNvPr id="37" name="Imagem 36"/>
+            <p:cNvPicPr>
+              <a:picLocks noChangeAspect="1"/>
+            </p:cNvPicPr>
+            <p:nvPr/>
+          </p:nvPicPr>
+          <p:blipFill rotWithShape="1">
+            <a:blip r:embed="rId8"/>
+            <a:srcRect t="1" r="574" b="246"/>
+            <a:stretch/>
+          </p:blipFill>
+          <p:spPr>
+            <a:xfrm>
+              <a:off x="210693" y="1321858"/>
+              <a:ext cx="6723508" cy="5142442"/>
+            </a:xfrm>
+            <a:prstGeom prst="rect">
+              <a:avLst/>
+            </a:prstGeom>
+            <a:solidFill>
+              <a:srgbClr val="FFFFFF">
+                <a:shade val="85000"/>
+              </a:srgbClr>
+            </a:solidFill>
+            <a:ln w="88900" cap="sq">
+              <a:noFill/>
+              <a:miter lim="800000"/>
+            </a:ln>
+            <a:effectLst>
+              <a:outerShdw blurRad="55000" dist="18000" dir="5400000" algn="tl" rotWithShape="0">
+                <a:srgbClr val="000000">
+                  <a:alpha val="40000"/>
+                </a:srgbClr>
+              </a:outerShdw>
+            </a:effectLst>
+            <a:scene3d>
+              <a:camera prst="orthographicFront"/>
+              <a:lightRig rig="twoPt" dir="t">
+                <a:rot lat="0" lon="0" rev="7200000"/>
+              </a:lightRig>
+            </a:scene3d>
+            <a:sp3d>
+              <a:contourClr>
+                <a:srgbClr val="FFFFFF"/>
+              </a:contourClr>
+            </a:sp3d>
+          </p:spPr>
+        </p:pic>
+        <p:pic>
+          <p:nvPicPr>
+            <p:cNvPr id="42" name="Imagem 41"/>
+            <p:cNvPicPr/>
+            <p:nvPr/>
+          </p:nvPicPr>
+          <p:blipFill rotWithShape="1">
+            <a:blip r:embed="rId9">
+              <a:extLst>
+                <a:ext uri="{28A0092B-C50C-407E-A947-70E740481C1C}">
+                  <a14:useLocalDpi xmlns:a14="http://schemas.microsoft.com/office/drawing/2010/main" val="0"/>
+                </a:ext>
+              </a:extLst>
+            </a:blip>
+            <a:srcRect l="256" t="1153" r="54053" b="1598"/>
+            <a:stretch/>
+          </p:blipFill>
+          <p:spPr bwMode="auto">
+            <a:xfrm>
+              <a:off x="7013597" y="1321858"/>
+              <a:ext cx="4947411" cy="5142442"/>
+            </a:xfrm>
+            <a:prstGeom prst="rect">
+              <a:avLst/>
+            </a:prstGeom>
+            <a:solidFill>
+              <a:srgbClr val="FFFFFF">
+                <a:shade val="85000"/>
+              </a:srgbClr>
+            </a:solidFill>
+            <a:ln w="88900" cap="sq">
+              <a:noFill/>
+              <a:miter lim="800000"/>
+            </a:ln>
+            <a:effectLst>
+              <a:outerShdw blurRad="55000" dist="18000" dir="5400000" algn="tl" rotWithShape="0">
+                <a:srgbClr val="000000">
+                  <a:alpha val="40000"/>
+                </a:srgbClr>
+              </a:outerShdw>
+            </a:effectLst>
+            <a:scene3d>
+              <a:camera prst="orthographicFront"/>
+              <a:lightRig rig="twoPt" dir="t">
+                <a:rot lat="0" lon="0" rev="7200000"/>
+              </a:lightRig>
+            </a:scene3d>
+            <a:sp3d>
+              <a:contourClr>
+                <a:srgbClr val="FFFFFF"/>
+              </a:contourClr>
+            </a:sp3d>
+            <a:extLst>
+              <a:ext uri="{53640926-AAD7-44D8-BBD7-CCE9431645EC}">
+                <a14:shadowObscured xmlns:a14="http://schemas.microsoft.com/office/drawing/2010/main"/>
+              </a:ext>
+            </a:extLst>
+          </p:spPr>
+        </p:pic>
+      </p:grpSp>
     </p:spTree>
     <p:extLst>
       <p:ext uri="{BB962C8B-B14F-4D97-AF65-F5344CB8AC3E}">
@@ -5036,6 +5349,2205 @@
   <p:clrMapOvr>
     <a:masterClrMapping/>
   </p:clrMapOvr>
+  <p:timing>
+    <p:tnLst>
+      <p:par>
+        <p:cTn id="1" dur="indefinite" restart="never" nodeType="tmRoot">
+          <p:childTnLst>
+            <p:seq concurrent="1" nextAc="seek">
+              <p:cTn id="2" dur="indefinite" nodeType="mainSeq">
+                <p:childTnLst>
+                  <p:par>
+                    <p:cTn id="3" fill="hold">
+                      <p:stCondLst>
+                        <p:cond delay="indefinite"/>
+                      </p:stCondLst>
+                      <p:childTnLst>
+                        <p:par>
+                          <p:cTn id="4" fill="hold">
+                            <p:stCondLst>
+                              <p:cond delay="0"/>
+                            </p:stCondLst>
+                            <p:childTnLst>
+                              <p:par>
+                                <p:cTn id="5" presetID="10" presetClass="exit" presetSubtype="0" fill="hold" nodeType="clickEffect">
+                                  <p:stCondLst>
+                                    <p:cond delay="0"/>
+                                  </p:stCondLst>
+                                  <p:childTnLst>
+                                    <p:animEffect transition="out" filter="fade">
+                                      <p:cBhvr>
+                                        <p:cTn id="6" dur="400"/>
+                                        <p:tgtEl>
+                                          <p:spTgt spid="38"/>
+                                        </p:tgtEl>
+                                      </p:cBhvr>
+                                    </p:animEffect>
+                                    <p:set>
+                                      <p:cBhvr>
+                                        <p:cTn id="7" dur="1" fill="hold">
+                                          <p:stCondLst>
+                                            <p:cond delay="399"/>
+                                          </p:stCondLst>
+                                        </p:cTn>
+                                        <p:tgtEl>
+                                          <p:spTgt spid="38"/>
+                                        </p:tgtEl>
+                                        <p:attrNameLst>
+                                          <p:attrName>style.visibility</p:attrName>
+                                        </p:attrNameLst>
+                                      </p:cBhvr>
+                                      <p:to>
+                                        <p:strVal val="hidden"/>
+                                      </p:to>
+                                    </p:set>
+                                  </p:childTnLst>
+                                </p:cTn>
+                              </p:par>
+                            </p:childTnLst>
+                          </p:cTn>
+                        </p:par>
+                        <p:par>
+                          <p:cTn id="8" fill="hold">
+                            <p:stCondLst>
+                              <p:cond delay="400"/>
+                            </p:stCondLst>
+                            <p:childTnLst>
+                              <p:par>
+                                <p:cTn id="9" presetID="42" presetClass="entr" presetSubtype="0" fill="hold" nodeType="afterEffect">
+                                  <p:stCondLst>
+                                    <p:cond delay="0"/>
+                                  </p:stCondLst>
+                                  <p:childTnLst>
+                                    <p:set>
+                                      <p:cBhvr>
+                                        <p:cTn id="10" dur="1" fill="hold">
+                                          <p:stCondLst>
+                                            <p:cond delay="0"/>
+                                          </p:stCondLst>
+                                        </p:cTn>
+                                        <p:tgtEl>
+                                          <p:spTgt spid="3"/>
+                                        </p:tgtEl>
+                                        <p:attrNameLst>
+                                          <p:attrName>style.visibility</p:attrName>
+                                        </p:attrNameLst>
+                                      </p:cBhvr>
+                                      <p:to>
+                                        <p:strVal val="visible"/>
+                                      </p:to>
+                                    </p:set>
+                                    <p:animEffect transition="in" filter="fade">
+                                      <p:cBhvr>
+                                        <p:cTn id="11" dur="400"/>
+                                        <p:tgtEl>
+                                          <p:spTgt spid="3"/>
+                                        </p:tgtEl>
+                                      </p:cBhvr>
+                                    </p:animEffect>
+                                    <p:anim calcmode="lin" valueType="num">
+                                      <p:cBhvr>
+                                        <p:cTn id="12" dur="400" fill="hold"/>
+                                        <p:tgtEl>
+                                          <p:spTgt spid="3"/>
+                                        </p:tgtEl>
+                                        <p:attrNameLst>
+                                          <p:attrName>ppt_x</p:attrName>
+                                        </p:attrNameLst>
+                                      </p:cBhvr>
+                                      <p:tavLst>
+                                        <p:tav tm="0">
+                                          <p:val>
+                                            <p:strVal val="#ppt_x"/>
+                                          </p:val>
+                                        </p:tav>
+                                        <p:tav tm="100000">
+                                          <p:val>
+                                            <p:strVal val="#ppt_x"/>
+                                          </p:val>
+                                        </p:tav>
+                                      </p:tavLst>
+                                    </p:anim>
+                                    <p:anim calcmode="lin" valueType="num">
+                                      <p:cBhvr>
+                                        <p:cTn id="13" dur="400" fill="hold"/>
+                                        <p:tgtEl>
+                                          <p:spTgt spid="3"/>
+                                        </p:tgtEl>
+                                        <p:attrNameLst>
+                                          <p:attrName>ppt_y</p:attrName>
+                                        </p:attrNameLst>
+                                      </p:cBhvr>
+                                      <p:tavLst>
+                                        <p:tav tm="0">
+                                          <p:val>
+                                            <p:strVal val="#ppt_y+.1"/>
+                                          </p:val>
+                                        </p:tav>
+                                        <p:tav tm="100000">
+                                          <p:val>
+                                            <p:strVal val="#ppt_y"/>
+                                          </p:val>
+                                        </p:tav>
+                                      </p:tavLst>
+                                    </p:anim>
+                                  </p:childTnLst>
+                                </p:cTn>
+                              </p:par>
+                              <p:par>
+                                <p:cTn id="14" presetID="42" presetClass="entr" presetSubtype="0" fill="hold" nodeType="withEffect">
+                                  <p:stCondLst>
+                                    <p:cond delay="0"/>
+                                  </p:stCondLst>
+                                  <p:childTnLst>
+                                    <p:set>
+                                      <p:cBhvr>
+                                        <p:cTn id="15" dur="1" fill="hold">
+                                          <p:stCondLst>
+                                            <p:cond delay="0"/>
+                                          </p:stCondLst>
+                                        </p:cTn>
+                                        <p:tgtEl>
+                                          <p:spTgt spid="2"/>
+                                        </p:tgtEl>
+                                        <p:attrNameLst>
+                                          <p:attrName>style.visibility</p:attrName>
+                                        </p:attrNameLst>
+                                      </p:cBhvr>
+                                      <p:to>
+                                        <p:strVal val="visible"/>
+                                      </p:to>
+                                    </p:set>
+                                    <p:animEffect transition="in" filter="fade">
+                                      <p:cBhvr>
+                                        <p:cTn id="16" dur="400"/>
+                                        <p:tgtEl>
+                                          <p:spTgt spid="2"/>
+                                        </p:tgtEl>
+                                      </p:cBhvr>
+                                    </p:animEffect>
+                                    <p:anim calcmode="lin" valueType="num">
+                                      <p:cBhvr>
+                                        <p:cTn id="17" dur="400" fill="hold"/>
+                                        <p:tgtEl>
+                                          <p:spTgt spid="2"/>
+                                        </p:tgtEl>
+                                        <p:attrNameLst>
+                                          <p:attrName>ppt_x</p:attrName>
+                                        </p:attrNameLst>
+                                      </p:cBhvr>
+                                      <p:tavLst>
+                                        <p:tav tm="0">
+                                          <p:val>
+                                            <p:strVal val="#ppt_x"/>
+                                          </p:val>
+                                        </p:tav>
+                                        <p:tav tm="100000">
+                                          <p:val>
+                                            <p:strVal val="#ppt_x"/>
+                                          </p:val>
+                                        </p:tav>
+                                      </p:tavLst>
+                                    </p:anim>
+                                    <p:anim calcmode="lin" valueType="num">
+                                      <p:cBhvr>
+                                        <p:cTn id="18" dur="400" fill="hold"/>
+                                        <p:tgtEl>
+                                          <p:spTgt spid="2"/>
+                                        </p:tgtEl>
+                                        <p:attrNameLst>
+                                          <p:attrName>ppt_y</p:attrName>
+                                        </p:attrNameLst>
+                                      </p:cBhvr>
+                                      <p:tavLst>
+                                        <p:tav tm="0">
+                                          <p:val>
+                                            <p:strVal val="#ppt_y+.1"/>
+                                          </p:val>
+                                        </p:tav>
+                                        <p:tav tm="100000">
+                                          <p:val>
+                                            <p:strVal val="#ppt_y"/>
+                                          </p:val>
+                                        </p:tav>
+                                      </p:tavLst>
+                                    </p:anim>
+                                  </p:childTnLst>
+                                </p:cTn>
+                              </p:par>
+                              <p:par>
+                                <p:cTn id="19" presetID="42" presetClass="entr" presetSubtype="0" fill="hold" nodeType="withEffect">
+                                  <p:stCondLst>
+                                    <p:cond delay="0"/>
+                                  </p:stCondLst>
+                                  <p:childTnLst>
+                                    <p:set>
+                                      <p:cBhvr>
+                                        <p:cTn id="20" dur="1" fill="hold">
+                                          <p:stCondLst>
+                                            <p:cond delay="0"/>
+                                          </p:stCondLst>
+                                        </p:cTn>
+                                        <p:tgtEl>
+                                          <p:spTgt spid="36"/>
+                                        </p:tgtEl>
+                                        <p:attrNameLst>
+                                          <p:attrName>style.visibility</p:attrName>
+                                        </p:attrNameLst>
+                                      </p:cBhvr>
+                                      <p:to>
+                                        <p:strVal val="visible"/>
+                                      </p:to>
+                                    </p:set>
+                                    <p:animEffect transition="in" filter="fade">
+                                      <p:cBhvr>
+                                        <p:cTn id="21" dur="400"/>
+                                        <p:tgtEl>
+                                          <p:spTgt spid="36"/>
+                                        </p:tgtEl>
+                                      </p:cBhvr>
+                                    </p:animEffect>
+                                    <p:anim calcmode="lin" valueType="num">
+                                      <p:cBhvr>
+                                        <p:cTn id="22" dur="400" fill="hold"/>
+                                        <p:tgtEl>
+                                          <p:spTgt spid="36"/>
+                                        </p:tgtEl>
+                                        <p:attrNameLst>
+                                          <p:attrName>ppt_x</p:attrName>
+                                        </p:attrNameLst>
+                                      </p:cBhvr>
+                                      <p:tavLst>
+                                        <p:tav tm="0">
+                                          <p:val>
+                                            <p:strVal val="#ppt_x"/>
+                                          </p:val>
+                                        </p:tav>
+                                        <p:tav tm="100000">
+                                          <p:val>
+                                            <p:strVal val="#ppt_x"/>
+                                          </p:val>
+                                        </p:tav>
+                                      </p:tavLst>
+                                    </p:anim>
+                                    <p:anim calcmode="lin" valueType="num">
+                                      <p:cBhvr>
+                                        <p:cTn id="23" dur="400" fill="hold"/>
+                                        <p:tgtEl>
+                                          <p:spTgt spid="36"/>
+                                        </p:tgtEl>
+                                        <p:attrNameLst>
+                                          <p:attrName>ppt_y</p:attrName>
+                                        </p:attrNameLst>
+                                      </p:cBhvr>
+                                      <p:tavLst>
+                                        <p:tav tm="0">
+                                          <p:val>
+                                            <p:strVal val="#ppt_y+.1"/>
+                                          </p:val>
+                                        </p:tav>
+                                        <p:tav tm="100000">
+                                          <p:val>
+                                            <p:strVal val="#ppt_y"/>
+                                          </p:val>
+                                        </p:tav>
+                                      </p:tavLst>
+                                    </p:anim>
+                                  </p:childTnLst>
+                                </p:cTn>
+                              </p:par>
+                              <p:par>
+                                <p:cTn id="24" presetID="42" presetClass="entr" presetSubtype="0" fill="hold" nodeType="withEffect">
+                                  <p:stCondLst>
+                                    <p:cond delay="0"/>
+                                  </p:stCondLst>
+                                  <p:childTnLst>
+                                    <p:set>
+                                      <p:cBhvr>
+                                        <p:cTn id="25" dur="1" fill="hold">
+                                          <p:stCondLst>
+                                            <p:cond delay="0"/>
+                                          </p:stCondLst>
+                                        </p:cTn>
+                                        <p:tgtEl>
+                                          <p:spTgt spid="35"/>
+                                        </p:tgtEl>
+                                        <p:attrNameLst>
+                                          <p:attrName>style.visibility</p:attrName>
+                                        </p:attrNameLst>
+                                      </p:cBhvr>
+                                      <p:to>
+                                        <p:strVal val="visible"/>
+                                      </p:to>
+                                    </p:set>
+                                    <p:animEffect transition="in" filter="fade">
+                                      <p:cBhvr>
+                                        <p:cTn id="26" dur="400"/>
+                                        <p:tgtEl>
+                                          <p:spTgt spid="35"/>
+                                        </p:tgtEl>
+                                      </p:cBhvr>
+                                    </p:animEffect>
+                                    <p:anim calcmode="lin" valueType="num">
+                                      <p:cBhvr>
+                                        <p:cTn id="27" dur="400" fill="hold"/>
+                                        <p:tgtEl>
+                                          <p:spTgt spid="35"/>
+                                        </p:tgtEl>
+                                        <p:attrNameLst>
+                                          <p:attrName>ppt_x</p:attrName>
+                                        </p:attrNameLst>
+                                      </p:cBhvr>
+                                      <p:tavLst>
+                                        <p:tav tm="0">
+                                          <p:val>
+                                            <p:strVal val="#ppt_x"/>
+                                          </p:val>
+                                        </p:tav>
+                                        <p:tav tm="100000">
+                                          <p:val>
+                                            <p:strVal val="#ppt_x"/>
+                                          </p:val>
+                                        </p:tav>
+                                      </p:tavLst>
+                                    </p:anim>
+                                    <p:anim calcmode="lin" valueType="num">
+                                      <p:cBhvr>
+                                        <p:cTn id="28" dur="400" fill="hold"/>
+                                        <p:tgtEl>
+                                          <p:spTgt spid="35"/>
+                                        </p:tgtEl>
+                                        <p:attrNameLst>
+                                          <p:attrName>ppt_y</p:attrName>
+                                        </p:attrNameLst>
+                                      </p:cBhvr>
+                                      <p:tavLst>
+                                        <p:tav tm="0">
+                                          <p:val>
+                                            <p:strVal val="#ppt_y+.1"/>
+                                          </p:val>
+                                        </p:tav>
+                                        <p:tav tm="100000">
+                                          <p:val>
+                                            <p:strVal val="#ppt_y"/>
+                                          </p:val>
+                                        </p:tav>
+                                      </p:tavLst>
+                                    </p:anim>
+                                  </p:childTnLst>
+                                </p:cTn>
+                              </p:par>
+                              <p:par>
+                                <p:cTn id="29" presetID="10" presetClass="entr" presetSubtype="0" fill="hold" grpId="0" nodeType="withEffect">
+                                  <p:stCondLst>
+                                    <p:cond delay="0"/>
+                                  </p:stCondLst>
+                                  <p:childTnLst>
+                                    <p:set>
+                                      <p:cBhvr>
+                                        <p:cTn id="30" dur="1" fill="hold">
+                                          <p:stCondLst>
+                                            <p:cond delay="0"/>
+                                          </p:stCondLst>
+                                        </p:cTn>
+                                        <p:tgtEl>
+                                          <p:spTgt spid="19"/>
+                                        </p:tgtEl>
+                                        <p:attrNameLst>
+                                          <p:attrName>style.visibility</p:attrName>
+                                        </p:attrNameLst>
+                                      </p:cBhvr>
+                                      <p:to>
+                                        <p:strVal val="visible"/>
+                                      </p:to>
+                                    </p:set>
+                                    <p:animEffect transition="in" filter="fade">
+                                      <p:cBhvr>
+                                        <p:cTn id="31" dur="500"/>
+                                        <p:tgtEl>
+                                          <p:spTgt spid="19"/>
+                                        </p:tgtEl>
+                                      </p:cBhvr>
+                                    </p:animEffect>
+                                  </p:childTnLst>
+                                </p:cTn>
+                              </p:par>
+                              <p:par>
+                                <p:cTn id="32" presetID="10" presetClass="entr" presetSubtype="0" fill="hold" grpId="0" nodeType="withEffect">
+                                  <p:stCondLst>
+                                    <p:cond delay="0"/>
+                                  </p:stCondLst>
+                                  <p:childTnLst>
+                                    <p:set>
+                                      <p:cBhvr>
+                                        <p:cTn id="33" dur="1" fill="hold">
+                                          <p:stCondLst>
+                                            <p:cond delay="0"/>
+                                          </p:stCondLst>
+                                        </p:cTn>
+                                        <p:tgtEl>
+                                          <p:spTgt spid="20"/>
+                                        </p:tgtEl>
+                                        <p:attrNameLst>
+                                          <p:attrName>style.visibility</p:attrName>
+                                        </p:attrNameLst>
+                                      </p:cBhvr>
+                                      <p:to>
+                                        <p:strVal val="visible"/>
+                                      </p:to>
+                                    </p:set>
+                                    <p:animEffect transition="in" filter="fade">
+                                      <p:cBhvr>
+                                        <p:cTn id="34" dur="500"/>
+                                        <p:tgtEl>
+                                          <p:spTgt spid="20"/>
+                                        </p:tgtEl>
+                                      </p:cBhvr>
+                                    </p:animEffect>
+                                  </p:childTnLst>
+                                </p:cTn>
+                              </p:par>
+                              <p:par>
+                                <p:cTn id="35" presetID="10" presetClass="entr" presetSubtype="0" fill="hold" grpId="0" nodeType="withEffect">
+                                  <p:stCondLst>
+                                    <p:cond delay="0"/>
+                                  </p:stCondLst>
+                                  <p:childTnLst>
+                                    <p:set>
+                                      <p:cBhvr>
+                                        <p:cTn id="36" dur="1" fill="hold">
+                                          <p:stCondLst>
+                                            <p:cond delay="0"/>
+                                          </p:stCondLst>
+                                        </p:cTn>
+                                        <p:tgtEl>
+                                          <p:spTgt spid="29"/>
+                                        </p:tgtEl>
+                                        <p:attrNameLst>
+                                          <p:attrName>style.visibility</p:attrName>
+                                        </p:attrNameLst>
+                                      </p:cBhvr>
+                                      <p:to>
+                                        <p:strVal val="visible"/>
+                                      </p:to>
+                                    </p:set>
+                                    <p:animEffect transition="in" filter="fade">
+                                      <p:cBhvr>
+                                        <p:cTn id="37" dur="500"/>
+                                        <p:tgtEl>
+                                          <p:spTgt spid="29"/>
+                                        </p:tgtEl>
+                                      </p:cBhvr>
+                                    </p:animEffect>
+                                  </p:childTnLst>
+                                </p:cTn>
+                              </p:par>
+                              <p:par>
+                                <p:cTn id="38" presetID="10" presetClass="entr" presetSubtype="0" fill="hold" grpId="0" nodeType="withEffect">
+                                  <p:stCondLst>
+                                    <p:cond delay="0"/>
+                                  </p:stCondLst>
+                                  <p:childTnLst>
+                                    <p:set>
+                                      <p:cBhvr>
+                                        <p:cTn id="39" dur="1" fill="hold">
+                                          <p:stCondLst>
+                                            <p:cond delay="0"/>
+                                          </p:stCondLst>
+                                        </p:cTn>
+                                        <p:tgtEl>
+                                          <p:spTgt spid="30"/>
+                                        </p:tgtEl>
+                                        <p:attrNameLst>
+                                          <p:attrName>style.visibility</p:attrName>
+                                        </p:attrNameLst>
+                                      </p:cBhvr>
+                                      <p:to>
+                                        <p:strVal val="visible"/>
+                                      </p:to>
+                                    </p:set>
+                                    <p:animEffect transition="in" filter="fade">
+                                      <p:cBhvr>
+                                        <p:cTn id="40" dur="500"/>
+                                        <p:tgtEl>
+                                          <p:spTgt spid="30"/>
+                                        </p:tgtEl>
+                                      </p:cBhvr>
+                                    </p:animEffect>
+                                  </p:childTnLst>
+                                </p:cTn>
+                              </p:par>
+                            </p:childTnLst>
+                          </p:cTn>
+                        </p:par>
+                      </p:childTnLst>
+                    </p:cTn>
+                  </p:par>
+                </p:childTnLst>
+              </p:cTn>
+              <p:prevCondLst>
+                <p:cond evt="onPrev" delay="0">
+                  <p:tgtEl>
+                    <p:sldTgt/>
+                  </p:tgtEl>
+                </p:cond>
+              </p:prevCondLst>
+              <p:nextCondLst>
+                <p:cond evt="onNext" delay="0">
+                  <p:tgtEl>
+                    <p:sldTgt/>
+                  </p:tgtEl>
+                </p:cond>
+              </p:nextCondLst>
+            </p:seq>
+          </p:childTnLst>
+        </p:cTn>
+      </p:par>
+    </p:tnLst>
+    <p:bldLst>
+      <p:bldP spid="19" grpId="0"/>
+      <p:bldP spid="20" grpId="0"/>
+      <p:bldP spid="29" grpId="0"/>
+      <p:bldP spid="30" grpId="0"/>
+    </p:bldLst>
+  </p:timing>
+</p:sld>
+</file>
+
+<file path=ppt/slides/slide5.xml><?xml version="1.0" encoding="utf-8"?>
+<p:sld xmlns:a="http://schemas.openxmlformats.org/drawingml/2006/main" xmlns:r="http://schemas.openxmlformats.org/officeDocument/2006/relationships" xmlns:p="http://schemas.openxmlformats.org/presentationml/2006/main">
+  <p:cSld>
+    <p:spTree>
+      <p:nvGrpSpPr>
+        <p:cNvPr id="1" name=""/>
+        <p:cNvGrpSpPr/>
+        <p:nvPr/>
+      </p:nvGrpSpPr>
+      <p:grpSpPr>
+        <a:xfrm>
+          <a:off x="0" y="0"/>
+          <a:ext cx="0" cy="0"/>
+          <a:chOff x="0" y="0"/>
+          <a:chExt cx="0" cy="0"/>
+        </a:xfrm>
+      </p:grpSpPr>
+      <p:grpSp>
+        <p:nvGrpSpPr>
+          <p:cNvPr id="6" name="Agrupar 5"/>
+          <p:cNvGrpSpPr/>
+          <p:nvPr/>
+        </p:nvGrpSpPr>
+        <p:grpSpPr>
+          <a:xfrm>
+            <a:off x="0" y="-5907"/>
+            <a:ext cx="12192000" cy="6863907"/>
+            <a:chOff x="0" y="0"/>
+            <a:chExt cx="12192000" cy="6863907"/>
+          </a:xfrm>
+        </p:grpSpPr>
+        <p:pic>
+          <p:nvPicPr>
+            <p:cNvPr id="4" name="Picture 22" descr="http://www.correiodoestadoonline.com.br/arquivos/noticias/3.png"/>
+            <p:cNvPicPr>
+              <a:picLocks noChangeAspect="1" noChangeArrowheads="1"/>
+            </p:cNvPicPr>
+            <p:nvPr/>
+          </p:nvPicPr>
+          <p:blipFill>
+            <a:blip r:embed="rId2">
+              <a:extLst>
+                <a:ext uri="{BEBA8EAE-BF5A-486C-A8C5-ECC9F3942E4B}">
+                  <a14:imgProps xmlns:a14="http://schemas.microsoft.com/office/drawing/2010/main">
+                    <a14:imgLayer r:embed="rId3">
+                      <a14:imgEffect>
+                        <a14:sharpenSoften amount="-80000"/>
+                      </a14:imgEffect>
+                      <a14:imgEffect>
+                        <a14:brightnessContrast bright="-46000"/>
+                      </a14:imgEffect>
+                    </a14:imgLayer>
+                  </a14:imgProps>
+                </a:ext>
+                <a:ext uri="{28A0092B-C50C-407E-A947-70E740481C1C}">
+                  <a14:useLocalDpi xmlns:a14="http://schemas.microsoft.com/office/drawing/2010/main" val="0"/>
+                </a:ext>
+              </a:extLst>
+            </a:blip>
+            <a:srcRect/>
+            <a:stretch>
+              <a:fillRect/>
+            </a:stretch>
+          </p:blipFill>
+          <p:spPr bwMode="auto">
+            <a:xfrm>
+              <a:off x="0" y="0"/>
+              <a:ext cx="12192000" cy="6863907"/>
+            </a:xfrm>
+            <a:prstGeom prst="rect">
+              <a:avLst/>
+            </a:prstGeom>
+            <a:noFill/>
+          </p:spPr>
+        </p:pic>
+        <p:sp>
+          <p:nvSpPr>
+            <p:cNvPr id="5" name="Retângulo 4"/>
+            <p:cNvSpPr/>
+            <p:nvPr/>
+          </p:nvSpPr>
+          <p:spPr>
+            <a:xfrm>
+              <a:off x="0" y="5907"/>
+              <a:ext cx="12192000" cy="6858000"/>
+            </a:xfrm>
+            <a:prstGeom prst="rect">
+              <a:avLst/>
+            </a:prstGeom>
+            <a:solidFill>
+              <a:schemeClr val="tx1">
+                <a:lumMod val="95000"/>
+                <a:lumOff val="5000"/>
+                <a:alpha val="87000"/>
+              </a:schemeClr>
+            </a:solidFill>
+            <a:ln>
+              <a:noFill/>
+            </a:ln>
+          </p:spPr>
+          <p:style>
+            <a:lnRef idx="2">
+              <a:schemeClr val="dk1"/>
+            </a:lnRef>
+            <a:fillRef idx="1">
+              <a:schemeClr val="lt1"/>
+            </a:fillRef>
+            <a:effectRef idx="0">
+              <a:schemeClr val="dk1"/>
+            </a:effectRef>
+            <a:fontRef idx="minor">
+              <a:schemeClr val="dk1"/>
+            </a:fontRef>
+          </p:style>
+          <p:txBody>
+            <a:bodyPr rtlCol="0" anchor="ctr"/>
+            <a:lstStyle/>
+            <a:p>
+              <a:pPr algn="ctr"/>
+              <a:endParaRPr lang="pt-BR" dirty="0"/>
+            </a:p>
+          </p:txBody>
+        </p:sp>
+      </p:grpSp>
+      <p:cxnSp>
+        <p:nvCxnSpPr>
+          <p:cNvPr id="8" name="Conector reto 7">
+            <a:extLst>
+              <a:ext uri="{FF2B5EF4-FFF2-40B4-BE49-F238E27FC236}">
+                <a16:creationId xmlns:a16="http://schemas.microsoft.com/office/drawing/2014/main" id="{6510727C-C843-4D84-A07F-20F37366891D}"/>
+              </a:ext>
+            </a:extLst>
+          </p:cNvPr>
+          <p:cNvCxnSpPr/>
+          <p:nvPr/>
+        </p:nvCxnSpPr>
+        <p:spPr>
+          <a:xfrm>
+            <a:off x="1732853" y="919897"/>
+            <a:ext cx="6325704" cy="0"/>
+          </a:xfrm>
+          <a:prstGeom prst="line">
+            <a:avLst/>
+          </a:prstGeom>
+          <a:ln>
+            <a:solidFill>
+              <a:schemeClr val="bg1"/>
+            </a:solidFill>
+          </a:ln>
+          <a:effectLst/>
+        </p:spPr>
+        <p:style>
+          <a:lnRef idx="1">
+            <a:schemeClr val="accent1"/>
+          </a:lnRef>
+          <a:fillRef idx="0">
+            <a:schemeClr val="accent1"/>
+          </a:fillRef>
+          <a:effectRef idx="0">
+            <a:schemeClr val="accent1"/>
+          </a:effectRef>
+          <a:fontRef idx="minor">
+            <a:schemeClr val="tx1"/>
+          </a:fontRef>
+        </p:style>
+      </p:cxnSp>
+      <p:grpSp>
+        <p:nvGrpSpPr>
+          <p:cNvPr id="2" name="Agrupar 1"/>
+          <p:cNvGrpSpPr/>
+          <p:nvPr/>
+        </p:nvGrpSpPr>
+        <p:grpSpPr>
+          <a:xfrm>
+            <a:off x="349861" y="281269"/>
+            <a:ext cx="2178122" cy="2178122"/>
+            <a:chOff x="734174" y="2338243"/>
+            <a:chExt cx="2178122" cy="2178122"/>
+          </a:xfrm>
+        </p:grpSpPr>
+        <p:sp>
+          <p:nvSpPr>
+            <p:cNvPr id="17" name="Elipse 16"/>
+            <p:cNvSpPr/>
+            <p:nvPr/>
+          </p:nvSpPr>
+          <p:spPr>
+            <a:xfrm>
+              <a:off x="734174" y="2338243"/>
+              <a:ext cx="2178122" cy="2178122"/>
+            </a:xfrm>
+            <a:prstGeom prst="ellipse">
+              <a:avLst/>
+            </a:prstGeom>
+            <a:solidFill>
+              <a:schemeClr val="bg1"/>
+            </a:solidFill>
+            <a:ln>
+              <a:noFill/>
+            </a:ln>
+            <a:effectLst>
+              <a:outerShdw blurRad="50800" dist="38100" dir="2700000" algn="tl" rotWithShape="0">
+                <a:prstClr val="black">
+                  <a:alpha val="40000"/>
+                </a:prstClr>
+              </a:outerShdw>
+            </a:effectLst>
+          </p:spPr>
+          <p:style>
+            <a:lnRef idx="2">
+              <a:schemeClr val="accent1">
+                <a:shade val="50000"/>
+              </a:schemeClr>
+            </a:lnRef>
+            <a:fillRef idx="1">
+              <a:schemeClr val="accent1"/>
+            </a:fillRef>
+            <a:effectRef idx="0">
+              <a:schemeClr val="accent1"/>
+            </a:effectRef>
+            <a:fontRef idx="minor">
+              <a:schemeClr val="lt1"/>
+            </a:fontRef>
+          </p:style>
+          <p:txBody>
+            <a:bodyPr rtlCol="0" anchor="ctr"/>
+            <a:lstStyle/>
+            <a:p>
+              <a:pPr algn="ctr"/>
+              <a:endParaRPr lang="pt-BR"/>
+            </a:p>
+          </p:txBody>
+        </p:sp>
+        <p:pic>
+          <p:nvPicPr>
+            <p:cNvPr id="23" name="Imagem 22"/>
+            <p:cNvPicPr>
+              <a:picLocks noChangeAspect="1"/>
+            </p:cNvPicPr>
+            <p:nvPr/>
+          </p:nvPicPr>
+          <p:blipFill>
+            <a:blip r:embed="rId4" cstate="print">
+              <a:extLst>
+                <a:ext uri="{28A0092B-C50C-407E-A947-70E740481C1C}">
+                  <a14:useLocalDpi xmlns:a14="http://schemas.microsoft.com/office/drawing/2010/main" val="0"/>
+                </a:ext>
+              </a:extLst>
+            </a:blip>
+            <a:stretch>
+              <a:fillRect/>
+            </a:stretch>
+          </p:blipFill>
+          <p:spPr>
+            <a:xfrm>
+              <a:off x="1022293" y="2444571"/>
+              <a:ext cx="1601884" cy="1601884"/>
+            </a:xfrm>
+            <a:prstGeom prst="rect">
+              <a:avLst/>
+            </a:prstGeom>
+          </p:spPr>
+        </p:pic>
+      </p:grpSp>
+      <p:cxnSp>
+        <p:nvCxnSpPr>
+          <p:cNvPr id="31" name="Conector reto 30">
+            <a:extLst>
+              <a:ext uri="{FF2B5EF4-FFF2-40B4-BE49-F238E27FC236}">
+                <a16:creationId xmlns:a16="http://schemas.microsoft.com/office/drawing/2014/main" id="{6510727C-C843-4D84-A07F-20F37366891D}"/>
+              </a:ext>
+            </a:extLst>
+          </p:cNvPr>
+          <p:cNvCxnSpPr/>
+          <p:nvPr/>
+        </p:nvCxnSpPr>
+        <p:spPr>
+          <a:xfrm>
+            <a:off x="3985723" y="2322177"/>
+            <a:ext cx="6325704" cy="0"/>
+          </a:xfrm>
+          <a:prstGeom prst="line">
+            <a:avLst/>
+          </a:prstGeom>
+          <a:ln>
+            <a:solidFill>
+              <a:schemeClr val="bg1"/>
+            </a:solidFill>
+          </a:ln>
+          <a:effectLst/>
+        </p:spPr>
+        <p:style>
+          <a:lnRef idx="1">
+            <a:schemeClr val="accent1"/>
+          </a:lnRef>
+          <a:fillRef idx="0">
+            <a:schemeClr val="accent1"/>
+          </a:fillRef>
+          <a:effectRef idx="0">
+            <a:schemeClr val="accent1"/>
+          </a:effectRef>
+          <a:fontRef idx="minor">
+            <a:schemeClr val="tx1"/>
+          </a:fontRef>
+        </p:style>
+      </p:cxnSp>
+      <p:sp>
+        <p:nvSpPr>
+          <p:cNvPr id="29" name="Retângulo 28"/>
+          <p:cNvSpPr/>
+          <p:nvPr/>
+        </p:nvSpPr>
+        <p:spPr>
+          <a:xfrm>
+            <a:off x="2585311" y="443535"/>
+            <a:ext cx="3026685" cy="461665"/>
+          </a:xfrm>
+          <a:prstGeom prst="rect">
+            <a:avLst/>
+          </a:prstGeom>
+          <a:noFill/>
+          <a:effectLst/>
+        </p:spPr>
+        <p:txBody>
+          <a:bodyPr wrap="square" lIns="91440" tIns="45720" rIns="91440" bIns="45720">
+            <a:spAutoFit/>
+          </a:bodyPr>
+          <a:lstStyle/>
+          <a:p>
+            <a:r>
+              <a:rPr lang="pt-BR" sz="2400" b="1" dirty="0" smtClean="0">
+                <a:ln w="0"/>
+                <a:solidFill>
+                  <a:schemeClr val="bg1"/>
+                </a:solidFill>
+                <a:effectLst>
+                  <a:outerShdw blurRad="38100" dist="19050" dir="2700000" algn="tl" rotWithShape="0">
+                    <a:schemeClr val="dk1">
+                      <a:alpha val="40000"/>
+                    </a:schemeClr>
+                  </a:outerShdw>
+                </a:effectLst>
+                <a:latin typeface="Exo 2 Medium" panose="00000600000000000000" pitchFamily="50" charset="0"/>
+              </a:rPr>
+              <a:t>Lucas </a:t>
+            </a:r>
+            <a:r>
+              <a:rPr lang="pt-BR" sz="2400" b="1" dirty="0" err="1" smtClean="0">
+                <a:ln w="0"/>
+                <a:solidFill>
+                  <a:schemeClr val="bg1"/>
+                </a:solidFill>
+                <a:effectLst>
+                  <a:outerShdw blurRad="38100" dist="19050" dir="2700000" algn="tl" rotWithShape="0">
+                    <a:schemeClr val="dk1">
+                      <a:alpha val="40000"/>
+                    </a:schemeClr>
+                  </a:outerShdw>
+                </a:effectLst>
+                <a:latin typeface="Exo 2 Medium" panose="00000600000000000000" pitchFamily="50" charset="0"/>
+              </a:rPr>
+              <a:t>Yudi</a:t>
+            </a:r>
+            <a:r>
+              <a:rPr lang="pt-BR" sz="2400" b="1" dirty="0" smtClean="0">
+                <a:ln w="0"/>
+                <a:solidFill>
+                  <a:schemeClr val="bg1"/>
+                </a:solidFill>
+                <a:effectLst>
+                  <a:outerShdw blurRad="38100" dist="19050" dir="2700000" algn="tl" rotWithShape="0">
+                    <a:schemeClr val="dk1">
+                      <a:alpha val="40000"/>
+                    </a:schemeClr>
+                  </a:outerShdw>
+                </a:effectLst>
+                <a:latin typeface="Exo 2 Medium" panose="00000600000000000000" pitchFamily="50" charset="0"/>
+              </a:rPr>
+              <a:t> </a:t>
+            </a:r>
+            <a:r>
+              <a:rPr lang="pt-BR" sz="2400" b="1" dirty="0" err="1" smtClean="0">
+                <a:ln w="0"/>
+                <a:solidFill>
+                  <a:schemeClr val="bg1"/>
+                </a:solidFill>
+                <a:effectLst>
+                  <a:outerShdw blurRad="38100" dist="19050" dir="2700000" algn="tl" rotWithShape="0">
+                    <a:schemeClr val="dk1">
+                      <a:alpha val="40000"/>
+                    </a:schemeClr>
+                  </a:outerShdw>
+                </a:effectLst>
+                <a:latin typeface="Exo 2 Medium" panose="00000600000000000000" pitchFamily="50" charset="0"/>
+              </a:rPr>
+              <a:t>Ganeko</a:t>
+            </a:r>
+            <a:endParaRPr lang="pt-BR" sz="2400" b="1" cap="none" spc="0" dirty="0">
+              <a:ln w="0"/>
+              <a:solidFill>
+                <a:schemeClr val="bg1"/>
+              </a:solidFill>
+              <a:effectLst>
+                <a:outerShdw blurRad="38100" dist="19050" dir="2700000" algn="tl" rotWithShape="0">
+                  <a:schemeClr val="dk1">
+                    <a:alpha val="40000"/>
+                  </a:schemeClr>
+                </a:outerShdw>
+              </a:effectLst>
+              <a:latin typeface="Exo 2 Medium" panose="00000600000000000000" pitchFamily="50" charset="0"/>
+            </a:endParaRPr>
+          </a:p>
+        </p:txBody>
+      </p:sp>
+      <p:cxnSp>
+        <p:nvCxnSpPr>
+          <p:cNvPr id="39" name="Conector reto 38">
+            <a:extLst>
+              <a:ext uri="{FF2B5EF4-FFF2-40B4-BE49-F238E27FC236}">
+                <a16:creationId xmlns:a16="http://schemas.microsoft.com/office/drawing/2014/main" id="{6510727C-C843-4D84-A07F-20F37366891D}"/>
+              </a:ext>
+            </a:extLst>
+          </p:cNvPr>
+          <p:cNvCxnSpPr/>
+          <p:nvPr/>
+        </p:nvCxnSpPr>
+        <p:spPr>
+          <a:xfrm>
+            <a:off x="4211010" y="5136284"/>
+            <a:ext cx="6325704" cy="0"/>
+          </a:xfrm>
+          <a:prstGeom prst="line">
+            <a:avLst/>
+          </a:prstGeom>
+          <a:ln>
+            <a:solidFill>
+              <a:schemeClr val="bg1"/>
+            </a:solidFill>
+          </a:ln>
+          <a:effectLst/>
+        </p:spPr>
+        <p:style>
+          <a:lnRef idx="1">
+            <a:schemeClr val="accent1"/>
+          </a:lnRef>
+          <a:fillRef idx="0">
+            <a:schemeClr val="accent1"/>
+          </a:fillRef>
+          <a:effectRef idx="0">
+            <a:schemeClr val="accent1"/>
+          </a:effectRef>
+          <a:fontRef idx="minor">
+            <a:schemeClr val="tx1"/>
+          </a:fontRef>
+        </p:style>
+      </p:cxnSp>
+      <p:grpSp>
+        <p:nvGrpSpPr>
+          <p:cNvPr id="3" name="Agrupar 2"/>
+          <p:cNvGrpSpPr/>
+          <p:nvPr/>
+        </p:nvGrpSpPr>
+        <p:grpSpPr>
+          <a:xfrm>
+            <a:off x="9685873" y="1607817"/>
+            <a:ext cx="2178122" cy="2178122"/>
+            <a:chOff x="3576620" y="2312259"/>
+            <a:chExt cx="2178122" cy="2178122"/>
+          </a:xfrm>
+        </p:grpSpPr>
+        <p:sp>
+          <p:nvSpPr>
+            <p:cNvPr id="24" name="Elipse 23"/>
+            <p:cNvSpPr/>
+            <p:nvPr/>
+          </p:nvSpPr>
+          <p:spPr>
+            <a:xfrm>
+              <a:off x="3576620" y="2312259"/>
+              <a:ext cx="2178122" cy="2178122"/>
+            </a:xfrm>
+            <a:prstGeom prst="ellipse">
+              <a:avLst/>
+            </a:prstGeom>
+            <a:solidFill>
+              <a:schemeClr val="bg1"/>
+            </a:solidFill>
+            <a:ln>
+              <a:noFill/>
+            </a:ln>
+            <a:effectLst>
+              <a:outerShdw blurRad="50800" dist="38100" dir="2700000" algn="tl" rotWithShape="0">
+                <a:prstClr val="black">
+                  <a:alpha val="40000"/>
+                </a:prstClr>
+              </a:outerShdw>
+            </a:effectLst>
+          </p:spPr>
+          <p:style>
+            <a:lnRef idx="2">
+              <a:schemeClr val="accent1">
+                <a:shade val="50000"/>
+              </a:schemeClr>
+            </a:lnRef>
+            <a:fillRef idx="1">
+              <a:schemeClr val="accent1"/>
+            </a:fillRef>
+            <a:effectRef idx="0">
+              <a:schemeClr val="accent1"/>
+            </a:effectRef>
+            <a:fontRef idx="minor">
+              <a:schemeClr val="lt1"/>
+            </a:fontRef>
+          </p:style>
+          <p:txBody>
+            <a:bodyPr rtlCol="0" anchor="ctr"/>
+            <a:lstStyle/>
+            <a:p>
+              <a:pPr algn="ctr"/>
+              <a:endParaRPr lang="pt-BR"/>
+            </a:p>
+          </p:txBody>
+        </p:sp>
+        <p:pic>
+          <p:nvPicPr>
+            <p:cNvPr id="27" name="Imagem 26"/>
+            <p:cNvPicPr>
+              <a:picLocks noChangeAspect="1"/>
+            </p:cNvPicPr>
+            <p:nvPr/>
+          </p:nvPicPr>
+          <p:blipFill>
+            <a:blip r:embed="rId5" cstate="print">
+              <a:extLst>
+                <a:ext uri="{28A0092B-C50C-407E-A947-70E740481C1C}">
+                  <a14:useLocalDpi xmlns:a14="http://schemas.microsoft.com/office/drawing/2010/main" val="0"/>
+                </a:ext>
+              </a:extLst>
+            </a:blip>
+            <a:stretch>
+              <a:fillRect/>
+            </a:stretch>
+          </p:blipFill>
+          <p:spPr>
+            <a:xfrm>
+              <a:off x="3857458" y="2438645"/>
+              <a:ext cx="1607810" cy="1607810"/>
+            </a:xfrm>
+            <a:prstGeom prst="rect">
+              <a:avLst/>
+            </a:prstGeom>
+          </p:spPr>
+        </p:pic>
+      </p:grpSp>
+      <p:cxnSp>
+        <p:nvCxnSpPr>
+          <p:cNvPr id="38" name="Conector reto 37">
+            <a:extLst>
+              <a:ext uri="{FF2B5EF4-FFF2-40B4-BE49-F238E27FC236}">
+                <a16:creationId xmlns:a16="http://schemas.microsoft.com/office/drawing/2014/main" id="{6510727C-C843-4D84-A07F-20F37366891D}"/>
+              </a:ext>
+            </a:extLst>
+          </p:cNvPr>
+          <p:cNvCxnSpPr/>
+          <p:nvPr/>
+        </p:nvCxnSpPr>
+        <p:spPr>
+          <a:xfrm>
+            <a:off x="1564554" y="3699968"/>
+            <a:ext cx="6325704" cy="0"/>
+          </a:xfrm>
+          <a:prstGeom prst="line">
+            <a:avLst/>
+          </a:prstGeom>
+          <a:ln>
+            <a:solidFill>
+              <a:schemeClr val="bg1"/>
+            </a:solidFill>
+          </a:ln>
+          <a:effectLst/>
+        </p:spPr>
+        <p:style>
+          <a:lnRef idx="1">
+            <a:schemeClr val="accent1"/>
+          </a:lnRef>
+          <a:fillRef idx="0">
+            <a:schemeClr val="accent1"/>
+          </a:fillRef>
+          <a:effectRef idx="0">
+            <a:schemeClr val="accent1"/>
+          </a:effectRef>
+          <a:fontRef idx="minor">
+            <a:schemeClr val="tx1"/>
+          </a:fontRef>
+        </p:style>
+      </p:cxnSp>
+      <p:grpSp>
+        <p:nvGrpSpPr>
+          <p:cNvPr id="11" name="Agrupar 10"/>
+          <p:cNvGrpSpPr/>
+          <p:nvPr/>
+        </p:nvGrpSpPr>
+        <p:grpSpPr>
+          <a:xfrm>
+            <a:off x="9694221" y="4478859"/>
+            <a:ext cx="2178122" cy="2178122"/>
+            <a:chOff x="9261512" y="2312259"/>
+            <a:chExt cx="2178122" cy="2178122"/>
+          </a:xfrm>
+        </p:grpSpPr>
+        <p:sp>
+          <p:nvSpPr>
+            <p:cNvPr id="33" name="Elipse 32"/>
+            <p:cNvSpPr/>
+            <p:nvPr/>
+          </p:nvSpPr>
+          <p:spPr>
+            <a:xfrm>
+              <a:off x="9261512" y="2312259"/>
+              <a:ext cx="2178122" cy="2178122"/>
+            </a:xfrm>
+            <a:prstGeom prst="ellipse">
+              <a:avLst/>
+            </a:prstGeom>
+            <a:solidFill>
+              <a:schemeClr val="bg1"/>
+            </a:solidFill>
+            <a:ln>
+              <a:noFill/>
+            </a:ln>
+            <a:effectLst>
+              <a:outerShdw blurRad="50800" dist="38100" dir="2700000" algn="tl" rotWithShape="0">
+                <a:prstClr val="black">
+                  <a:alpha val="40000"/>
+                </a:prstClr>
+              </a:outerShdw>
+            </a:effectLst>
+          </p:spPr>
+          <p:style>
+            <a:lnRef idx="2">
+              <a:schemeClr val="accent1">
+                <a:shade val="50000"/>
+              </a:schemeClr>
+            </a:lnRef>
+            <a:fillRef idx="1">
+              <a:schemeClr val="accent1"/>
+            </a:fillRef>
+            <a:effectRef idx="0">
+              <a:schemeClr val="accent1"/>
+            </a:effectRef>
+            <a:fontRef idx="minor">
+              <a:schemeClr val="lt1"/>
+            </a:fontRef>
+          </p:style>
+          <p:txBody>
+            <a:bodyPr rtlCol="0" anchor="ctr"/>
+            <a:lstStyle/>
+            <a:p>
+              <a:pPr algn="ctr"/>
+              <a:endParaRPr lang="pt-BR"/>
+            </a:p>
+          </p:txBody>
+        </p:sp>
+        <p:pic>
+          <p:nvPicPr>
+            <p:cNvPr id="35" name="Imagem 34"/>
+            <p:cNvPicPr>
+              <a:picLocks noChangeAspect="1"/>
+            </p:cNvPicPr>
+            <p:nvPr/>
+          </p:nvPicPr>
+          <p:blipFill>
+            <a:blip r:embed="rId6" cstate="print">
+              <a:extLst>
+                <a:ext uri="{28A0092B-C50C-407E-A947-70E740481C1C}">
+                  <a14:useLocalDpi xmlns:a14="http://schemas.microsoft.com/office/drawing/2010/main" val="0"/>
+                </a:ext>
+              </a:extLst>
+            </a:blip>
+            <a:stretch>
+              <a:fillRect/>
+            </a:stretch>
+          </p:blipFill>
+          <p:spPr>
+            <a:xfrm>
+              <a:off x="9549631" y="2444571"/>
+              <a:ext cx="1601884" cy="1601884"/>
+            </a:xfrm>
+            <a:prstGeom prst="rect">
+              <a:avLst/>
+            </a:prstGeom>
+          </p:spPr>
+        </p:pic>
+        <p:pic>
+          <p:nvPicPr>
+            <p:cNvPr id="36" name="Picture 8" descr="https://3dsupply.de/en/composition/noob-cap-cap-cap-front~eJwdijkKgDAQRa8SppYwk_xsXkUsBC0CggHTiXc3Y_mWh1qn2QhySbGIE8uToToU7Uff6kkD-78ElwEW7_6lXbdKnbUughgSPEdYXrUPGQW6ag8Z6f0Ad2cYzg==.png"/>
+            <p:cNvPicPr>
+              <a:picLocks noChangeAspect="1" noChangeArrowheads="1"/>
+            </p:cNvPicPr>
+            <p:nvPr/>
+          </p:nvPicPr>
+          <p:blipFill>
+            <a:blip r:embed="rId7" cstate="print">
+              <a:extLst>
+                <a:ext uri="{BEBA8EAE-BF5A-486C-A8C5-ECC9F3942E4B}">
+                  <a14:imgProps xmlns:a14="http://schemas.microsoft.com/office/drawing/2010/main">
+                    <a14:imgLayer r:embed="rId8">
+                      <a14:imgEffect>
+                        <a14:saturation sat="0"/>
+                      </a14:imgEffect>
+                      <a14:imgEffect>
+                        <a14:brightnessContrast bright="-20000" contrast="40000"/>
+                      </a14:imgEffect>
+                    </a14:imgLayer>
+                  </a14:imgProps>
+                </a:ext>
+                <a:ext uri="{28A0092B-C50C-407E-A947-70E740481C1C}">
+                  <a14:useLocalDpi xmlns:a14="http://schemas.microsoft.com/office/drawing/2010/main" val="0"/>
+                </a:ext>
+              </a:extLst>
+            </a:blip>
+            <a:srcRect/>
+            <a:stretch>
+              <a:fillRect/>
+            </a:stretch>
+          </p:blipFill>
+          <p:spPr bwMode="auto">
+            <a:xfrm>
+              <a:off x="9874817" y="2350360"/>
+              <a:ext cx="945583" cy="640312"/>
+            </a:xfrm>
+            <a:prstGeom prst="rect">
+              <a:avLst/>
+            </a:prstGeom>
+            <a:noFill/>
+            <a:extLst>
+              <a:ext uri="{909E8E84-426E-40DD-AFC4-6F175D3DCCD1}">
+                <a14:hiddenFill xmlns:a14="http://schemas.microsoft.com/office/drawing/2010/main">
+                  <a:solidFill>
+                    <a:srgbClr val="FFFFFF"/>
+                  </a:solidFill>
+                </a14:hiddenFill>
+              </a:ext>
+            </a:extLst>
+          </p:spPr>
+        </p:pic>
+      </p:grpSp>
+      <p:grpSp>
+        <p:nvGrpSpPr>
+          <p:cNvPr id="9" name="Agrupar 8"/>
+          <p:cNvGrpSpPr/>
+          <p:nvPr/>
+        </p:nvGrpSpPr>
+        <p:grpSpPr>
+          <a:xfrm>
+            <a:off x="349861" y="3137775"/>
+            <a:ext cx="2178122" cy="2276565"/>
+            <a:chOff x="6419066" y="2210154"/>
+            <a:chExt cx="2178122" cy="2276565"/>
+          </a:xfrm>
+        </p:grpSpPr>
+        <p:sp>
+          <p:nvSpPr>
+            <p:cNvPr id="32" name="Elipse 31"/>
+            <p:cNvSpPr/>
+            <p:nvPr/>
+          </p:nvSpPr>
+          <p:spPr>
+            <a:xfrm>
+              <a:off x="6419066" y="2308597"/>
+              <a:ext cx="2178122" cy="2178122"/>
+            </a:xfrm>
+            <a:prstGeom prst="ellipse">
+              <a:avLst/>
+            </a:prstGeom>
+            <a:solidFill>
+              <a:schemeClr val="bg1"/>
+            </a:solidFill>
+            <a:ln>
+              <a:noFill/>
+            </a:ln>
+            <a:effectLst>
+              <a:outerShdw blurRad="50800" dist="38100" dir="2700000" algn="tl" rotWithShape="0">
+                <a:prstClr val="black">
+                  <a:alpha val="40000"/>
+                </a:prstClr>
+              </a:outerShdw>
+            </a:effectLst>
+          </p:spPr>
+          <p:style>
+            <a:lnRef idx="2">
+              <a:schemeClr val="accent1">
+                <a:shade val="50000"/>
+              </a:schemeClr>
+            </a:lnRef>
+            <a:fillRef idx="1">
+              <a:schemeClr val="accent1"/>
+            </a:fillRef>
+            <a:effectRef idx="0">
+              <a:schemeClr val="accent1"/>
+            </a:effectRef>
+            <a:fontRef idx="minor">
+              <a:schemeClr val="lt1"/>
+            </a:fontRef>
+          </p:style>
+          <p:txBody>
+            <a:bodyPr rtlCol="0" anchor="ctr"/>
+            <a:lstStyle/>
+            <a:p>
+              <a:pPr algn="ctr"/>
+              <a:endParaRPr lang="pt-BR"/>
+            </a:p>
+          </p:txBody>
+        </p:sp>
+        <p:pic>
+          <p:nvPicPr>
+            <p:cNvPr id="34" name="Imagem 33"/>
+            <p:cNvPicPr>
+              <a:picLocks noChangeAspect="1"/>
+            </p:cNvPicPr>
+            <p:nvPr/>
+          </p:nvPicPr>
+          <p:blipFill>
+            <a:blip r:embed="rId9" cstate="print">
+              <a:extLst>
+                <a:ext uri="{28A0092B-C50C-407E-A947-70E740481C1C}">
+                  <a14:useLocalDpi xmlns:a14="http://schemas.microsoft.com/office/drawing/2010/main" val="0"/>
+                </a:ext>
+              </a:extLst>
+            </a:blip>
+            <a:stretch>
+              <a:fillRect/>
+            </a:stretch>
+          </p:blipFill>
+          <p:spPr>
+            <a:xfrm>
+              <a:off x="6696093" y="2444571"/>
+              <a:ext cx="1601884" cy="1601884"/>
+            </a:xfrm>
+            <a:prstGeom prst="rect">
+              <a:avLst/>
+            </a:prstGeom>
+          </p:spPr>
+        </p:pic>
+        <p:pic>
+          <p:nvPicPr>
+            <p:cNvPr id="37" name="Picture 2" descr="Imagem relacionada"/>
+            <p:cNvPicPr>
+              <a:picLocks noChangeAspect="1" noChangeArrowheads="1"/>
+            </p:cNvPicPr>
+            <p:nvPr/>
+          </p:nvPicPr>
+          <p:blipFill>
+            <a:blip r:embed="rId10">
+              <a:duotone>
+                <a:prstClr val="black"/>
+                <a:schemeClr val="accent1">
+                  <a:tint val="45000"/>
+                  <a:satMod val="400000"/>
+                </a:schemeClr>
+              </a:duotone>
+              <a:extLst>
+                <a:ext uri="{BEBA8EAE-BF5A-486C-A8C5-ECC9F3942E4B}">
+                  <a14:imgProps xmlns:a14="http://schemas.microsoft.com/office/drawing/2010/main">
+                    <a14:imgLayer r:embed="rId11">
+                      <a14:imgEffect>
+                        <a14:backgroundRemoval t="19588" b="85052" l="1799" r="96403"/>
+                      </a14:imgEffect>
+                      <a14:imgEffect>
+                        <a14:brightnessContrast bright="-40000" contrast="-40000"/>
+                      </a14:imgEffect>
+                    </a14:imgLayer>
+                  </a14:imgProps>
+                </a:ext>
+                <a:ext uri="{28A0092B-C50C-407E-A947-70E740481C1C}">
+                  <a14:useLocalDpi xmlns:a14="http://schemas.microsoft.com/office/drawing/2010/main" val="0"/>
+                </a:ext>
+              </a:extLst>
+            </a:blip>
+            <a:srcRect/>
+            <a:stretch>
+              <a:fillRect/>
+            </a:stretch>
+          </p:blipFill>
+          <p:spPr bwMode="auto">
+            <a:xfrm flipH="1">
+              <a:off x="6911523" y="2210154"/>
+              <a:ext cx="1091511" cy="925514"/>
+            </a:xfrm>
+            <a:prstGeom prst="rect">
+              <a:avLst/>
+            </a:prstGeom>
+            <a:noFill/>
+            <a:extLst>
+              <a:ext uri="{909E8E84-426E-40DD-AFC4-6F175D3DCCD1}">
+                <a14:hiddenFill xmlns:a14="http://schemas.microsoft.com/office/drawing/2010/main">
+                  <a:solidFill>
+                    <a:srgbClr val="FFFFFF"/>
+                  </a:solidFill>
+                </a14:hiddenFill>
+              </a:ext>
+            </a:extLst>
+          </p:spPr>
+        </p:pic>
+      </p:grpSp>
+      <p:sp>
+        <p:nvSpPr>
+          <p:cNvPr id="40" name="Retângulo 39"/>
+          <p:cNvSpPr/>
+          <p:nvPr/>
+        </p:nvSpPr>
+        <p:spPr>
+          <a:xfrm>
+            <a:off x="6893547" y="1848190"/>
+            <a:ext cx="2892989" cy="461665"/>
+          </a:xfrm>
+          <a:prstGeom prst="rect">
+            <a:avLst/>
+          </a:prstGeom>
+          <a:noFill/>
+          <a:effectLst/>
+        </p:spPr>
+        <p:txBody>
+          <a:bodyPr wrap="square" lIns="91440" tIns="45720" rIns="91440" bIns="45720">
+            <a:spAutoFit/>
+          </a:bodyPr>
+          <a:lstStyle/>
+          <a:p>
+            <a:pPr algn="ctr"/>
+            <a:r>
+              <a:rPr lang="pt-BR" sz="2400" b="1" dirty="0" smtClean="0">
+                <a:ln w="0"/>
+                <a:solidFill>
+                  <a:schemeClr val="bg1"/>
+                </a:solidFill>
+                <a:effectLst>
+                  <a:outerShdw blurRad="38100" dist="19050" dir="2700000" algn="tl" rotWithShape="0">
+                    <a:schemeClr val="dk1">
+                      <a:alpha val="40000"/>
+                    </a:schemeClr>
+                  </a:outerShdw>
+                </a:effectLst>
+                <a:latin typeface="Exo 2 Medium" panose="00000600000000000000" pitchFamily="50" charset="0"/>
+              </a:rPr>
+              <a:t>Rodolfo Gregório</a:t>
+            </a:r>
+            <a:endParaRPr lang="pt-BR" sz="2400" b="1" cap="none" spc="0" dirty="0">
+              <a:ln w="0"/>
+              <a:solidFill>
+                <a:schemeClr val="bg1"/>
+              </a:solidFill>
+              <a:effectLst>
+                <a:outerShdw blurRad="38100" dist="19050" dir="2700000" algn="tl" rotWithShape="0">
+                  <a:schemeClr val="dk1">
+                    <a:alpha val="40000"/>
+                  </a:schemeClr>
+                </a:outerShdw>
+              </a:effectLst>
+              <a:latin typeface="Exo 2 Medium" panose="00000600000000000000" pitchFamily="50" charset="0"/>
+            </a:endParaRPr>
+          </a:p>
+        </p:txBody>
+      </p:sp>
+      <p:sp>
+        <p:nvSpPr>
+          <p:cNvPr id="41" name="Retângulo 40"/>
+          <p:cNvSpPr/>
+          <p:nvPr/>
+        </p:nvSpPr>
+        <p:spPr>
+          <a:xfrm>
+            <a:off x="6511095" y="4667275"/>
+            <a:ext cx="3185689" cy="461665"/>
+          </a:xfrm>
+          <a:prstGeom prst="rect">
+            <a:avLst/>
+          </a:prstGeom>
+          <a:noFill/>
+          <a:effectLst/>
+        </p:spPr>
+        <p:txBody>
+          <a:bodyPr wrap="square" lIns="91440" tIns="45720" rIns="91440" bIns="45720">
+            <a:spAutoFit/>
+          </a:bodyPr>
+          <a:lstStyle/>
+          <a:p>
+            <a:pPr algn="ctr"/>
+            <a:r>
+              <a:rPr lang="pt-BR" sz="2400" b="1" dirty="0" smtClean="0">
+                <a:ln w="0"/>
+                <a:solidFill>
+                  <a:schemeClr val="bg1"/>
+                </a:solidFill>
+                <a:effectLst>
+                  <a:outerShdw blurRad="38100" dist="19050" dir="2700000" algn="tl" rotWithShape="0">
+                    <a:schemeClr val="dk1">
+                      <a:alpha val="40000"/>
+                    </a:schemeClr>
+                  </a:outerShdw>
+                </a:effectLst>
+                <a:latin typeface="Exo 2 Medium" panose="00000600000000000000" pitchFamily="50" charset="0"/>
+              </a:rPr>
+              <a:t>Matheus de Oliveira</a:t>
+            </a:r>
+            <a:endParaRPr lang="pt-BR" sz="2400" b="1" cap="none" spc="0" dirty="0">
+              <a:ln w="0"/>
+              <a:solidFill>
+                <a:schemeClr val="bg1"/>
+              </a:solidFill>
+              <a:effectLst>
+                <a:outerShdw blurRad="38100" dist="19050" dir="2700000" algn="tl" rotWithShape="0">
+                  <a:schemeClr val="dk1">
+                    <a:alpha val="40000"/>
+                  </a:schemeClr>
+                </a:outerShdw>
+              </a:effectLst>
+              <a:latin typeface="Exo 2 Medium" panose="00000600000000000000" pitchFamily="50" charset="0"/>
+            </a:endParaRPr>
+          </a:p>
+        </p:txBody>
+      </p:sp>
+      <p:sp>
+        <p:nvSpPr>
+          <p:cNvPr id="42" name="Retângulo 41"/>
+          <p:cNvSpPr/>
+          <p:nvPr/>
+        </p:nvSpPr>
+        <p:spPr>
+          <a:xfrm>
+            <a:off x="2100752" y="3226768"/>
+            <a:ext cx="3185689" cy="461665"/>
+          </a:xfrm>
+          <a:prstGeom prst="rect">
+            <a:avLst/>
+          </a:prstGeom>
+          <a:noFill/>
+          <a:effectLst/>
+        </p:spPr>
+        <p:txBody>
+          <a:bodyPr wrap="square" lIns="91440" tIns="45720" rIns="91440" bIns="45720">
+            <a:spAutoFit/>
+          </a:bodyPr>
+          <a:lstStyle/>
+          <a:p>
+            <a:pPr algn="ctr"/>
+            <a:r>
+              <a:rPr lang="pt-BR" sz="2400" b="1" dirty="0" smtClean="0">
+                <a:ln w="0"/>
+                <a:solidFill>
+                  <a:schemeClr val="bg1"/>
+                </a:solidFill>
+                <a:effectLst>
+                  <a:outerShdw blurRad="38100" dist="19050" dir="2700000" algn="tl" rotWithShape="0">
+                    <a:schemeClr val="dk1">
+                      <a:alpha val="40000"/>
+                    </a:schemeClr>
+                  </a:outerShdw>
+                </a:effectLst>
+                <a:latin typeface="Exo 2 Medium" panose="00000600000000000000" pitchFamily="50" charset="0"/>
+              </a:rPr>
+              <a:t>Lucas Bezerra</a:t>
+            </a:r>
+            <a:endParaRPr lang="pt-BR" sz="2400" b="1" cap="none" spc="0" dirty="0">
+              <a:ln w="0"/>
+              <a:solidFill>
+                <a:schemeClr val="bg1"/>
+              </a:solidFill>
+              <a:effectLst>
+                <a:outerShdw blurRad="38100" dist="19050" dir="2700000" algn="tl" rotWithShape="0">
+                  <a:schemeClr val="dk1">
+                    <a:alpha val="40000"/>
+                  </a:schemeClr>
+                </a:outerShdw>
+              </a:effectLst>
+              <a:latin typeface="Exo 2 Medium" panose="00000600000000000000" pitchFamily="50" charset="0"/>
+            </a:endParaRPr>
+          </a:p>
+        </p:txBody>
+      </p:sp>
+      <p:sp>
+        <p:nvSpPr>
+          <p:cNvPr id="50" name="Retângulo 49"/>
+          <p:cNvSpPr/>
+          <p:nvPr/>
+        </p:nvSpPr>
+        <p:spPr>
+          <a:xfrm>
+            <a:off x="2588983" y="945156"/>
+            <a:ext cx="6342982" cy="923330"/>
+          </a:xfrm>
+          <a:prstGeom prst="rect">
+            <a:avLst/>
+          </a:prstGeom>
+          <a:noFill/>
+          <a:effectLst/>
+        </p:spPr>
+        <p:txBody>
+          <a:bodyPr wrap="square" lIns="91440" tIns="45720" rIns="91440" bIns="45720">
+            <a:spAutoFit/>
+          </a:bodyPr>
+          <a:lstStyle/>
+          <a:p>
+            <a:r>
+              <a:rPr lang="pt-BR" b="1" cap="none" spc="0" dirty="0" smtClean="0">
+                <a:ln w="0"/>
+                <a:solidFill>
+                  <a:schemeClr val="bg1"/>
+                </a:solidFill>
+                <a:effectLst>
+                  <a:outerShdw blurRad="38100" dist="19050" dir="2700000" algn="tl" rotWithShape="0">
+                    <a:schemeClr val="dk1">
+                      <a:alpha val="40000"/>
+                    </a:schemeClr>
+                  </a:outerShdw>
+                </a:effectLst>
+                <a:latin typeface="Exo 2 Extra Light" panose="00000300000000000000" pitchFamily="50" charset="0"/>
+              </a:rPr>
+              <a:t>Desenvolvimento front-</a:t>
+            </a:r>
+            <a:r>
+              <a:rPr lang="pt-BR" b="1" cap="none" spc="0" dirty="0" err="1" smtClean="0">
+                <a:ln w="0"/>
+                <a:solidFill>
+                  <a:schemeClr val="bg1"/>
+                </a:solidFill>
+                <a:effectLst>
+                  <a:outerShdw blurRad="38100" dist="19050" dir="2700000" algn="tl" rotWithShape="0">
+                    <a:schemeClr val="dk1">
+                      <a:alpha val="40000"/>
+                    </a:schemeClr>
+                  </a:outerShdw>
+                </a:effectLst>
+                <a:latin typeface="Exo 2 Extra Light" panose="00000300000000000000" pitchFamily="50" charset="0"/>
+              </a:rPr>
+              <a:t>end</a:t>
+            </a:r>
+            <a:endParaRPr lang="pt-BR" b="1" cap="none" spc="0" dirty="0" smtClean="0">
+              <a:ln w="0"/>
+              <a:solidFill>
+                <a:schemeClr val="bg1"/>
+              </a:solidFill>
+              <a:effectLst>
+                <a:outerShdw blurRad="38100" dist="19050" dir="2700000" algn="tl" rotWithShape="0">
+                  <a:schemeClr val="dk1">
+                    <a:alpha val="40000"/>
+                  </a:schemeClr>
+                </a:outerShdw>
+              </a:effectLst>
+              <a:latin typeface="Exo 2 Extra Light" panose="00000300000000000000" pitchFamily="50" charset="0"/>
+            </a:endParaRPr>
+          </a:p>
+          <a:p>
+            <a:r>
+              <a:rPr lang="pt-BR" b="1" dirty="0" smtClean="0">
+                <a:ln w="0"/>
+                <a:solidFill>
+                  <a:schemeClr val="bg1"/>
+                </a:solidFill>
+                <a:effectLst>
+                  <a:outerShdw blurRad="38100" dist="19050" dir="2700000" algn="tl" rotWithShape="0">
+                    <a:schemeClr val="dk1">
+                      <a:alpha val="40000"/>
+                    </a:schemeClr>
+                  </a:outerShdw>
+                </a:effectLst>
+                <a:latin typeface="Exo 2 Extra Light" panose="00000300000000000000" pitchFamily="50" charset="0"/>
+              </a:rPr>
+              <a:t>Planejamento </a:t>
+            </a:r>
+            <a:r>
+              <a:rPr lang="pt-BR" b="1" dirty="0">
+                <a:ln w="0"/>
+                <a:solidFill>
+                  <a:schemeClr val="bg1"/>
+                </a:solidFill>
+                <a:effectLst>
+                  <a:outerShdw blurRad="38100" dist="19050" dir="2700000" algn="tl" rotWithShape="0">
+                    <a:schemeClr val="dk1">
+                      <a:alpha val="40000"/>
+                    </a:schemeClr>
+                  </a:outerShdw>
+                </a:effectLst>
+                <a:latin typeface="Exo 2 Extra Light" panose="00000300000000000000" pitchFamily="50" charset="0"/>
+              </a:rPr>
+              <a:t>do </a:t>
+            </a:r>
+            <a:r>
+              <a:rPr lang="pt-BR" b="1" dirty="0" smtClean="0">
+                <a:ln w="0"/>
+                <a:solidFill>
+                  <a:schemeClr val="bg1"/>
+                </a:solidFill>
+                <a:effectLst>
+                  <a:outerShdw blurRad="38100" dist="19050" dir="2700000" algn="tl" rotWithShape="0">
+                    <a:schemeClr val="dk1">
+                      <a:alpha val="40000"/>
+                    </a:schemeClr>
+                  </a:outerShdw>
+                </a:effectLst>
+                <a:latin typeface="Exo 2 Extra Light" panose="00000300000000000000" pitchFamily="50" charset="0"/>
+              </a:rPr>
+              <a:t>projeto </a:t>
+            </a:r>
+            <a:endParaRPr lang="pt-BR" b="1" cap="none" spc="0" dirty="0" smtClean="0">
+              <a:ln w="0"/>
+              <a:solidFill>
+                <a:schemeClr val="bg1"/>
+              </a:solidFill>
+              <a:effectLst>
+                <a:outerShdw blurRad="38100" dist="19050" dir="2700000" algn="tl" rotWithShape="0">
+                  <a:schemeClr val="dk1">
+                    <a:alpha val="40000"/>
+                  </a:schemeClr>
+                </a:outerShdw>
+              </a:effectLst>
+              <a:latin typeface="Exo 2 Extra Light" panose="00000300000000000000" pitchFamily="50" charset="0"/>
+            </a:endParaRPr>
+          </a:p>
+          <a:p>
+            <a:r>
+              <a:rPr lang="pt-BR" b="1" dirty="0">
+                <a:ln w="0"/>
+                <a:solidFill>
+                  <a:schemeClr val="bg1"/>
+                </a:solidFill>
+                <a:effectLst>
+                  <a:outerShdw blurRad="38100" dist="19050" dir="2700000" algn="tl" rotWithShape="0">
+                    <a:schemeClr val="dk1">
+                      <a:alpha val="40000"/>
+                    </a:schemeClr>
+                  </a:outerShdw>
+                </a:effectLst>
+                <a:latin typeface="Exo 2 Extra Light" panose="00000300000000000000" pitchFamily="50" charset="0"/>
+              </a:rPr>
+              <a:t>D</a:t>
+            </a:r>
+            <a:r>
+              <a:rPr lang="pt-BR" b="1" dirty="0" smtClean="0">
+                <a:ln w="0"/>
+                <a:solidFill>
+                  <a:schemeClr val="bg1"/>
+                </a:solidFill>
+                <a:effectLst>
+                  <a:outerShdw blurRad="38100" dist="19050" dir="2700000" algn="tl" rotWithShape="0">
+                    <a:schemeClr val="dk1">
+                      <a:alpha val="40000"/>
+                    </a:schemeClr>
+                  </a:outerShdw>
+                </a:effectLst>
+                <a:latin typeface="Exo 2 Extra Light" panose="00000300000000000000" pitchFamily="50" charset="0"/>
+              </a:rPr>
+              <a:t>ocumentação do projeto    </a:t>
+            </a:r>
+            <a:endParaRPr lang="pt-BR" b="1" cap="none" spc="0" dirty="0" smtClean="0">
+              <a:ln w="0"/>
+              <a:solidFill>
+                <a:schemeClr val="bg1"/>
+              </a:solidFill>
+              <a:effectLst>
+                <a:outerShdw blurRad="38100" dist="19050" dir="2700000" algn="tl" rotWithShape="0">
+                  <a:schemeClr val="dk1">
+                    <a:alpha val="40000"/>
+                  </a:schemeClr>
+                </a:outerShdw>
+              </a:effectLst>
+              <a:latin typeface="Exo 2 Extra Light" panose="00000300000000000000" pitchFamily="50" charset="0"/>
+            </a:endParaRPr>
+          </a:p>
+        </p:txBody>
+      </p:sp>
+      <p:sp>
+        <p:nvSpPr>
+          <p:cNvPr id="51" name="Retângulo 50"/>
+          <p:cNvSpPr/>
+          <p:nvPr/>
+        </p:nvSpPr>
+        <p:spPr>
+          <a:xfrm>
+            <a:off x="3260035" y="2339232"/>
+            <a:ext cx="6361182" cy="923330"/>
+          </a:xfrm>
+          <a:prstGeom prst="rect">
+            <a:avLst/>
+          </a:prstGeom>
+          <a:noFill/>
+          <a:effectLst/>
+        </p:spPr>
+        <p:txBody>
+          <a:bodyPr wrap="square" lIns="91440" tIns="45720" rIns="91440" bIns="45720">
+            <a:spAutoFit/>
+          </a:bodyPr>
+          <a:lstStyle/>
+          <a:p>
+            <a:pPr algn="r"/>
+            <a:r>
+              <a:rPr lang="pt-BR" b="1" cap="none" spc="0" dirty="0" smtClean="0">
+                <a:ln w="0"/>
+                <a:solidFill>
+                  <a:schemeClr val="bg1"/>
+                </a:solidFill>
+                <a:effectLst>
+                  <a:outerShdw blurRad="38100" dist="19050" dir="2700000" algn="tl" rotWithShape="0">
+                    <a:schemeClr val="dk1">
+                      <a:alpha val="40000"/>
+                    </a:schemeClr>
+                  </a:outerShdw>
+                </a:effectLst>
+                <a:latin typeface="Exo 2 Extra Light" panose="00000300000000000000" pitchFamily="50" charset="0"/>
+              </a:rPr>
+              <a:t>Desenvolvimento </a:t>
+            </a:r>
+            <a:r>
+              <a:rPr lang="pt-BR" b="1" cap="none" spc="0" dirty="0" err="1" smtClean="0">
+                <a:ln w="0"/>
+                <a:solidFill>
+                  <a:schemeClr val="bg1"/>
+                </a:solidFill>
+                <a:effectLst>
+                  <a:outerShdw blurRad="38100" dist="19050" dir="2700000" algn="tl" rotWithShape="0">
+                    <a:schemeClr val="dk1">
+                      <a:alpha val="40000"/>
+                    </a:schemeClr>
+                  </a:outerShdw>
+                </a:effectLst>
+                <a:latin typeface="Exo 2 Extra Light" panose="00000300000000000000" pitchFamily="50" charset="0"/>
+              </a:rPr>
+              <a:t>back-end</a:t>
+            </a:r>
+            <a:endParaRPr lang="pt-BR" b="1" cap="none" spc="0" dirty="0" smtClean="0">
+              <a:ln w="0"/>
+              <a:solidFill>
+                <a:schemeClr val="bg1"/>
+              </a:solidFill>
+              <a:effectLst>
+                <a:outerShdw blurRad="38100" dist="19050" dir="2700000" algn="tl" rotWithShape="0">
+                  <a:schemeClr val="dk1">
+                    <a:alpha val="40000"/>
+                  </a:schemeClr>
+                </a:outerShdw>
+              </a:effectLst>
+              <a:latin typeface="Exo 2 Extra Light" panose="00000300000000000000" pitchFamily="50" charset="0"/>
+            </a:endParaRPr>
+          </a:p>
+          <a:p>
+            <a:pPr algn="r"/>
+            <a:r>
+              <a:rPr lang="pt-BR" b="1" dirty="0" smtClean="0">
+                <a:ln w="0"/>
+                <a:solidFill>
+                  <a:schemeClr val="bg1"/>
+                </a:solidFill>
+                <a:effectLst>
+                  <a:outerShdw blurRad="38100" dist="19050" dir="2700000" algn="tl" rotWithShape="0">
+                    <a:schemeClr val="dk1">
+                      <a:alpha val="40000"/>
+                    </a:schemeClr>
+                  </a:outerShdw>
+                </a:effectLst>
+                <a:latin typeface="Exo 2 Extra Light" panose="00000300000000000000" pitchFamily="50" charset="0"/>
+              </a:rPr>
+              <a:t>Auxílio no planejamento do projeto</a:t>
+            </a:r>
+            <a:endParaRPr lang="pt-BR" b="1" cap="none" spc="0" dirty="0" smtClean="0">
+              <a:ln w="0"/>
+              <a:solidFill>
+                <a:schemeClr val="bg1"/>
+              </a:solidFill>
+              <a:effectLst>
+                <a:outerShdw blurRad="38100" dist="19050" dir="2700000" algn="tl" rotWithShape="0">
+                  <a:schemeClr val="dk1">
+                    <a:alpha val="40000"/>
+                  </a:schemeClr>
+                </a:outerShdw>
+              </a:effectLst>
+              <a:latin typeface="Exo 2 Extra Light" panose="00000300000000000000" pitchFamily="50" charset="0"/>
+            </a:endParaRPr>
+          </a:p>
+          <a:p>
+            <a:pPr algn="r"/>
+            <a:r>
+              <a:rPr lang="pt-BR" b="1" dirty="0" smtClean="0">
+                <a:ln w="0"/>
+                <a:solidFill>
+                  <a:schemeClr val="bg1"/>
+                </a:solidFill>
+                <a:effectLst>
+                  <a:outerShdw blurRad="38100" dist="19050" dir="2700000" algn="tl" rotWithShape="0">
+                    <a:schemeClr val="dk1">
+                      <a:alpha val="40000"/>
+                    </a:schemeClr>
+                  </a:outerShdw>
+                </a:effectLst>
+                <a:latin typeface="Exo 2 Extra Light" panose="00000300000000000000" pitchFamily="50" charset="0"/>
+              </a:rPr>
+              <a:t>Auxílio na d</a:t>
+            </a:r>
+            <a:r>
+              <a:rPr lang="pt-BR" b="1" cap="none" spc="0" dirty="0" smtClean="0">
+                <a:ln w="0"/>
+                <a:solidFill>
+                  <a:schemeClr val="bg1"/>
+                </a:solidFill>
+                <a:effectLst>
+                  <a:outerShdw blurRad="38100" dist="19050" dir="2700000" algn="tl" rotWithShape="0">
+                    <a:schemeClr val="dk1">
+                      <a:alpha val="40000"/>
+                    </a:schemeClr>
+                  </a:outerShdw>
+                </a:effectLst>
+                <a:latin typeface="Exo 2 Extra Light" panose="00000300000000000000" pitchFamily="50" charset="0"/>
+              </a:rPr>
+              <a:t>ocumentação do projeto</a:t>
+            </a:r>
+          </a:p>
+        </p:txBody>
+      </p:sp>
+      <p:sp>
+        <p:nvSpPr>
+          <p:cNvPr id="52" name="Retângulo 51"/>
+          <p:cNvSpPr/>
+          <p:nvPr/>
+        </p:nvSpPr>
+        <p:spPr>
+          <a:xfrm>
+            <a:off x="2585311" y="3726868"/>
+            <a:ext cx="5469573" cy="923330"/>
+          </a:xfrm>
+          <a:prstGeom prst="rect">
+            <a:avLst/>
+          </a:prstGeom>
+          <a:noFill/>
+          <a:effectLst/>
+        </p:spPr>
+        <p:txBody>
+          <a:bodyPr wrap="square" lIns="91440" tIns="45720" rIns="91440" bIns="45720">
+            <a:spAutoFit/>
+          </a:bodyPr>
+          <a:lstStyle/>
+          <a:p>
+            <a:r>
+              <a:rPr lang="pt-BR" b="1" dirty="0" smtClean="0">
+                <a:ln w="0"/>
+                <a:solidFill>
+                  <a:schemeClr val="bg1"/>
+                </a:solidFill>
+                <a:effectLst>
+                  <a:outerShdw blurRad="38100" dist="19050" dir="2700000" algn="tl" rotWithShape="0">
+                    <a:schemeClr val="dk1">
+                      <a:alpha val="40000"/>
+                    </a:schemeClr>
+                  </a:outerShdw>
+                </a:effectLst>
+                <a:latin typeface="Exo 2 Extra Light" panose="00000300000000000000" pitchFamily="50" charset="0"/>
+              </a:rPr>
+              <a:t>Auxílio no desenvolvimento do sistema</a:t>
+            </a:r>
+          </a:p>
+          <a:p>
+            <a:r>
+              <a:rPr lang="pt-BR" b="1" dirty="0" smtClean="0">
+                <a:ln w="0"/>
+                <a:solidFill>
+                  <a:schemeClr val="bg1"/>
+                </a:solidFill>
+                <a:effectLst>
+                  <a:outerShdw blurRad="38100" dist="19050" dir="2700000" algn="tl" rotWithShape="0">
+                    <a:schemeClr val="dk1">
+                      <a:alpha val="40000"/>
+                    </a:schemeClr>
+                  </a:outerShdw>
+                </a:effectLst>
+                <a:latin typeface="Exo 2 Extra Light" panose="00000300000000000000" pitchFamily="50" charset="0"/>
+              </a:rPr>
+              <a:t>Desenvolvimento do banco de dados</a:t>
+            </a:r>
+          </a:p>
+          <a:p>
+            <a:r>
+              <a:rPr lang="pt-BR" b="1" dirty="0" smtClean="0">
+                <a:ln w="0"/>
+                <a:solidFill>
+                  <a:schemeClr val="bg1"/>
+                </a:solidFill>
+                <a:effectLst>
+                  <a:outerShdw blurRad="38100" dist="19050" dir="2700000" algn="tl" rotWithShape="0">
+                    <a:schemeClr val="dk1">
+                      <a:alpha val="40000"/>
+                    </a:schemeClr>
+                  </a:outerShdw>
+                </a:effectLst>
+                <a:latin typeface="Exo 2 Extra Light" panose="00000300000000000000" pitchFamily="50" charset="0"/>
+              </a:rPr>
+              <a:t>Auxílio na documentação do projeto</a:t>
+            </a:r>
+          </a:p>
+        </p:txBody>
+      </p:sp>
+      <p:sp>
+        <p:nvSpPr>
+          <p:cNvPr id="53" name="Retângulo 52"/>
+          <p:cNvSpPr/>
+          <p:nvPr/>
+        </p:nvSpPr>
+        <p:spPr>
+          <a:xfrm>
+            <a:off x="4167320" y="5168356"/>
+            <a:ext cx="5469573" cy="923330"/>
+          </a:xfrm>
+          <a:prstGeom prst="rect">
+            <a:avLst/>
+          </a:prstGeom>
+          <a:noFill/>
+          <a:effectLst/>
+        </p:spPr>
+        <p:txBody>
+          <a:bodyPr wrap="square" lIns="91440" tIns="45720" rIns="91440" bIns="45720">
+            <a:spAutoFit/>
+          </a:bodyPr>
+          <a:lstStyle/>
+          <a:p>
+            <a:pPr algn="r"/>
+            <a:r>
+              <a:rPr lang="pt-BR" b="1" dirty="0" smtClean="0">
+                <a:ln w="0"/>
+                <a:solidFill>
+                  <a:schemeClr val="bg1"/>
+                </a:solidFill>
+                <a:effectLst>
+                  <a:outerShdw blurRad="38100" dist="19050" dir="2700000" algn="tl" rotWithShape="0">
+                    <a:schemeClr val="dk1">
+                      <a:alpha val="40000"/>
+                    </a:schemeClr>
+                  </a:outerShdw>
+                </a:effectLst>
+                <a:latin typeface="Exo 2 Extra Light" panose="00000300000000000000" pitchFamily="50" charset="0"/>
+              </a:rPr>
+              <a:t>Auxílio no desenvolvimento do sistema</a:t>
+            </a:r>
+          </a:p>
+          <a:p>
+            <a:pPr algn="r"/>
+            <a:r>
+              <a:rPr lang="pt-BR" b="1" dirty="0" smtClean="0">
+                <a:ln w="0"/>
+                <a:solidFill>
+                  <a:schemeClr val="bg1"/>
+                </a:solidFill>
+                <a:effectLst>
+                  <a:outerShdw blurRad="38100" dist="19050" dir="2700000" algn="tl" rotWithShape="0">
+                    <a:schemeClr val="dk1">
+                      <a:alpha val="40000"/>
+                    </a:schemeClr>
+                  </a:outerShdw>
+                </a:effectLst>
+                <a:latin typeface="Exo 2 Extra Light" panose="00000300000000000000" pitchFamily="50" charset="0"/>
+              </a:rPr>
+              <a:t>Desenvolvimento dos processos de help </a:t>
+            </a:r>
+            <a:r>
+              <a:rPr lang="pt-BR" b="1" dirty="0" err="1" smtClean="0">
+                <a:ln w="0"/>
+                <a:solidFill>
+                  <a:schemeClr val="bg1"/>
+                </a:solidFill>
+                <a:effectLst>
+                  <a:outerShdw blurRad="38100" dist="19050" dir="2700000" algn="tl" rotWithShape="0">
+                    <a:schemeClr val="dk1">
+                      <a:alpha val="40000"/>
+                    </a:schemeClr>
+                  </a:outerShdw>
+                </a:effectLst>
+                <a:latin typeface="Exo 2 Extra Light" panose="00000300000000000000" pitchFamily="50" charset="0"/>
+              </a:rPr>
+              <a:t>desk</a:t>
+            </a:r>
+            <a:endParaRPr lang="pt-BR" b="1" dirty="0" smtClean="0">
+              <a:ln w="0"/>
+              <a:solidFill>
+                <a:schemeClr val="bg1"/>
+              </a:solidFill>
+              <a:effectLst>
+                <a:outerShdw blurRad="38100" dist="19050" dir="2700000" algn="tl" rotWithShape="0">
+                  <a:schemeClr val="dk1">
+                    <a:alpha val="40000"/>
+                  </a:schemeClr>
+                </a:outerShdw>
+              </a:effectLst>
+              <a:latin typeface="Exo 2 Extra Light" panose="00000300000000000000" pitchFamily="50" charset="0"/>
+            </a:endParaRPr>
+          </a:p>
+          <a:p>
+            <a:pPr algn="r"/>
+            <a:r>
+              <a:rPr lang="pt-BR" b="1" dirty="0" smtClean="0">
+                <a:ln w="0"/>
+                <a:solidFill>
+                  <a:schemeClr val="bg1"/>
+                </a:solidFill>
+                <a:effectLst>
+                  <a:outerShdw blurRad="38100" dist="19050" dir="2700000" algn="tl" rotWithShape="0">
+                    <a:schemeClr val="dk1">
+                      <a:alpha val="40000"/>
+                    </a:schemeClr>
+                  </a:outerShdw>
+                </a:effectLst>
+                <a:latin typeface="Exo 2 Extra Light" panose="00000300000000000000" pitchFamily="50" charset="0"/>
+              </a:rPr>
+              <a:t>Auxílio na documentação do projeto</a:t>
+            </a:r>
+          </a:p>
+        </p:txBody>
+      </p:sp>
+    </p:spTree>
+    <p:extLst>
+      <p:ext uri="{BB962C8B-B14F-4D97-AF65-F5344CB8AC3E}">
+        <p14:creationId xmlns:p14="http://schemas.microsoft.com/office/powerpoint/2010/main" val="3330219946"/>
+      </p:ext>
+    </p:extLst>
+  </p:cSld>
+  <p:clrMapOvr>
+    <a:masterClrMapping/>
+  </p:clrMapOvr>
+  <mc:AlternateContent xmlns:mc="http://schemas.openxmlformats.org/markup-compatibility/2006">
+    <mc:Choice xmlns:p14="http://schemas.microsoft.com/office/powerpoint/2010/main" Requires="p14">
+      <p:transition spd="med" p14:dur="700">
+        <p:fade/>
+      </p:transition>
+    </mc:Choice>
+    <mc:Fallback>
+      <p:transition spd="med">
+        <p:fade/>
+      </p:transition>
+    </mc:Fallback>
+  </mc:AlternateContent>
   <p:timing>
     <p:tnLst>
       <p:par>

</xml_diff>

<commit_message>
apre modelo de dados e pasta da celia fix
</commit_message>
<xml_diff>
--- a/Apresentação/inSensor.pptx
+++ b/Apresentação/inSensor.pptx
@@ -15,6 +15,8 @@
     <p:sldId id="261" r:id="rId9"/>
     <p:sldId id="262" r:id="rId10"/>
     <p:sldId id="266" r:id="rId11"/>
+    <p:sldId id="267" r:id="rId12"/>
+    <p:sldId id="268" r:id="rId13"/>
   </p:sldIdLst>
   <p:sldSz cx="12192000" cy="6858000"/>
   <p:notesSz cx="6858000" cy="9144000"/>
@@ -5579,6 +5581,649 @@
 </p:sld>
 </file>
 
+<file path=ppt/slides/slide11.xml><?xml version="1.0" encoding="utf-8"?>
+<p:sld xmlns:a="http://schemas.openxmlformats.org/drawingml/2006/main" xmlns:r="http://schemas.openxmlformats.org/officeDocument/2006/relationships" xmlns:p="http://schemas.openxmlformats.org/presentationml/2006/main">
+  <p:cSld>
+    <p:spTree>
+      <p:nvGrpSpPr>
+        <p:cNvPr id="1" name=""/>
+        <p:cNvGrpSpPr/>
+        <p:nvPr/>
+      </p:nvGrpSpPr>
+      <p:grpSpPr>
+        <a:xfrm>
+          <a:off x="0" y="0"/>
+          <a:ext cx="0" cy="0"/>
+          <a:chOff x="0" y="0"/>
+          <a:chExt cx="0" cy="0"/>
+        </a:xfrm>
+      </p:grpSpPr>
+      <p:grpSp>
+        <p:nvGrpSpPr>
+          <p:cNvPr id="6" name="Agrupar 5"/>
+          <p:cNvGrpSpPr/>
+          <p:nvPr/>
+        </p:nvGrpSpPr>
+        <p:grpSpPr>
+          <a:xfrm>
+            <a:off x="0" y="-5907"/>
+            <a:ext cx="12192000" cy="6863907"/>
+            <a:chOff x="0" y="0"/>
+            <a:chExt cx="12192000" cy="6863907"/>
+          </a:xfrm>
+        </p:grpSpPr>
+        <p:pic>
+          <p:nvPicPr>
+            <p:cNvPr id="7" name="Picture 22" descr="http://www.correiodoestadoonline.com.br/arquivos/noticias/3.png"/>
+            <p:cNvPicPr>
+              <a:picLocks noChangeAspect="1" noChangeArrowheads="1"/>
+            </p:cNvPicPr>
+            <p:nvPr/>
+          </p:nvPicPr>
+          <p:blipFill>
+            <a:blip r:embed="rId2">
+              <a:extLst>
+                <a:ext uri="{BEBA8EAE-BF5A-486C-A8C5-ECC9F3942E4B}">
+                  <a14:imgProps xmlns:a14="http://schemas.microsoft.com/office/drawing/2010/main">
+                    <a14:imgLayer r:embed="rId3">
+                      <a14:imgEffect>
+                        <a14:sharpenSoften amount="-80000"/>
+                      </a14:imgEffect>
+                      <a14:imgEffect>
+                        <a14:brightnessContrast bright="-46000"/>
+                      </a14:imgEffect>
+                    </a14:imgLayer>
+                  </a14:imgProps>
+                </a:ext>
+                <a:ext uri="{28A0092B-C50C-407E-A947-70E740481C1C}">
+                  <a14:useLocalDpi xmlns:a14="http://schemas.microsoft.com/office/drawing/2010/main" val="0"/>
+                </a:ext>
+              </a:extLst>
+            </a:blip>
+            <a:srcRect/>
+            <a:stretch>
+              <a:fillRect/>
+            </a:stretch>
+          </p:blipFill>
+          <p:spPr bwMode="auto">
+            <a:xfrm>
+              <a:off x="0" y="0"/>
+              <a:ext cx="12192000" cy="6863907"/>
+            </a:xfrm>
+            <a:prstGeom prst="rect">
+              <a:avLst/>
+            </a:prstGeom>
+            <a:noFill/>
+          </p:spPr>
+        </p:pic>
+        <p:sp>
+          <p:nvSpPr>
+            <p:cNvPr id="8" name="Retângulo 7"/>
+            <p:cNvSpPr/>
+            <p:nvPr/>
+          </p:nvSpPr>
+          <p:spPr>
+            <a:xfrm>
+              <a:off x="0" y="5907"/>
+              <a:ext cx="12192000" cy="6858000"/>
+            </a:xfrm>
+            <a:prstGeom prst="rect">
+              <a:avLst/>
+            </a:prstGeom>
+            <a:solidFill>
+              <a:schemeClr val="tx1">
+                <a:lumMod val="95000"/>
+                <a:lumOff val="5000"/>
+                <a:alpha val="87000"/>
+              </a:schemeClr>
+            </a:solidFill>
+            <a:ln>
+              <a:noFill/>
+            </a:ln>
+          </p:spPr>
+          <p:style>
+            <a:lnRef idx="2">
+              <a:schemeClr val="dk1"/>
+            </a:lnRef>
+            <a:fillRef idx="1">
+              <a:schemeClr val="lt1"/>
+            </a:fillRef>
+            <a:effectRef idx="0">
+              <a:schemeClr val="dk1"/>
+            </a:effectRef>
+            <a:fontRef idx="minor">
+              <a:schemeClr val="dk1"/>
+            </a:fontRef>
+          </p:style>
+          <p:txBody>
+            <a:bodyPr rtlCol="0" anchor="ctr"/>
+            <a:lstStyle/>
+            <a:p>
+              <a:pPr algn="ctr"/>
+              <a:endParaRPr lang="pt-BR" dirty="0"/>
+            </a:p>
+          </p:txBody>
+        </p:sp>
+      </p:grpSp>
+      <p:sp>
+        <p:nvSpPr>
+          <p:cNvPr id="9" name="Retângulo 8"/>
+          <p:cNvSpPr/>
+          <p:nvPr/>
+        </p:nvSpPr>
+        <p:spPr>
+          <a:xfrm>
+            <a:off x="126222" y="198787"/>
+            <a:ext cx="9627378" cy="707886"/>
+          </a:xfrm>
+          <a:prstGeom prst="rect">
+            <a:avLst/>
+          </a:prstGeom>
+          <a:noFill/>
+          <a:effectLst/>
+        </p:spPr>
+        <p:txBody>
+          <a:bodyPr wrap="square" lIns="91440" tIns="45720" rIns="91440" bIns="45720">
+            <a:spAutoFit/>
+          </a:bodyPr>
+          <a:lstStyle/>
+          <a:p>
+            <a:pPr algn="just"/>
+            <a:r>
+              <a:rPr lang="pt-BR" sz="4000" b="1" dirty="0" smtClean="0">
+                <a:ln w="0"/>
+                <a:solidFill>
+                  <a:schemeClr val="bg1"/>
+                </a:solidFill>
+                <a:effectLst>
+                  <a:outerShdw blurRad="38100" dist="19050" dir="2700000" algn="tl" rotWithShape="0">
+                    <a:schemeClr val="dk1">
+                      <a:alpha val="40000"/>
+                    </a:schemeClr>
+                  </a:outerShdw>
+                </a:effectLst>
+                <a:latin typeface="Exo 2 Medium" panose="00000600000000000000" pitchFamily="50" charset="0"/>
+              </a:rPr>
+              <a:t>BANCO DE DADOS</a:t>
+            </a:r>
+            <a:endParaRPr lang="pt-BR" sz="4000" b="1" cap="none" spc="0" dirty="0">
+              <a:ln w="0"/>
+              <a:solidFill>
+                <a:schemeClr val="bg1"/>
+              </a:solidFill>
+              <a:effectLst>
+                <a:outerShdw blurRad="38100" dist="19050" dir="2700000" algn="tl" rotWithShape="0">
+                  <a:schemeClr val="dk1">
+                    <a:alpha val="40000"/>
+                  </a:schemeClr>
+                </a:outerShdw>
+              </a:effectLst>
+              <a:latin typeface="Exo 2 Medium" panose="00000600000000000000" pitchFamily="50" charset="0"/>
+            </a:endParaRPr>
+          </a:p>
+        </p:txBody>
+      </p:sp>
+      <p:cxnSp>
+        <p:nvCxnSpPr>
+          <p:cNvPr id="10" name="Conector reto 9">
+            <a:extLst>
+              <a:ext uri="{FF2B5EF4-FFF2-40B4-BE49-F238E27FC236}">
+                <a16:creationId xmlns:a16="http://schemas.microsoft.com/office/drawing/2014/main" id="{6510727C-C843-4D84-A07F-20F37366891D}"/>
+              </a:ext>
+            </a:extLst>
+          </p:cNvPr>
+          <p:cNvCxnSpPr/>
+          <p:nvPr/>
+        </p:nvCxnSpPr>
+        <p:spPr>
+          <a:xfrm>
+            <a:off x="0" y="1105459"/>
+            <a:ext cx="6325704" cy="0"/>
+          </a:xfrm>
+          <a:prstGeom prst="line">
+            <a:avLst/>
+          </a:prstGeom>
+          <a:ln>
+            <a:solidFill>
+              <a:schemeClr val="bg1"/>
+            </a:solidFill>
+          </a:ln>
+          <a:effectLst/>
+        </p:spPr>
+        <p:style>
+          <a:lnRef idx="1">
+            <a:schemeClr val="accent1"/>
+          </a:lnRef>
+          <a:fillRef idx="0">
+            <a:schemeClr val="accent1"/>
+          </a:fillRef>
+          <a:effectRef idx="0">
+            <a:schemeClr val="accent1"/>
+          </a:effectRef>
+          <a:fontRef idx="minor">
+            <a:schemeClr val="tx1"/>
+          </a:fontRef>
+        </p:style>
+      </p:cxnSp>
+      <p:sp>
+        <p:nvSpPr>
+          <p:cNvPr id="43" name="Elipse 42"/>
+          <p:cNvSpPr/>
+          <p:nvPr/>
+        </p:nvSpPr>
+        <p:spPr>
+          <a:xfrm>
+            <a:off x="1251250" y="1804754"/>
+            <a:ext cx="4353952" cy="4353952"/>
+          </a:xfrm>
+          <a:prstGeom prst="ellipse">
+            <a:avLst/>
+          </a:prstGeom>
+          <a:solidFill>
+            <a:schemeClr val="bg1"/>
+          </a:solidFill>
+          <a:ln>
+            <a:noFill/>
+          </a:ln>
+          <a:effectLst>
+            <a:outerShdw blurRad="50800" dist="38100" dir="2700000" algn="tl" rotWithShape="0">
+              <a:prstClr val="black">
+                <a:alpha val="40000"/>
+              </a:prstClr>
+            </a:outerShdw>
+          </a:effectLst>
+        </p:spPr>
+        <p:style>
+          <a:lnRef idx="2">
+            <a:schemeClr val="accent1">
+              <a:shade val="50000"/>
+            </a:schemeClr>
+          </a:lnRef>
+          <a:fillRef idx="1">
+            <a:schemeClr val="accent1"/>
+          </a:fillRef>
+          <a:effectRef idx="0">
+            <a:schemeClr val="accent1"/>
+          </a:effectRef>
+          <a:fontRef idx="minor">
+            <a:schemeClr val="lt1"/>
+          </a:fontRef>
+        </p:style>
+        <p:txBody>
+          <a:bodyPr rtlCol="0" anchor="ctr"/>
+          <a:lstStyle/>
+          <a:p>
+            <a:pPr algn="ctr"/>
+            <a:endParaRPr lang="pt-BR" dirty="0"/>
+          </a:p>
+        </p:txBody>
+      </p:sp>
+      <p:pic>
+        <p:nvPicPr>
+          <p:cNvPr id="47" name="Picture 14" descr="Imagem relacionada"/>
+          <p:cNvPicPr>
+            <a:picLocks noChangeAspect="1" noChangeArrowheads="1"/>
+          </p:cNvPicPr>
+          <p:nvPr/>
+        </p:nvPicPr>
+        <p:blipFill rotWithShape="1">
+          <a:blip r:embed="rId4">
+            <a:extLst>
+              <a:ext uri="{28A0092B-C50C-407E-A947-70E740481C1C}">
+                <a14:useLocalDpi xmlns:a14="http://schemas.microsoft.com/office/drawing/2010/main" val="0"/>
+              </a:ext>
+            </a:extLst>
+          </a:blip>
+          <a:srcRect l="20563" t="13429" r="20104" b="14571"/>
+          <a:stretch/>
+        </p:blipFill>
+        <p:spPr bwMode="auto">
+          <a:xfrm>
+            <a:off x="2638563" y="2467802"/>
+            <a:ext cx="1579326" cy="1916488"/>
+          </a:xfrm>
+          <a:prstGeom prst="rect">
+            <a:avLst/>
+          </a:prstGeom>
+          <a:noFill/>
+          <a:extLst>
+            <a:ext uri="{909E8E84-426E-40DD-AFC4-6F175D3DCCD1}">
+              <a14:hiddenFill xmlns:a14="http://schemas.microsoft.com/office/drawing/2010/main">
+                <a:solidFill>
+                  <a:srgbClr val="FFFFFF"/>
+                </a:solidFill>
+              </a14:hiddenFill>
+            </a:ext>
+          </a:extLst>
+        </p:spPr>
+      </p:pic>
+      <p:pic>
+        <p:nvPicPr>
+          <p:cNvPr id="1028" name="Picture 4" descr="Resultado de imagem para azure logo"/>
+          <p:cNvPicPr>
+            <a:picLocks noChangeAspect="1" noChangeArrowheads="1"/>
+          </p:cNvPicPr>
+          <p:nvPr/>
+        </p:nvPicPr>
+        <p:blipFill>
+          <a:blip r:embed="rId5" cstate="print">
+            <a:extLst>
+              <a:ext uri="{28A0092B-C50C-407E-A947-70E740481C1C}">
+                <a14:useLocalDpi xmlns:a14="http://schemas.microsoft.com/office/drawing/2010/main" val="0"/>
+              </a:ext>
+            </a:extLst>
+          </a:blip>
+          <a:srcRect/>
+          <a:stretch>
+            <a:fillRect/>
+          </a:stretch>
+        </p:blipFill>
+        <p:spPr bwMode="auto">
+          <a:xfrm>
+            <a:off x="2193296" y="4384290"/>
+            <a:ext cx="2469860" cy="713944"/>
+          </a:xfrm>
+          <a:prstGeom prst="rect">
+            <a:avLst/>
+          </a:prstGeom>
+          <a:noFill/>
+          <a:extLst>
+            <a:ext uri="{909E8E84-426E-40DD-AFC4-6F175D3DCCD1}">
+              <a14:hiddenFill xmlns:a14="http://schemas.microsoft.com/office/drawing/2010/main">
+                <a:solidFill>
+                  <a:srgbClr val="FFFFFF"/>
+                </a:solidFill>
+              </a14:hiddenFill>
+            </a:ext>
+          </a:extLst>
+        </p:spPr>
+      </p:pic>
+    </p:spTree>
+    <p:extLst>
+      <p:ext uri="{BB962C8B-B14F-4D97-AF65-F5344CB8AC3E}">
+        <p14:creationId xmlns:p14="http://schemas.microsoft.com/office/powerpoint/2010/main" val="1356162576"/>
+      </p:ext>
+    </p:extLst>
+  </p:cSld>
+  <p:clrMapOvr>
+    <a:masterClrMapping/>
+  </p:clrMapOvr>
+  <p:timing>
+    <p:tnLst>
+      <p:par>
+        <p:cTn id="1" dur="indefinite" restart="never" nodeType="tmRoot"/>
+      </p:par>
+    </p:tnLst>
+  </p:timing>
+</p:sld>
+</file>
+
+<file path=ppt/slides/slide12.xml><?xml version="1.0" encoding="utf-8"?>
+<p:sld xmlns:a="http://schemas.openxmlformats.org/drawingml/2006/main" xmlns:r="http://schemas.openxmlformats.org/officeDocument/2006/relationships" xmlns:p="http://schemas.openxmlformats.org/presentationml/2006/main">
+  <p:cSld>
+    <p:spTree>
+      <p:nvGrpSpPr>
+        <p:cNvPr id="1" name=""/>
+        <p:cNvGrpSpPr/>
+        <p:nvPr/>
+      </p:nvGrpSpPr>
+      <p:grpSpPr>
+        <a:xfrm>
+          <a:off x="0" y="0"/>
+          <a:ext cx="0" cy="0"/>
+          <a:chOff x="0" y="0"/>
+          <a:chExt cx="0" cy="0"/>
+        </a:xfrm>
+      </p:grpSpPr>
+      <p:grpSp>
+        <p:nvGrpSpPr>
+          <p:cNvPr id="4" name="Agrupar 3"/>
+          <p:cNvGrpSpPr/>
+          <p:nvPr/>
+        </p:nvGrpSpPr>
+        <p:grpSpPr>
+          <a:xfrm>
+            <a:off x="0" y="-5907"/>
+            <a:ext cx="12192000" cy="6863907"/>
+            <a:chOff x="0" y="0"/>
+            <a:chExt cx="12192000" cy="6863907"/>
+          </a:xfrm>
+        </p:grpSpPr>
+        <p:pic>
+          <p:nvPicPr>
+            <p:cNvPr id="5" name="Picture 22" descr="http://www.correiodoestadoonline.com.br/arquivos/noticias/3.png"/>
+            <p:cNvPicPr>
+              <a:picLocks noChangeAspect="1" noChangeArrowheads="1"/>
+            </p:cNvPicPr>
+            <p:nvPr/>
+          </p:nvPicPr>
+          <p:blipFill>
+            <a:blip r:embed="rId2">
+              <a:extLst>
+                <a:ext uri="{BEBA8EAE-BF5A-486C-A8C5-ECC9F3942E4B}">
+                  <a14:imgProps xmlns:a14="http://schemas.microsoft.com/office/drawing/2010/main">
+                    <a14:imgLayer r:embed="rId3">
+                      <a14:imgEffect>
+                        <a14:sharpenSoften amount="-80000"/>
+                      </a14:imgEffect>
+                      <a14:imgEffect>
+                        <a14:brightnessContrast bright="-46000"/>
+                      </a14:imgEffect>
+                    </a14:imgLayer>
+                  </a14:imgProps>
+                </a:ext>
+                <a:ext uri="{28A0092B-C50C-407E-A947-70E740481C1C}">
+                  <a14:useLocalDpi xmlns:a14="http://schemas.microsoft.com/office/drawing/2010/main" val="0"/>
+                </a:ext>
+              </a:extLst>
+            </a:blip>
+            <a:srcRect/>
+            <a:stretch>
+              <a:fillRect/>
+            </a:stretch>
+          </p:blipFill>
+          <p:spPr bwMode="auto">
+            <a:xfrm>
+              <a:off x="0" y="0"/>
+              <a:ext cx="12192000" cy="6863907"/>
+            </a:xfrm>
+            <a:prstGeom prst="rect">
+              <a:avLst/>
+            </a:prstGeom>
+            <a:noFill/>
+          </p:spPr>
+        </p:pic>
+        <p:sp>
+          <p:nvSpPr>
+            <p:cNvPr id="6" name="Retângulo 5"/>
+            <p:cNvSpPr/>
+            <p:nvPr/>
+          </p:nvSpPr>
+          <p:spPr>
+            <a:xfrm>
+              <a:off x="0" y="5907"/>
+              <a:ext cx="12192000" cy="6858000"/>
+            </a:xfrm>
+            <a:prstGeom prst="rect">
+              <a:avLst/>
+            </a:prstGeom>
+            <a:solidFill>
+              <a:schemeClr val="tx1">
+                <a:lumMod val="95000"/>
+                <a:lumOff val="5000"/>
+                <a:alpha val="87000"/>
+              </a:schemeClr>
+            </a:solidFill>
+            <a:ln>
+              <a:noFill/>
+            </a:ln>
+          </p:spPr>
+          <p:style>
+            <a:lnRef idx="2">
+              <a:schemeClr val="dk1"/>
+            </a:lnRef>
+            <a:fillRef idx="1">
+              <a:schemeClr val="lt1"/>
+            </a:fillRef>
+            <a:effectRef idx="0">
+              <a:schemeClr val="dk1"/>
+            </a:effectRef>
+            <a:fontRef idx="minor">
+              <a:schemeClr val="dk1"/>
+            </a:fontRef>
+          </p:style>
+          <p:txBody>
+            <a:bodyPr rtlCol="0" anchor="ctr"/>
+            <a:lstStyle/>
+            <a:p>
+              <a:pPr algn="ctr"/>
+              <a:endParaRPr lang="pt-BR" dirty="0"/>
+            </a:p>
+          </p:txBody>
+        </p:sp>
+      </p:grpSp>
+      <p:sp>
+        <p:nvSpPr>
+          <p:cNvPr id="7" name="Retângulo 6"/>
+          <p:cNvSpPr/>
+          <p:nvPr/>
+        </p:nvSpPr>
+        <p:spPr>
+          <a:xfrm>
+            <a:off x="126222" y="198787"/>
+            <a:ext cx="9627378" cy="707886"/>
+          </a:xfrm>
+          <a:prstGeom prst="rect">
+            <a:avLst/>
+          </a:prstGeom>
+          <a:noFill/>
+          <a:effectLst/>
+        </p:spPr>
+        <p:txBody>
+          <a:bodyPr wrap="square" lIns="91440" tIns="45720" rIns="91440" bIns="45720">
+            <a:spAutoFit/>
+          </a:bodyPr>
+          <a:lstStyle/>
+          <a:p>
+            <a:pPr algn="just"/>
+            <a:r>
+              <a:rPr lang="pt-BR" sz="4000" b="1" dirty="0" smtClean="0">
+                <a:ln w="0"/>
+                <a:solidFill>
+                  <a:schemeClr val="bg1"/>
+                </a:solidFill>
+                <a:effectLst>
+                  <a:outerShdw blurRad="38100" dist="19050" dir="2700000" algn="tl" rotWithShape="0">
+                    <a:schemeClr val="dk1">
+                      <a:alpha val="40000"/>
+                    </a:schemeClr>
+                  </a:outerShdw>
+                </a:effectLst>
+                <a:latin typeface="Exo 2 Medium" panose="00000600000000000000" pitchFamily="50" charset="0"/>
+              </a:rPr>
+              <a:t>MODELO DE DADOS</a:t>
+            </a:r>
+            <a:endParaRPr lang="pt-BR" sz="4000" b="1" cap="none" spc="0" dirty="0">
+              <a:ln w="0"/>
+              <a:solidFill>
+                <a:schemeClr val="bg1"/>
+              </a:solidFill>
+              <a:effectLst>
+                <a:outerShdw blurRad="38100" dist="19050" dir="2700000" algn="tl" rotWithShape="0">
+                  <a:schemeClr val="dk1">
+                    <a:alpha val="40000"/>
+                  </a:schemeClr>
+                </a:outerShdw>
+              </a:effectLst>
+              <a:latin typeface="Exo 2 Medium" panose="00000600000000000000" pitchFamily="50" charset="0"/>
+            </a:endParaRPr>
+          </a:p>
+        </p:txBody>
+      </p:sp>
+      <p:cxnSp>
+        <p:nvCxnSpPr>
+          <p:cNvPr id="8" name="Conector reto 7">
+            <a:extLst>
+              <a:ext uri="{FF2B5EF4-FFF2-40B4-BE49-F238E27FC236}">
+                <a16:creationId xmlns:a16="http://schemas.microsoft.com/office/drawing/2014/main" id="{6510727C-C843-4D84-A07F-20F37366891D}"/>
+              </a:ext>
+            </a:extLst>
+          </p:cNvPr>
+          <p:cNvCxnSpPr/>
+          <p:nvPr/>
+        </p:nvCxnSpPr>
+        <p:spPr>
+          <a:xfrm>
+            <a:off x="0" y="1105459"/>
+            <a:ext cx="6325704" cy="0"/>
+          </a:xfrm>
+          <a:prstGeom prst="line">
+            <a:avLst/>
+          </a:prstGeom>
+          <a:ln>
+            <a:solidFill>
+              <a:schemeClr val="bg1"/>
+            </a:solidFill>
+          </a:ln>
+          <a:effectLst/>
+        </p:spPr>
+        <p:style>
+          <a:lnRef idx="1">
+            <a:schemeClr val="accent1"/>
+          </a:lnRef>
+          <a:fillRef idx="0">
+            <a:schemeClr val="accent1"/>
+          </a:fillRef>
+          <a:effectRef idx="0">
+            <a:schemeClr val="accent1"/>
+          </a:effectRef>
+          <a:fontRef idx="minor">
+            <a:schemeClr val="tx1"/>
+          </a:fontRef>
+        </p:style>
+      </p:cxnSp>
+      <p:pic>
+        <p:nvPicPr>
+          <p:cNvPr id="9" name="Imagem 8"/>
+          <p:cNvPicPr>
+            <a:picLocks noChangeAspect="1"/>
+          </p:cNvPicPr>
+          <p:nvPr/>
+        </p:nvPicPr>
+        <p:blipFill rotWithShape="1">
+          <a:blip r:embed="rId4">
+            <a:extLst>
+              <a:ext uri="{28A0092B-C50C-407E-A947-70E740481C1C}">
+                <a14:useLocalDpi xmlns:a14="http://schemas.microsoft.com/office/drawing/2010/main" val="0"/>
+              </a:ext>
+            </a:extLst>
+          </a:blip>
+          <a:srcRect l="6168" t="1586" r="7003" b="4685"/>
+          <a:stretch/>
+        </p:blipFill>
+        <p:spPr>
+          <a:xfrm>
+            <a:off x="456647" y="1421298"/>
+            <a:ext cx="4931203" cy="5120864"/>
+          </a:xfrm>
+          <a:prstGeom prst="rect">
+            <a:avLst/>
+          </a:prstGeom>
+        </p:spPr>
+      </p:pic>
+    </p:spTree>
+    <p:extLst>
+      <p:ext uri="{BB962C8B-B14F-4D97-AF65-F5344CB8AC3E}">
+        <p14:creationId xmlns:p14="http://schemas.microsoft.com/office/powerpoint/2010/main" val="1829066801"/>
+      </p:ext>
+    </p:extLst>
+  </p:cSld>
+  <p:clrMapOvr>
+    <a:masterClrMapping/>
+  </p:clrMapOvr>
+</p:sld>
+</file>
+
 <file path=ppt/slides/slide2.xml><?xml version="1.0" encoding="utf-8"?>
 <p:sld xmlns:a="http://schemas.openxmlformats.org/drawingml/2006/main" xmlns:r="http://schemas.openxmlformats.org/officeDocument/2006/relationships" xmlns:p="http://schemas.openxmlformats.org/presentationml/2006/main">
   <p:cSld>
@@ -7232,7 +7877,7 @@
         </p:nvGraphicFramePr>
         <p:xfrm>
           <a:off x="266700" y="1294689"/>
-          <a:ext cx="6578600" cy="5349239"/>
+          <a:ext cx="6578600" cy="5360867"/>
         </p:xfrm>
         <a:graphic>
           <a:graphicData uri="http://schemas.openxmlformats.org/drawingml/2006/table">
@@ -9009,7 +9654,7 @@
         </p:nvGraphicFramePr>
         <p:xfrm>
           <a:off x="7137676" y="1294689"/>
-          <a:ext cx="4761948" cy="5349238"/>
+          <a:ext cx="4761948" cy="5372384"/>
         </p:xfrm>
         <a:graphic>
           <a:graphicData uri="http://schemas.openxmlformats.org/drawingml/2006/table">

</xml_diff>

<commit_message>
pasta pra colocar as falas
</commit_message>
<xml_diff>
--- a/Apresentação/inSensor.pptx
+++ b/Apresentação/inSensor.pptx
@@ -262,7 +262,7 @@
           <a:p>
             <a:fld id="{1A9BD4CD-1A6A-4953-94B0-D07B000D9A03}" type="datetimeFigureOut">
               <a:rPr lang="pt-BR" smtClean="0"/>
-              <a:t>30/11/2018</a:t>
+              <a:t>01/12/2018</a:t>
             </a:fld>
             <a:endParaRPr lang="pt-BR" dirty="0"/>
           </a:p>
@@ -430,7 +430,7 @@
           <a:p>
             <a:fld id="{1A9BD4CD-1A6A-4953-94B0-D07B000D9A03}" type="datetimeFigureOut">
               <a:rPr lang="pt-BR" smtClean="0"/>
-              <a:t>30/11/2018</a:t>
+              <a:t>01/12/2018</a:t>
             </a:fld>
             <a:endParaRPr lang="pt-BR" dirty="0"/>
           </a:p>
@@ -608,7 +608,7 @@
           <a:p>
             <a:fld id="{1A9BD4CD-1A6A-4953-94B0-D07B000D9A03}" type="datetimeFigureOut">
               <a:rPr lang="pt-BR" smtClean="0"/>
-              <a:t>30/11/2018</a:t>
+              <a:t>01/12/2018</a:t>
             </a:fld>
             <a:endParaRPr lang="pt-BR" dirty="0"/>
           </a:p>
@@ -776,7 +776,7 @@
           <a:p>
             <a:fld id="{1A9BD4CD-1A6A-4953-94B0-D07B000D9A03}" type="datetimeFigureOut">
               <a:rPr lang="pt-BR" smtClean="0"/>
-              <a:t>30/11/2018</a:t>
+              <a:t>01/12/2018</a:t>
             </a:fld>
             <a:endParaRPr lang="pt-BR" dirty="0"/>
           </a:p>
@@ -1021,7 +1021,7 @@
           <a:p>
             <a:fld id="{1A9BD4CD-1A6A-4953-94B0-D07B000D9A03}" type="datetimeFigureOut">
               <a:rPr lang="pt-BR" smtClean="0"/>
-              <a:t>30/11/2018</a:t>
+              <a:t>01/12/2018</a:t>
             </a:fld>
             <a:endParaRPr lang="pt-BR" dirty="0"/>
           </a:p>
@@ -1250,7 +1250,7 @@
           <a:p>
             <a:fld id="{1A9BD4CD-1A6A-4953-94B0-D07B000D9A03}" type="datetimeFigureOut">
               <a:rPr lang="pt-BR" smtClean="0"/>
-              <a:t>30/11/2018</a:t>
+              <a:t>01/12/2018</a:t>
             </a:fld>
             <a:endParaRPr lang="pt-BR" dirty="0"/>
           </a:p>
@@ -1614,7 +1614,7 @@
           <a:p>
             <a:fld id="{1A9BD4CD-1A6A-4953-94B0-D07B000D9A03}" type="datetimeFigureOut">
               <a:rPr lang="pt-BR" smtClean="0"/>
-              <a:t>30/11/2018</a:t>
+              <a:t>01/12/2018</a:t>
             </a:fld>
             <a:endParaRPr lang="pt-BR" dirty="0"/>
           </a:p>
@@ -1731,7 +1731,7 @@
           <a:p>
             <a:fld id="{1A9BD4CD-1A6A-4953-94B0-D07B000D9A03}" type="datetimeFigureOut">
               <a:rPr lang="pt-BR" smtClean="0"/>
-              <a:t>30/11/2018</a:t>
+              <a:t>01/12/2018</a:t>
             </a:fld>
             <a:endParaRPr lang="pt-BR" dirty="0"/>
           </a:p>
@@ -1826,7 +1826,7 @@
           <a:p>
             <a:fld id="{1A9BD4CD-1A6A-4953-94B0-D07B000D9A03}" type="datetimeFigureOut">
               <a:rPr lang="pt-BR" smtClean="0"/>
-              <a:t>30/11/2018</a:t>
+              <a:t>01/12/2018</a:t>
             </a:fld>
             <a:endParaRPr lang="pt-BR" dirty="0"/>
           </a:p>
@@ -2101,7 +2101,7 @@
           <a:p>
             <a:fld id="{1A9BD4CD-1A6A-4953-94B0-D07B000D9A03}" type="datetimeFigureOut">
               <a:rPr lang="pt-BR" smtClean="0"/>
-              <a:t>30/11/2018</a:t>
+              <a:t>01/12/2018</a:t>
             </a:fld>
             <a:endParaRPr lang="pt-BR" dirty="0"/>
           </a:p>
@@ -2353,7 +2353,7 @@
           <a:p>
             <a:fld id="{1A9BD4CD-1A6A-4953-94B0-D07B000D9A03}" type="datetimeFigureOut">
               <a:rPr lang="pt-BR" smtClean="0"/>
-              <a:t>30/11/2018</a:t>
+              <a:t>01/12/2018</a:t>
             </a:fld>
             <a:endParaRPr lang="pt-BR" dirty="0"/>
           </a:p>
@@ -2570,7 +2570,7 @@
           <a:p>
             <a:fld id="{1A9BD4CD-1A6A-4953-94B0-D07B000D9A03}" type="datetimeFigureOut">
               <a:rPr lang="pt-BR" smtClean="0"/>
-              <a:t>30/11/2018</a:t>
+              <a:t>01/12/2018</a:t>
             </a:fld>
             <a:endParaRPr lang="pt-BR" dirty="0"/>
           </a:p>
@@ -3673,7 +3673,7 @@
           <a:p>
             <a:pPr algn="ctr"/>
             <a:r>
-              <a:rPr lang="pt-BR" sz="4400" b="1" cap="none" spc="0" dirty="0" smtClean="0">
+              <a:rPr lang="pt-BR" sz="4400" b="1" cap="none" spc="0" dirty="0">
                 <a:ln w="10160">
                   <a:solidFill>
                     <a:srgbClr val="FF0000"/>
@@ -3693,24 +3693,6 @@
               </a:rPr>
               <a:t>YUDI</a:t>
             </a:r>
-            <a:endParaRPr lang="pt-BR" sz="4400" b="1" cap="none" spc="0" dirty="0">
-              <a:ln w="10160">
-                <a:solidFill>
-                  <a:srgbClr val="FF0000"/>
-                </a:solidFill>
-                <a:prstDash val="solid"/>
-              </a:ln>
-              <a:solidFill>
-                <a:srgbClr val="FF0000"/>
-              </a:solidFill>
-              <a:effectLst>
-                <a:outerShdw blurRad="38100" dist="22860" dir="5400000" algn="tl" rotWithShape="0">
-                  <a:srgbClr val="000000">
-                    <a:alpha val="30000"/>
-                  </a:srgbClr>
-                </a:outerShdw>
-              </a:effectLst>
-            </a:endParaRPr>
           </a:p>
         </p:txBody>
       </p:sp>
@@ -3736,13 +3718,6 @@
       </p:transition>
     </mc:Fallback>
   </mc:AlternateContent>
-  <p:timing>
-    <p:tnLst>
-      <p:par>
-        <p:cTn id="1" dur="indefinite" restart="never" nodeType="tmRoot"/>
-      </p:par>
-    </p:tnLst>
-  </p:timing>
 </p:sld>
 </file>
 
@@ -3895,7 +3870,7 @@
           <a:p>
             <a:pPr algn="just"/>
             <a:r>
-              <a:rPr lang="pt-BR" sz="4000" b="1" dirty="0" smtClean="0">
+              <a:rPr lang="pt-BR" sz="4000" b="1" dirty="0">
                 <a:ln w="0"/>
                 <a:solidFill>
                   <a:schemeClr val="bg1"/>
@@ -4428,7 +4403,7 @@
           <a:p>
             <a:pPr algn="ctr"/>
             <a:r>
-              <a:rPr lang="pt-BR" sz="2000" b="1" dirty="0" smtClean="0">
+              <a:rPr lang="pt-BR" sz="2000" b="1" dirty="0">
                 <a:ln w="0"/>
                 <a:solidFill>
                   <a:schemeClr val="bg1"/>
@@ -4486,7 +4461,7 @@
           <a:p>
             <a:pPr algn="ctr"/>
             <a:r>
-              <a:rPr lang="pt-BR" sz="2000" b="1" dirty="0" smtClean="0">
+              <a:rPr lang="pt-BR" sz="2000" b="1" dirty="0">
                 <a:ln w="0"/>
                 <a:solidFill>
                   <a:schemeClr val="bg1"/>
@@ -4544,7 +4519,7 @@
           <a:p>
             <a:pPr algn="ctr"/>
             <a:r>
-              <a:rPr lang="pt-BR" sz="2000" b="1" dirty="0" smtClean="0">
+              <a:rPr lang="pt-BR" sz="2000" b="1" dirty="0">
                 <a:ln w="0"/>
                 <a:solidFill>
                   <a:schemeClr val="bg1"/>
@@ -4742,7 +4717,7 @@
           <a:p>
             <a:pPr algn="ctr"/>
             <a:r>
-              <a:rPr lang="pt-BR" sz="2000" b="1" dirty="0" smtClean="0">
+              <a:rPr lang="pt-BR" sz="2000" b="1" dirty="0">
                 <a:ln w="0"/>
                 <a:solidFill>
                   <a:schemeClr val="bg1"/>
@@ -4800,7 +4775,7 @@
           <a:p>
             <a:pPr algn="ctr"/>
             <a:r>
-              <a:rPr lang="pt-BR" sz="2000" b="1" dirty="0" smtClean="0">
+              <a:rPr lang="pt-BR" sz="2000" b="1" dirty="0">
                 <a:ln w="0"/>
                 <a:solidFill>
                   <a:schemeClr val="bg1"/>
@@ -5178,7 +5153,7 @@
           <a:p>
             <a:pPr algn="ctr"/>
             <a:r>
-              <a:rPr lang="pt-BR" sz="2000" b="1" dirty="0" smtClean="0">
+              <a:rPr lang="pt-BR" sz="2000" b="1" dirty="0">
                 <a:ln w="0"/>
                 <a:solidFill>
                   <a:schemeClr val="bg1"/>
@@ -5236,7 +5211,7 @@
           <a:p>
             <a:pPr algn="ctr"/>
             <a:r>
-              <a:rPr lang="pt-BR" sz="2000" b="1" dirty="0" smtClean="0">
+              <a:rPr lang="pt-BR" sz="2000" b="1" dirty="0">
                 <a:ln w="0"/>
                 <a:solidFill>
                   <a:schemeClr val="bg1"/>
@@ -5294,7 +5269,7 @@
           <a:p>
             <a:pPr algn="ctr"/>
             <a:r>
-              <a:rPr lang="pt-BR" sz="2000" b="1" dirty="0" smtClean="0">
+              <a:rPr lang="pt-BR" sz="2000" b="1" dirty="0">
                 <a:ln w="0"/>
                 <a:solidFill>
                   <a:schemeClr val="bg1"/>
@@ -5432,7 +5407,7 @@
           <a:p>
             <a:pPr algn="ctr"/>
             <a:r>
-              <a:rPr lang="pt-BR" sz="2800" b="1" dirty="0" smtClean="0">
+              <a:rPr lang="pt-BR" sz="2800" b="1" dirty="0">
                 <a:ln w="0"/>
                 <a:solidFill>
                   <a:schemeClr val="bg1"/>
@@ -5490,7 +5465,7 @@
           <a:p>
             <a:pPr algn="ctr"/>
             <a:r>
-              <a:rPr lang="pt-BR" sz="2000" b="1" dirty="0" smtClean="0">
+              <a:rPr lang="pt-BR" sz="2000" b="1" dirty="0">
                 <a:ln w="0"/>
                 <a:solidFill>
                   <a:schemeClr val="bg1"/>
@@ -5510,7 +5485,7 @@
           <a:p>
             <a:pPr algn="ctr"/>
             <a:r>
-              <a:rPr lang="pt-BR" sz="2000" b="1" cap="none" spc="0" dirty="0" smtClean="0">
+              <a:rPr lang="pt-BR" sz="2000" b="1" cap="none" spc="0" dirty="0">
                 <a:ln w="0"/>
                 <a:solidFill>
                   <a:schemeClr val="bg1"/>
@@ -5530,7 +5505,7 @@
           <a:p>
             <a:pPr algn="ctr"/>
             <a:r>
-              <a:rPr lang="pt-BR" sz="2000" b="1" cap="none" spc="0" dirty="0" smtClean="0">
+              <a:rPr lang="pt-BR" sz="2000" b="1" cap="none" spc="0" dirty="0">
                 <a:ln w="0"/>
                 <a:solidFill>
                   <a:schemeClr val="bg1"/>
@@ -5546,20 +5521,6 @@
               </a:rPr>
               <a:t>20% a 90%</a:t>
             </a:r>
-            <a:endParaRPr lang="pt-BR" sz="2000" b="1" cap="none" spc="0" dirty="0">
-              <a:ln w="0"/>
-              <a:solidFill>
-                <a:schemeClr val="bg1"/>
-              </a:solidFill>
-              <a:effectLst>
-                <a:outerShdw blurRad="38100" dist="19050" dir="2700000" algn="tl" rotWithShape="0">
-                  <a:schemeClr val="dk1">
-                    <a:alpha val="40000"/>
-                  </a:schemeClr>
-                </a:outerShdw>
-              </a:effectLst>
-              <a:latin typeface="Exo 2 Extra Light" panose="00000300000000000000" pitchFamily="50" charset="0"/>
-            </a:endParaRPr>
           </a:p>
         </p:txBody>
       </p:sp>
@@ -5587,7 +5548,7 @@
           <a:lstStyle/>
           <a:p>
             <a:r>
-              <a:rPr lang="pt-BR" b="1" dirty="0" smtClean="0">
+              <a:rPr lang="pt-BR" b="1" dirty="0">
                 <a:ln w="0"/>
                 <a:solidFill>
                   <a:schemeClr val="bg1"/>
@@ -5644,7 +5605,7 @@
           <a:p>
             <a:pPr algn="ctr"/>
             <a:r>
-              <a:rPr lang="pt-BR" sz="4400" b="1" cap="none" spc="0" dirty="0" smtClean="0">
+              <a:rPr lang="pt-BR" sz="4400" b="1" cap="none" spc="0" dirty="0">
                 <a:ln w="10160">
                   <a:solidFill>
                     <a:schemeClr val="accent6"/>
@@ -5664,24 +5625,6 @@
               </a:rPr>
               <a:t>LUCAS</a:t>
             </a:r>
-            <a:endParaRPr lang="pt-BR" sz="4400" b="1" cap="none" spc="0" dirty="0">
-              <a:ln w="10160">
-                <a:solidFill>
-                  <a:schemeClr val="accent6"/>
-                </a:solidFill>
-                <a:prstDash val="solid"/>
-              </a:ln>
-              <a:solidFill>
-                <a:schemeClr val="accent6"/>
-              </a:solidFill>
-              <a:effectLst>
-                <a:outerShdw blurRad="38100" dist="22860" dir="5400000" algn="tl" rotWithShape="0">
-                  <a:srgbClr val="000000">
-                    <a:alpha val="30000"/>
-                  </a:srgbClr>
-                </a:outerShdw>
-              </a:effectLst>
-            </a:endParaRPr>
           </a:p>
         </p:txBody>
       </p:sp>
@@ -5695,13 +5638,6 @@
   <p:clrMapOvr>
     <a:masterClrMapping/>
   </p:clrMapOvr>
-  <p:timing>
-    <p:tnLst>
-      <p:par>
-        <p:cTn id="1" dur="indefinite" restart="never" nodeType="tmRoot"/>
-      </p:par>
-    </p:tnLst>
-  </p:timing>
 </p:sld>
 </file>
 
@@ -5839,7 +5775,7 @@
           <a:p>
             <a:pPr algn="just"/>
             <a:r>
-              <a:rPr lang="pt-BR" sz="3200" b="1" cap="none" spc="0" dirty="0" smtClean="0">
+              <a:rPr lang="pt-BR" sz="3200" b="1" cap="none" spc="0" dirty="0">
                 <a:ln w="0"/>
                 <a:solidFill>
                   <a:schemeClr val="bg1"/>
@@ -5855,20 +5791,6 @@
               </a:rPr>
               <a:t>BANCO DE DADOS</a:t>
             </a:r>
-            <a:endParaRPr lang="pt-BR" sz="3200" b="1" cap="none" spc="0" dirty="0">
-              <a:ln w="0"/>
-              <a:solidFill>
-                <a:schemeClr val="bg1"/>
-              </a:solidFill>
-              <a:effectLst>
-                <a:outerShdw blurRad="38100" dist="19050" dir="2700000" algn="tl" rotWithShape="0">
-                  <a:schemeClr val="dk1">
-                    <a:alpha val="40000"/>
-                  </a:schemeClr>
-                </a:outerShdw>
-              </a:effectLst>
-              <a:latin typeface="Exo 2 Medium" panose="00000600000000000000" pitchFamily="50" charset="0"/>
-            </a:endParaRPr>
           </a:p>
         </p:txBody>
       </p:sp>
@@ -6101,7 +6023,7 @@
           <a:p>
             <a:pPr algn="ctr"/>
             <a:r>
-              <a:rPr lang="pt-BR" sz="4400" b="1" cap="none" spc="0" dirty="0" smtClean="0">
+              <a:rPr lang="pt-BR" sz="4400" b="1" cap="none" spc="0" dirty="0">
                 <a:ln w="10160">
                   <a:solidFill>
                     <a:schemeClr val="accent6"/>
@@ -6121,24 +6043,6 @@
               </a:rPr>
               <a:t>LUCAS</a:t>
             </a:r>
-            <a:endParaRPr lang="pt-BR" sz="4400" b="1" cap="none" spc="0" dirty="0">
-              <a:ln w="10160">
-                <a:solidFill>
-                  <a:schemeClr val="accent6"/>
-                </a:solidFill>
-                <a:prstDash val="solid"/>
-              </a:ln>
-              <a:solidFill>
-                <a:schemeClr val="accent6"/>
-              </a:solidFill>
-              <a:effectLst>
-                <a:outerShdw blurRad="38100" dist="22860" dir="5400000" algn="tl" rotWithShape="0">
-                  <a:srgbClr val="000000">
-                    <a:alpha val="30000"/>
-                  </a:srgbClr>
-                </a:outerShdw>
-              </a:effectLst>
-            </a:endParaRPr>
           </a:p>
         </p:txBody>
       </p:sp>
@@ -6152,21 +6056,6 @@
   <p:clrMapOvr>
     <a:masterClrMapping/>
   </p:clrMapOvr>
-  <mc:AlternateContent xmlns:mc="http://schemas.openxmlformats.org/markup-compatibility/2006" xmlns:p14="http://schemas.microsoft.com/office/powerpoint/2010/main">
-    <mc:Choice Requires="p14">
-      <p:transition p14:dur="0"/>
-    </mc:Choice>
-    <mc:Fallback xmlns="">
-      <p:transition/>
-    </mc:Fallback>
-  </mc:AlternateContent>
-  <p:timing>
-    <p:tnLst>
-      <p:par>
-        <p:cTn id="1" dur="indefinite" restart="never" nodeType="tmRoot"/>
-      </p:par>
-    </p:tnLst>
-  </p:timing>
 </p:sld>
 </file>
 
@@ -6348,7 +6237,7 @@
           <a:p>
             <a:pPr algn="just"/>
             <a:r>
-              <a:rPr lang="pt-BR" sz="3200" b="1" cap="none" spc="0" dirty="0" smtClean="0">
+              <a:rPr lang="pt-BR" sz="3200" b="1" cap="none" spc="0" dirty="0">
                 <a:ln w="0"/>
                 <a:solidFill>
                   <a:schemeClr val="bg1"/>
@@ -6364,20 +6253,6 @@
               </a:rPr>
               <a:t>MODELO DE DADOS</a:t>
             </a:r>
-            <a:endParaRPr lang="pt-BR" sz="3200" b="1" cap="none" spc="0" dirty="0">
-              <a:ln w="0"/>
-              <a:solidFill>
-                <a:schemeClr val="bg1"/>
-              </a:solidFill>
-              <a:effectLst>
-                <a:outerShdw blurRad="38100" dist="19050" dir="2700000" algn="tl" rotWithShape="0">
-                  <a:schemeClr val="dk1">
-                    <a:alpha val="40000"/>
-                  </a:schemeClr>
-                </a:outerShdw>
-              </a:effectLst>
-              <a:latin typeface="Exo 2 Medium" panose="00000600000000000000" pitchFamily="50" charset="0"/>
-            </a:endParaRPr>
           </a:p>
         </p:txBody>
       </p:sp>
@@ -6447,7 +6322,7 @@
           <a:p>
             <a:pPr algn="ctr"/>
             <a:r>
-              <a:rPr lang="pt-BR" sz="4400" b="1" cap="none" spc="0" dirty="0" smtClean="0">
+              <a:rPr lang="pt-BR" sz="4400" b="1" cap="none" spc="0" dirty="0">
                 <a:ln w="10160">
                   <a:solidFill>
                     <a:schemeClr val="accent6"/>
@@ -6467,24 +6342,6 @@
               </a:rPr>
               <a:t>LUCAS</a:t>
             </a:r>
-            <a:endParaRPr lang="pt-BR" sz="4400" b="1" cap="none" spc="0" dirty="0">
-              <a:ln w="10160">
-                <a:solidFill>
-                  <a:schemeClr val="accent6"/>
-                </a:solidFill>
-                <a:prstDash val="solid"/>
-              </a:ln>
-              <a:solidFill>
-                <a:schemeClr val="accent6"/>
-              </a:solidFill>
-              <a:effectLst>
-                <a:outerShdw blurRad="38100" dist="22860" dir="5400000" algn="tl" rotWithShape="0">
-                  <a:srgbClr val="000000">
-                    <a:alpha val="30000"/>
-                  </a:srgbClr>
-                </a:outerShdw>
-              </a:effectLst>
-            </a:endParaRPr>
           </a:p>
         </p:txBody>
       </p:sp>
@@ -6498,13 +6355,6 @@
   <p:clrMapOvr>
     <a:masterClrMapping/>
   </p:clrMapOvr>
-  <p:timing>
-    <p:tnLst>
-      <p:par>
-        <p:cTn id="1" dur="indefinite" restart="never" nodeType="tmRoot"/>
-      </p:par>
-    </p:tnLst>
-  </p:timing>
 </p:sld>
 </file>
 
@@ -6697,7 +6547,7 @@
           <a:p>
             <a:pPr algn="just"/>
             <a:r>
-              <a:rPr lang="pt-BR" sz="3200" b="1" cap="none" spc="0" dirty="0" smtClean="0">
+              <a:rPr lang="pt-BR" sz="3200" b="1" cap="none" spc="0" dirty="0">
                 <a:ln w="0"/>
                 <a:solidFill>
                   <a:schemeClr val="bg1"/>
@@ -6713,20 +6563,6 @@
               </a:rPr>
               <a:t>APLICAÇÃO – DESENHO DA SOLUÇÃO</a:t>
             </a:r>
-            <a:endParaRPr lang="pt-BR" sz="3200" b="1" cap="none" spc="0" dirty="0">
-              <a:ln w="0"/>
-              <a:solidFill>
-                <a:schemeClr val="bg1"/>
-              </a:solidFill>
-              <a:effectLst>
-                <a:outerShdw blurRad="38100" dist="19050" dir="2700000" algn="tl" rotWithShape="0">
-                  <a:schemeClr val="dk1">
-                    <a:alpha val="40000"/>
-                  </a:schemeClr>
-                </a:outerShdw>
-              </a:effectLst>
-              <a:latin typeface="Exo 2 Medium" panose="00000600000000000000" pitchFamily="50" charset="0"/>
-            </a:endParaRPr>
           </a:p>
         </p:txBody>
       </p:sp>
@@ -6796,7 +6632,7 @@
           <a:p>
             <a:pPr algn="ctr"/>
             <a:r>
-              <a:rPr lang="pt-BR" sz="4400" b="1" cap="none" spc="0" dirty="0" smtClean="0">
+              <a:rPr lang="pt-BR" sz="4400" b="1" cap="none" spc="0" dirty="0">
                 <a:ln w="10160">
                   <a:solidFill>
                     <a:schemeClr val="accent4">
@@ -6822,30 +6658,6 @@
               </a:rPr>
               <a:t>RODOLFO</a:t>
             </a:r>
-            <a:endParaRPr lang="pt-BR" sz="4400" b="1" cap="none" spc="0" dirty="0">
-              <a:ln w="10160">
-                <a:solidFill>
-                  <a:schemeClr val="accent4">
-                    <a:lumMod val="60000"/>
-                    <a:lumOff val="40000"/>
-                  </a:schemeClr>
-                </a:solidFill>
-                <a:prstDash val="solid"/>
-              </a:ln>
-              <a:solidFill>
-                <a:schemeClr val="accent4">
-                  <a:lumMod val="60000"/>
-                  <a:lumOff val="40000"/>
-                </a:schemeClr>
-              </a:solidFill>
-              <a:effectLst>
-                <a:outerShdw blurRad="38100" dist="22860" dir="5400000" algn="tl" rotWithShape="0">
-                  <a:srgbClr val="000000">
-                    <a:alpha val="30000"/>
-                  </a:srgbClr>
-                </a:outerShdw>
-              </a:effectLst>
-            </a:endParaRPr>
           </a:p>
         </p:txBody>
       </p:sp>
@@ -7224,7 +7036,7 @@
           <a:p>
             <a:pPr algn="ctr"/>
             <a:r>
-              <a:rPr lang="pt-BR" sz="2000" dirty="0" smtClean="0">
+              <a:rPr lang="pt-BR" sz="2000" dirty="0">
                 <a:ln w="0"/>
                 <a:solidFill>
                   <a:schemeClr val="bg1"/>
@@ -7240,20 +7052,6 @@
               </a:rPr>
               <a:t>Aplicação final</a:t>
             </a:r>
-            <a:endParaRPr lang="pt-BR" sz="2000" dirty="0">
-              <a:ln w="0"/>
-              <a:solidFill>
-                <a:schemeClr val="bg1"/>
-              </a:solidFill>
-              <a:effectLst>
-                <a:outerShdw blurRad="38100" dist="19050" dir="2700000" algn="tl" rotWithShape="0">
-                  <a:schemeClr val="dk1">
-                    <a:alpha val="40000"/>
-                  </a:schemeClr>
-                </a:outerShdw>
-              </a:effectLst>
-              <a:latin typeface="Exo 2 Medium" panose="00000600000000000000" pitchFamily="50" charset="0"/>
-            </a:endParaRPr>
           </a:p>
         </p:txBody>
       </p:sp>
@@ -7281,7 +7079,7 @@
           <a:p>
             <a:pPr algn="ctr"/>
             <a:r>
-              <a:rPr lang="pt-BR" sz="1600" dirty="0" smtClean="0">
+              <a:rPr lang="pt-BR" sz="1600" dirty="0">
                 <a:ln w="0"/>
                 <a:solidFill>
                   <a:schemeClr val="bg1"/>
@@ -7338,7 +7136,7 @@
           <a:p>
             <a:pPr algn="ctr"/>
             <a:r>
-              <a:rPr lang="pt-BR" sz="1600" dirty="0" smtClean="0">
+              <a:rPr lang="pt-BR" sz="1600" dirty="0">
                 <a:ln w="0"/>
                 <a:solidFill>
                   <a:schemeClr val="bg1"/>
@@ -7395,7 +7193,7 @@
           <a:p>
             <a:pPr algn="ctr"/>
             <a:r>
-              <a:rPr lang="pt-BR" sz="1600" dirty="0" smtClean="0">
+              <a:rPr lang="pt-BR" sz="1600" dirty="0">
                 <a:ln w="0"/>
                 <a:solidFill>
                   <a:schemeClr val="bg1"/>
@@ -7452,7 +7250,7 @@
           <a:p>
             <a:pPr algn="ctr"/>
             <a:r>
-              <a:rPr lang="pt-BR" sz="1600" b="0" cap="none" spc="0" dirty="0" smtClean="0">
+              <a:rPr lang="pt-BR" sz="1600" b="0" cap="none" spc="0" dirty="0">
                 <a:ln w="0"/>
                 <a:solidFill>
                   <a:schemeClr val="bg1"/>
@@ -7468,20 +7266,6 @@
               </a:rPr>
               <a:t>Cabo USB</a:t>
             </a:r>
-            <a:endParaRPr lang="pt-BR" sz="1600" b="0" cap="none" spc="0" dirty="0">
-              <a:ln w="0"/>
-              <a:solidFill>
-                <a:schemeClr val="bg1"/>
-              </a:solidFill>
-              <a:effectLst>
-                <a:outerShdw blurRad="38100" dist="19050" dir="2700000" algn="tl" rotWithShape="0">
-                  <a:schemeClr val="dk1">
-                    <a:alpha val="40000"/>
-                  </a:schemeClr>
-                </a:outerShdw>
-              </a:effectLst>
-              <a:latin typeface="Exo 2 Extra Light" panose="00000300000000000000" pitchFamily="50" charset="0"/>
-            </a:endParaRPr>
           </a:p>
         </p:txBody>
       </p:sp>
@@ -7757,7 +7541,7 @@
           <a:p>
             <a:pPr algn="ctr"/>
             <a:r>
-              <a:rPr lang="pt-BR" sz="2400" dirty="0" smtClean="0">
+              <a:rPr lang="pt-BR" sz="2400" dirty="0">
                 <a:ln w="0"/>
                 <a:solidFill>
                   <a:schemeClr val="bg1"/>
@@ -7972,7 +7756,7 @@
           <a:p>
             <a:pPr algn="ctr"/>
             <a:r>
-              <a:rPr lang="pt-BR" sz="2000" dirty="0" smtClean="0">
+              <a:rPr lang="pt-BR" sz="2000" dirty="0">
                 <a:ln w="0"/>
                 <a:solidFill>
                   <a:schemeClr val="bg1"/>
@@ -8029,7 +7813,7 @@
           <a:p>
             <a:pPr algn="r"/>
             <a:r>
-              <a:rPr lang="pt-BR" sz="1600" dirty="0" smtClean="0">
+              <a:rPr lang="pt-BR" sz="1600" dirty="0">
                 <a:ln w="0"/>
                 <a:solidFill>
                   <a:schemeClr val="bg1"/>
@@ -8086,7 +7870,7 @@
           <a:p>
             <a:pPr algn="r"/>
             <a:r>
-              <a:rPr lang="pt-BR" sz="1600" dirty="0" smtClean="0">
+              <a:rPr lang="pt-BR" sz="1600" dirty="0">
                 <a:ln w="0"/>
                 <a:solidFill>
                   <a:schemeClr val="bg1"/>
@@ -8106,7 +7890,7 @@
           <a:p>
             <a:pPr algn="r"/>
             <a:r>
-              <a:rPr lang="pt-BR" sz="1600" b="0" cap="none" spc="0" dirty="0" smtClean="0">
+              <a:rPr lang="pt-BR" sz="1600" b="0" cap="none" spc="0" dirty="0">
                 <a:ln w="0"/>
                 <a:solidFill>
                   <a:schemeClr val="bg1"/>
@@ -8126,7 +7910,7 @@
           <a:p>
             <a:pPr algn="r"/>
             <a:r>
-              <a:rPr lang="pt-BR" sz="1600" b="0" cap="none" spc="0" dirty="0" smtClean="0">
+              <a:rPr lang="pt-BR" sz="1600" b="0" cap="none" spc="0" dirty="0">
                 <a:ln w="0"/>
                 <a:solidFill>
                   <a:schemeClr val="bg1"/>
@@ -8429,7 +8213,7 @@
           <a:lstStyle/>
           <a:p>
             <a:r>
-              <a:rPr lang="pt-BR" sz="1600" dirty="0" smtClean="0">
+              <a:rPr lang="pt-BR" sz="1600" dirty="0">
                 <a:ln w="0"/>
                 <a:solidFill>
                   <a:schemeClr val="bg1"/>
@@ -8448,7 +8232,7 @@
           </a:p>
           <a:p>
             <a:r>
-              <a:rPr lang="pt-BR" sz="1600" cap="none" spc="0" dirty="0" smtClean="0">
+              <a:rPr lang="pt-BR" sz="1600" cap="none" spc="0" dirty="0">
                 <a:ln w="0"/>
                 <a:solidFill>
                   <a:schemeClr val="bg1"/>
@@ -8467,7 +8251,7 @@
           </a:p>
           <a:p>
             <a:r>
-              <a:rPr lang="pt-BR" sz="1600" dirty="0" smtClean="0">
+              <a:rPr lang="pt-BR" sz="1600" dirty="0">
                 <a:ln w="0"/>
                 <a:solidFill>
                   <a:schemeClr val="bg1"/>
@@ -8510,13 +8294,6 @@
   <p:clrMapOvr>
     <a:masterClrMapping/>
   </p:clrMapOvr>
-  <p:timing>
-    <p:tnLst>
-      <p:par>
-        <p:cTn id="1" dur="indefinite" restart="never" nodeType="tmRoot"/>
-      </p:par>
-    </p:tnLst>
-  </p:timing>
 </p:sld>
 </file>
 
@@ -8669,7 +8446,7 @@
           <a:p>
             <a:pPr algn="just"/>
             <a:r>
-              <a:rPr lang="pt-BR" sz="3200" b="1" dirty="0" smtClean="0">
+              <a:rPr lang="pt-BR" sz="3200" b="1" dirty="0">
                 <a:ln w="0"/>
                 <a:solidFill>
                   <a:schemeClr val="bg1"/>
@@ -9348,7 +9125,7 @@
           <a:p>
             <a:pPr algn="ctr"/>
             <a:r>
-              <a:rPr lang="pt-BR" b="1" dirty="0" smtClean="0">
+              <a:rPr lang="pt-BR" b="1" dirty="0">
                 <a:ln w="0"/>
                 <a:solidFill>
                   <a:schemeClr val="bg1"/>
@@ -9406,7 +9183,7 @@
           <a:p>
             <a:pPr algn="ctr"/>
             <a:r>
-              <a:rPr lang="pt-BR" b="1" dirty="0" smtClean="0">
+              <a:rPr lang="pt-BR" b="1" dirty="0">
                 <a:ln w="0"/>
                 <a:solidFill>
                   <a:schemeClr val="bg1"/>
@@ -9464,7 +9241,7 @@
           <a:p>
             <a:pPr algn="ctr"/>
             <a:r>
-              <a:rPr lang="pt-BR" b="1" dirty="0" smtClean="0">
+              <a:rPr lang="pt-BR" b="1" dirty="0">
                 <a:ln w="0"/>
                 <a:solidFill>
                   <a:schemeClr val="bg1"/>
@@ -9522,7 +9299,7 @@
           <a:p>
             <a:pPr algn="r"/>
             <a:r>
-              <a:rPr lang="pt-BR" b="1" dirty="0" smtClean="0">
+              <a:rPr lang="pt-BR" b="1" dirty="0">
                 <a:ln w="0"/>
                 <a:solidFill>
                   <a:schemeClr val="bg1"/>
@@ -9542,7 +9319,7 @@
           <a:p>
             <a:pPr algn="r"/>
             <a:r>
-              <a:rPr lang="pt-BR" b="1" dirty="0" smtClean="0">
+              <a:rPr lang="pt-BR" b="1" dirty="0">
                 <a:ln w="0"/>
                 <a:solidFill>
                   <a:schemeClr val="bg1"/>
@@ -9562,7 +9339,7 @@
           <a:p>
             <a:pPr algn="r"/>
             <a:r>
-              <a:rPr lang="pt-BR" b="1" dirty="0" smtClean="0">
+              <a:rPr lang="pt-BR" b="1" dirty="0">
                 <a:ln w="0"/>
                 <a:solidFill>
                   <a:schemeClr val="bg1"/>
@@ -9711,7 +9488,7 @@
           <a:p>
             <a:pPr algn="ctr"/>
             <a:r>
-              <a:rPr lang="pt-BR" sz="2000" b="1" dirty="0" smtClean="0">
+              <a:rPr lang="pt-BR" sz="2000" b="1" dirty="0">
                 <a:ln w="0"/>
                 <a:solidFill>
                   <a:schemeClr val="bg1"/>
@@ -9769,7 +9546,7 @@
           <a:p>
             <a:pPr algn="ctr"/>
             <a:r>
-              <a:rPr lang="pt-BR" sz="2000" b="1" dirty="0" smtClean="0">
+              <a:rPr lang="pt-BR" sz="2000" b="1" dirty="0">
                 <a:ln w="0"/>
                 <a:solidFill>
                   <a:schemeClr val="bg1"/>
@@ -9827,7 +9604,7 @@
           <a:p>
             <a:pPr algn="ctr"/>
             <a:r>
-              <a:rPr lang="pt-BR" sz="2000" b="1" dirty="0" smtClean="0">
+              <a:rPr lang="pt-BR" sz="2000" b="1" dirty="0">
                 <a:ln w="0"/>
                 <a:solidFill>
                   <a:schemeClr val="bg1"/>
@@ -10372,7 +10149,7 @@
           <a:p>
             <a:pPr algn="ctr"/>
             <a:r>
-              <a:rPr lang="pt-BR" b="1" dirty="0" smtClean="0">
+              <a:rPr lang="pt-BR" b="1" dirty="0">
                 <a:ln w="0"/>
                 <a:solidFill>
                   <a:schemeClr val="bg1"/>
@@ -10430,7 +10207,7 @@
           <a:p>
             <a:pPr algn="ctr"/>
             <a:r>
-              <a:rPr lang="pt-BR" b="1" dirty="0" smtClean="0">
+              <a:rPr lang="pt-BR" b="1" dirty="0">
                 <a:ln w="0"/>
                 <a:solidFill>
                   <a:schemeClr val="bg1"/>
@@ -10487,7 +10264,7 @@
           <a:p>
             <a:pPr algn="ctr"/>
             <a:r>
-              <a:rPr lang="pt-BR" sz="4400" b="1" cap="none" spc="0" dirty="0" smtClean="0">
+              <a:rPr lang="pt-BR" sz="4400" b="1" cap="none" spc="0" dirty="0">
                 <a:ln w="10160">
                   <a:solidFill>
                     <a:schemeClr val="accent4">
@@ -10513,30 +10290,6 @@
               </a:rPr>
               <a:t>RODOLFO</a:t>
             </a:r>
-            <a:endParaRPr lang="pt-BR" sz="4400" b="1" cap="none" spc="0" dirty="0">
-              <a:ln w="10160">
-                <a:solidFill>
-                  <a:schemeClr val="accent4">
-                    <a:lumMod val="60000"/>
-                    <a:lumOff val="40000"/>
-                  </a:schemeClr>
-                </a:solidFill>
-                <a:prstDash val="solid"/>
-              </a:ln>
-              <a:solidFill>
-                <a:schemeClr val="accent4">
-                  <a:lumMod val="60000"/>
-                  <a:lumOff val="40000"/>
-                </a:schemeClr>
-              </a:solidFill>
-              <a:effectLst>
-                <a:outerShdw blurRad="38100" dist="22860" dir="5400000" algn="tl" rotWithShape="0">
-                  <a:srgbClr val="000000">
-                    <a:alpha val="30000"/>
-                  </a:srgbClr>
-                </a:outerShdw>
-              </a:effectLst>
-            </a:endParaRPr>
           </a:p>
         </p:txBody>
       </p:sp>
@@ -10550,13 +10303,6 @@
   <p:clrMapOvr>
     <a:masterClrMapping/>
   </p:clrMapOvr>
-  <p:timing>
-    <p:tnLst>
-      <p:par>
-        <p:cTn id="1" dur="indefinite" restart="never" nodeType="tmRoot"/>
-      </p:par>
-    </p:tnLst>
-  </p:timing>
 </p:sld>
 </file>
 
@@ -10709,7 +10455,7 @@
           <a:p>
             <a:pPr algn="just"/>
             <a:r>
-              <a:rPr lang="pt-BR" sz="3200" b="1" dirty="0" smtClean="0">
+              <a:rPr lang="pt-BR" sz="3200" b="1" dirty="0">
                 <a:ln w="0"/>
                 <a:solidFill>
                   <a:schemeClr val="bg1"/>
@@ -10784,127 +10530,110 @@
           </a:fontRef>
         </p:style>
       </p:cxnSp>
-      <p:pic>
-        <p:nvPicPr>
-          <p:cNvPr id="2054" name="Picture 6" descr="Resultado de imagem para MONITOR VECTOR"/>
-          <p:cNvPicPr>
-            <a:picLocks noChangeAspect="1" noChangeArrowheads="1"/>
-          </p:cNvPicPr>
-          <p:nvPr/>
-        </p:nvPicPr>
-        <p:blipFill>
-          <a:blip r:embed="rId4">
+      <p:grpSp>
+        <p:nvGrpSpPr>
+          <p:cNvPr id="8" name="Agrupar 7">
             <a:extLst>
-              <a:ext uri="{28A0092B-C50C-407E-A947-70E740481C1C}">
-                <a14:useLocalDpi xmlns:a14="http://schemas.microsoft.com/office/drawing/2010/main" val="0"/>
+              <a:ext uri="{FF2B5EF4-FFF2-40B4-BE49-F238E27FC236}">
+                <a16:creationId xmlns:a16="http://schemas.microsoft.com/office/drawing/2014/main" id="{153C3B9E-A4D1-44C4-8606-47C0B0C7C645}"/>
               </a:ext>
             </a:extLst>
-          </a:blip>
-          <a:srcRect/>
-          <a:stretch>
-            <a:fillRect/>
-          </a:stretch>
-        </p:blipFill>
-        <p:spPr bwMode="auto">
+          </p:cNvPr>
+          <p:cNvGrpSpPr/>
+          <p:nvPr/>
+        </p:nvGrpSpPr>
+        <p:grpSpPr>
           <a:xfrm>
             <a:off x="2997752" y="1577931"/>
             <a:ext cx="5769106" cy="4485699"/>
-          </a:xfrm>
-          <a:prstGeom prst="rect">
-            <a:avLst/>
-          </a:prstGeom>
-          <a:noFill/>
-          <a:extLst>
-            <a:ext uri="{909E8E84-426E-40DD-AFC4-6F175D3DCCD1}">
-              <a14:hiddenFill xmlns:a14="http://schemas.microsoft.com/office/drawing/2010/main">
-                <a:solidFill>
-                  <a:srgbClr val="FFFFFF"/>
-                </a:solidFill>
-              </a14:hiddenFill>
-            </a:ext>
-          </a:extLst>
-        </p:spPr>
-      </p:pic>
-      <p:pic>
-        <p:nvPicPr>
-          <p:cNvPr id="2056" name="Picture 8" descr="Resultado de imagem para TABLET VECTOR"/>
-          <p:cNvPicPr>
-            <a:picLocks noChangeAspect="1" noChangeArrowheads="1"/>
-          </p:cNvPicPr>
-          <p:nvPr/>
-        </p:nvPicPr>
-        <p:blipFill rotWithShape="1">
-          <a:blip r:embed="rId5">
+            <a:chOff x="2997752" y="1577931"/>
+            <a:chExt cx="5769106" cy="4485699"/>
+          </a:xfrm>
+        </p:grpSpPr>
+        <p:pic>
+          <p:nvPicPr>
+            <p:cNvPr id="2054" name="Picture 6" descr="Resultado de imagem para MONITOR VECTOR"/>
+            <p:cNvPicPr>
+              <a:picLocks noChangeAspect="1" noChangeArrowheads="1"/>
+            </p:cNvPicPr>
+            <p:nvPr/>
+          </p:nvPicPr>
+          <p:blipFill>
+            <a:blip r:embed="rId4">
+              <a:extLst>
+                <a:ext uri="{28A0092B-C50C-407E-A947-70E740481C1C}">
+                  <a14:useLocalDpi xmlns:a14="http://schemas.microsoft.com/office/drawing/2010/main" val="0"/>
+                </a:ext>
+              </a:extLst>
+            </a:blip>
+            <a:srcRect/>
+            <a:stretch>
+              <a:fillRect/>
+            </a:stretch>
+          </p:blipFill>
+          <p:spPr bwMode="auto">
+            <a:xfrm>
+              <a:off x="2997752" y="1577931"/>
+              <a:ext cx="5769106" cy="4485699"/>
+            </a:xfrm>
+            <a:prstGeom prst="rect">
+              <a:avLst/>
+            </a:prstGeom>
+            <a:noFill/>
             <a:extLst>
-              <a:ext uri="{28A0092B-C50C-407E-A947-70E740481C1C}">
-                <a14:useLocalDpi xmlns:a14="http://schemas.microsoft.com/office/drawing/2010/main" val="0"/>
+              <a:ext uri="{909E8E84-426E-40DD-AFC4-6F175D3DCCD1}">
+                <a14:hiddenFill xmlns:a14="http://schemas.microsoft.com/office/drawing/2010/main">
+                  <a:solidFill>
+                    <a:srgbClr val="FFFFFF"/>
+                  </a:solidFill>
+                </a14:hiddenFill>
               </a:ext>
             </a:extLst>
-          </a:blip>
-          <a:srcRect l="16150" t="5208" r="16628" b="5533"/>
-          <a:stretch/>
-        </p:blipFill>
-        <p:spPr bwMode="auto">
-          <a:xfrm>
-            <a:off x="7534960" y="2912193"/>
-            <a:ext cx="2467074" cy="3275839"/>
-          </a:xfrm>
-          <a:prstGeom prst="rect">
-            <a:avLst/>
-          </a:prstGeom>
-          <a:noFill/>
-          <a:extLst>
-            <a:ext uri="{909E8E84-426E-40DD-AFC4-6F175D3DCCD1}">
-              <a14:hiddenFill xmlns:a14="http://schemas.microsoft.com/office/drawing/2010/main">
-                <a:solidFill>
-                  <a:srgbClr val="FFFFFF"/>
-                </a:solidFill>
-              </a14:hiddenFill>
-            </a:ext>
-          </a:extLst>
-        </p:spPr>
-      </p:pic>
-      <p:pic>
-        <p:nvPicPr>
-          <p:cNvPr id="2058" name="Picture 10" descr="Resultado de imagem para IPHONE VECTOR"/>
-          <p:cNvPicPr>
-            <a:picLocks noChangeAspect="1" noChangeArrowheads="1"/>
-          </p:cNvPicPr>
-          <p:nvPr/>
-        </p:nvPicPr>
-        <p:blipFill>
-          <a:blip r:embed="rId6" cstate="print">
-            <a:extLst>
-              <a:ext uri="{28A0092B-C50C-407E-A947-70E740481C1C}">
-                <a14:useLocalDpi xmlns:a14="http://schemas.microsoft.com/office/drawing/2010/main" val="0"/>
-              </a:ext>
-            </a:extLst>
-          </a:blip>
-          <a:srcRect/>
-          <a:stretch>
-            <a:fillRect/>
-          </a:stretch>
-        </p:blipFill>
-        <p:spPr bwMode="auto">
-          <a:xfrm>
-            <a:off x="2633244" y="4025899"/>
-            <a:ext cx="1038599" cy="2170461"/>
-          </a:xfrm>
-          <a:prstGeom prst="rect">
-            <a:avLst/>
-          </a:prstGeom>
-          <a:noFill/>
-          <a:extLst>
-            <a:ext uri="{909E8E84-426E-40DD-AFC4-6F175D3DCCD1}">
-              <a14:hiddenFill xmlns:a14="http://schemas.microsoft.com/office/drawing/2010/main">
-                <a:solidFill>
-                  <a:srgbClr val="FFFFFF"/>
-                </a:solidFill>
-              </a14:hiddenFill>
-            </a:ext>
-          </a:extLst>
-        </p:spPr>
-      </p:pic>
+          </p:spPr>
+        </p:pic>
+        <p:pic>
+          <p:nvPicPr>
+            <p:cNvPr id="2" name="Imagem 1">
+              <a:extLst>
+                <a:ext uri="{FF2B5EF4-FFF2-40B4-BE49-F238E27FC236}">
+                  <a16:creationId xmlns:a16="http://schemas.microsoft.com/office/drawing/2014/main" id="{9C31B254-0017-4F74-8459-F8999F979290}"/>
+                </a:ext>
+              </a:extLst>
+            </p:cNvPr>
+            <p:cNvPicPr>
+              <a:picLocks noChangeAspect="1"/>
+            </p:cNvPicPr>
+            <p:nvPr/>
+          </p:nvPicPr>
+          <p:blipFill>
+            <a:blip r:embed="rId5">
+              <a:extLst>
+                <a:ext uri="{BEBA8EAE-BF5A-486C-A8C5-ECC9F3942E4B}">
+                  <a14:imgProps xmlns:a14="http://schemas.microsoft.com/office/drawing/2010/main">
+                    <a14:imgLayer r:embed="rId6">
+                      <a14:imgEffect>
+                        <a14:brightnessContrast bright="-7000"/>
+                      </a14:imgEffect>
+                    </a14:imgLayer>
+                  </a14:imgProps>
+                </a:ext>
+              </a:extLst>
+            </a:blip>
+            <a:stretch>
+              <a:fillRect/>
+            </a:stretch>
+          </p:blipFill>
+          <p:spPr>
+            <a:xfrm>
+              <a:off x="3207848" y="1818167"/>
+              <a:ext cx="5351361" cy="2604977"/>
+            </a:xfrm>
+            <a:prstGeom prst="rect">
+              <a:avLst/>
+            </a:prstGeom>
+          </p:spPr>
+        </p:pic>
+      </p:grpSp>
       <p:sp>
         <p:nvSpPr>
           <p:cNvPr id="13" name="Retângulo 12"/>
@@ -10929,7 +10658,7 @@
           <a:p>
             <a:pPr algn="ctr"/>
             <a:r>
-              <a:rPr lang="pt-BR" sz="4400" b="1" cap="none" spc="0" dirty="0" smtClean="0">
+              <a:rPr lang="pt-BR" sz="4400" b="1" cap="none" spc="0" dirty="0">
                 <a:ln w="10160">
                   <a:solidFill>
                     <a:schemeClr val="accent4">
@@ -10955,33 +10684,215 @@
               </a:rPr>
               <a:t>RODOLFO</a:t>
             </a:r>
-            <a:endParaRPr lang="pt-BR" sz="4400" b="1" cap="none" spc="0" dirty="0">
-              <a:ln w="10160">
-                <a:solidFill>
-                  <a:schemeClr val="accent4">
-                    <a:lumMod val="60000"/>
-                    <a:lumOff val="40000"/>
-                  </a:schemeClr>
-                </a:solidFill>
-                <a:prstDash val="solid"/>
-              </a:ln>
-              <a:solidFill>
-                <a:schemeClr val="accent4">
-                  <a:lumMod val="60000"/>
-                  <a:lumOff val="40000"/>
-                </a:schemeClr>
-              </a:solidFill>
-              <a:effectLst>
-                <a:outerShdw blurRad="38100" dist="22860" dir="5400000" algn="tl" rotWithShape="0">
-                  <a:srgbClr val="000000">
-                    <a:alpha val="30000"/>
-                  </a:srgbClr>
-                </a:outerShdw>
-              </a:effectLst>
-            </a:endParaRPr>
           </a:p>
         </p:txBody>
       </p:sp>
+      <p:grpSp>
+        <p:nvGrpSpPr>
+          <p:cNvPr id="9" name="Agrupar 8">
+            <a:extLst>
+              <a:ext uri="{FF2B5EF4-FFF2-40B4-BE49-F238E27FC236}">
+                <a16:creationId xmlns:a16="http://schemas.microsoft.com/office/drawing/2014/main" id="{34F71602-B395-44B6-8887-E14CAEF64ADB}"/>
+              </a:ext>
+            </a:extLst>
+          </p:cNvPr>
+          <p:cNvGrpSpPr/>
+          <p:nvPr/>
+        </p:nvGrpSpPr>
+        <p:grpSpPr>
+          <a:xfrm>
+            <a:off x="7534960" y="2912193"/>
+            <a:ext cx="2467074" cy="3275839"/>
+            <a:chOff x="7534960" y="2912193"/>
+            <a:chExt cx="2467074" cy="3275839"/>
+          </a:xfrm>
+        </p:grpSpPr>
+        <p:pic>
+          <p:nvPicPr>
+            <p:cNvPr id="2056" name="Picture 8" descr="Resultado de imagem para TABLET VECTOR"/>
+            <p:cNvPicPr>
+              <a:picLocks noChangeAspect="1" noChangeArrowheads="1"/>
+            </p:cNvPicPr>
+            <p:nvPr/>
+          </p:nvPicPr>
+          <p:blipFill rotWithShape="1">
+            <a:blip r:embed="rId7">
+              <a:extLst>
+                <a:ext uri="{28A0092B-C50C-407E-A947-70E740481C1C}">
+                  <a14:useLocalDpi xmlns:a14="http://schemas.microsoft.com/office/drawing/2010/main" val="0"/>
+                </a:ext>
+              </a:extLst>
+            </a:blip>
+            <a:srcRect l="16150" t="5208" r="16628" b="5533"/>
+            <a:stretch/>
+          </p:blipFill>
+          <p:spPr bwMode="auto">
+            <a:xfrm>
+              <a:off x="7534960" y="2912193"/>
+              <a:ext cx="2467074" cy="3275839"/>
+            </a:xfrm>
+            <a:prstGeom prst="rect">
+              <a:avLst/>
+            </a:prstGeom>
+            <a:noFill/>
+            <a:extLst>
+              <a:ext uri="{909E8E84-426E-40DD-AFC4-6F175D3DCCD1}">
+                <a14:hiddenFill xmlns:a14="http://schemas.microsoft.com/office/drawing/2010/main">
+                  <a:solidFill>
+                    <a:srgbClr val="FFFFFF"/>
+                  </a:solidFill>
+                </a14:hiddenFill>
+              </a:ext>
+            </a:extLst>
+          </p:spPr>
+        </p:pic>
+        <p:pic>
+          <p:nvPicPr>
+            <p:cNvPr id="3" name="Imagem 2">
+              <a:extLst>
+                <a:ext uri="{FF2B5EF4-FFF2-40B4-BE49-F238E27FC236}">
+                  <a16:creationId xmlns:a16="http://schemas.microsoft.com/office/drawing/2014/main" id="{BC04278F-2736-403F-AF79-4AA72B6EAE7F}"/>
+                </a:ext>
+              </a:extLst>
+            </p:cNvPr>
+            <p:cNvPicPr>
+              <a:picLocks noChangeAspect="1"/>
+            </p:cNvPicPr>
+            <p:nvPr/>
+          </p:nvPicPr>
+          <p:blipFill>
+            <a:blip r:embed="rId8">
+              <a:extLst>
+                <a:ext uri="{BEBA8EAE-BF5A-486C-A8C5-ECC9F3942E4B}">
+                  <a14:imgProps xmlns:a14="http://schemas.microsoft.com/office/drawing/2010/main">
+                    <a14:imgLayer r:embed="rId9">
+                      <a14:imgEffect>
+                        <a14:brightnessContrast bright="-6000"/>
+                      </a14:imgEffect>
+                    </a14:imgLayer>
+                  </a14:imgProps>
+                </a:ext>
+              </a:extLst>
+            </a:blip>
+            <a:stretch>
+              <a:fillRect/>
+            </a:stretch>
+          </p:blipFill>
+          <p:spPr>
+            <a:xfrm>
+              <a:off x="7697971" y="3170848"/>
+              <a:ext cx="2158409" cy="2746862"/>
+            </a:xfrm>
+            <a:prstGeom prst="rect">
+              <a:avLst/>
+            </a:prstGeom>
+          </p:spPr>
+        </p:pic>
+      </p:grpSp>
+      <p:grpSp>
+        <p:nvGrpSpPr>
+          <p:cNvPr id="10" name="Agrupar 9">
+            <a:extLst>
+              <a:ext uri="{FF2B5EF4-FFF2-40B4-BE49-F238E27FC236}">
+                <a16:creationId xmlns:a16="http://schemas.microsoft.com/office/drawing/2014/main" id="{147FD79B-9A67-4EFD-8CD7-15E488ACC61D}"/>
+              </a:ext>
+            </a:extLst>
+          </p:cNvPr>
+          <p:cNvGrpSpPr/>
+          <p:nvPr/>
+        </p:nvGrpSpPr>
+        <p:grpSpPr>
+          <a:xfrm>
+            <a:off x="2633244" y="4025899"/>
+            <a:ext cx="1038599" cy="2170461"/>
+            <a:chOff x="2633244" y="4025899"/>
+            <a:chExt cx="1038599" cy="2170461"/>
+          </a:xfrm>
+        </p:grpSpPr>
+        <p:pic>
+          <p:nvPicPr>
+            <p:cNvPr id="2058" name="Picture 10" descr="Resultado de imagem para IPHONE VECTOR"/>
+            <p:cNvPicPr>
+              <a:picLocks noChangeAspect="1" noChangeArrowheads="1"/>
+            </p:cNvPicPr>
+            <p:nvPr/>
+          </p:nvPicPr>
+          <p:blipFill>
+            <a:blip r:embed="rId10" cstate="print">
+              <a:extLst>
+                <a:ext uri="{28A0092B-C50C-407E-A947-70E740481C1C}">
+                  <a14:useLocalDpi xmlns:a14="http://schemas.microsoft.com/office/drawing/2010/main" val="0"/>
+                </a:ext>
+              </a:extLst>
+            </a:blip>
+            <a:srcRect/>
+            <a:stretch>
+              <a:fillRect/>
+            </a:stretch>
+          </p:blipFill>
+          <p:spPr bwMode="auto">
+            <a:xfrm>
+              <a:off x="2633244" y="4025899"/>
+              <a:ext cx="1038599" cy="2170461"/>
+            </a:xfrm>
+            <a:prstGeom prst="rect">
+              <a:avLst/>
+            </a:prstGeom>
+            <a:noFill/>
+            <a:extLst>
+              <a:ext uri="{909E8E84-426E-40DD-AFC4-6F175D3DCCD1}">
+                <a14:hiddenFill xmlns:a14="http://schemas.microsoft.com/office/drawing/2010/main">
+                  <a:solidFill>
+                    <a:srgbClr val="FFFFFF"/>
+                  </a:solidFill>
+                </a14:hiddenFill>
+              </a:ext>
+            </a:extLst>
+          </p:spPr>
+        </p:pic>
+        <p:pic>
+          <p:nvPicPr>
+            <p:cNvPr id="7" name="Imagem 6">
+              <a:extLst>
+                <a:ext uri="{FF2B5EF4-FFF2-40B4-BE49-F238E27FC236}">
+                  <a16:creationId xmlns:a16="http://schemas.microsoft.com/office/drawing/2014/main" id="{DE51EA2D-37A4-4C65-9FE2-EE7FE9A8A7BE}"/>
+                </a:ext>
+              </a:extLst>
+            </p:cNvPr>
+            <p:cNvPicPr>
+              <a:picLocks noChangeAspect="1"/>
+            </p:cNvPicPr>
+            <p:nvPr/>
+          </p:nvPicPr>
+          <p:blipFill>
+            <a:blip r:embed="rId11">
+              <a:extLst>
+                <a:ext uri="{BEBA8EAE-BF5A-486C-A8C5-ECC9F3942E4B}">
+                  <a14:imgProps xmlns:a14="http://schemas.microsoft.com/office/drawing/2010/main">
+                    <a14:imgLayer r:embed="rId12">
+                      <a14:imgEffect>
+                        <a14:brightnessContrast bright="-9000"/>
+                      </a14:imgEffect>
+                    </a14:imgLayer>
+                  </a14:imgProps>
+                </a:ext>
+              </a:extLst>
+            </a:blip>
+            <a:stretch>
+              <a:fillRect/>
+            </a:stretch>
+          </p:blipFill>
+          <p:spPr>
+            <a:xfrm>
+              <a:off x="2684773" y="4282105"/>
+              <a:ext cx="934727" cy="1655394"/>
+            </a:xfrm>
+            <a:prstGeom prst="rect">
+              <a:avLst/>
+            </a:prstGeom>
+          </p:spPr>
+        </p:pic>
+      </p:grpSp>
     </p:spTree>
     <p:extLst>
       <p:ext uri="{BB962C8B-B14F-4D97-AF65-F5344CB8AC3E}">
@@ -10992,13 +10903,6 @@
   <p:clrMapOvr>
     <a:masterClrMapping/>
   </p:clrMapOvr>
-  <p:timing>
-    <p:tnLst>
-      <p:par>
-        <p:cTn id="1" dur="indefinite" restart="never" nodeType="tmRoot"/>
-      </p:par>
-    </p:tnLst>
-  </p:timing>
 </p:sld>
 </file>
 
@@ -11217,7 +11121,7 @@
           <a:p>
             <a:pPr algn="ctr"/>
             <a:r>
-              <a:rPr lang="pt-BR" sz="3600" b="1" dirty="0" smtClean="0">
+              <a:rPr lang="pt-BR" sz="3600" b="1" dirty="0">
                 <a:ln w="0"/>
                 <a:solidFill>
                   <a:schemeClr val="bg1"/>
@@ -11344,7 +11248,7 @@
           <a:p>
             <a:pPr algn="ctr"/>
             <a:r>
-              <a:rPr lang="pt-BR" sz="4400" b="1" cap="none" spc="0" dirty="0" smtClean="0">
+              <a:rPr lang="pt-BR" sz="4400" b="1" cap="none" spc="0" dirty="0">
                 <a:ln w="10160">
                   <a:solidFill>
                     <a:schemeClr val="accent4">
@@ -11370,30 +11274,6 @@
               </a:rPr>
               <a:t>RODOLFO</a:t>
             </a:r>
-            <a:endParaRPr lang="pt-BR" sz="4400" b="1" cap="none" spc="0" dirty="0">
-              <a:ln w="10160">
-                <a:solidFill>
-                  <a:schemeClr val="accent4">
-                    <a:lumMod val="60000"/>
-                    <a:lumOff val="40000"/>
-                  </a:schemeClr>
-                </a:solidFill>
-                <a:prstDash val="solid"/>
-              </a:ln>
-              <a:solidFill>
-                <a:schemeClr val="accent4">
-                  <a:lumMod val="60000"/>
-                  <a:lumOff val="40000"/>
-                </a:schemeClr>
-              </a:solidFill>
-              <a:effectLst>
-                <a:outerShdw blurRad="38100" dist="22860" dir="5400000" algn="tl" rotWithShape="0">
-                  <a:srgbClr val="000000">
-                    <a:alpha val="30000"/>
-                  </a:srgbClr>
-                </a:outerShdw>
-              </a:effectLst>
-            </a:endParaRPr>
           </a:p>
         </p:txBody>
       </p:sp>
@@ -11407,21 +11287,6 @@
   <p:clrMapOvr>
     <a:masterClrMapping/>
   </p:clrMapOvr>
-  <mc:AlternateContent xmlns:mc="http://schemas.openxmlformats.org/markup-compatibility/2006" xmlns:p14="http://schemas.microsoft.com/office/powerpoint/2010/main">
-    <mc:Choice Requires="p14">
-      <p:transition p14:dur="0"/>
-    </mc:Choice>
-    <mc:Fallback xmlns="">
-      <p:transition/>
-    </mc:Fallback>
-  </mc:AlternateContent>
-  <p:timing>
-    <p:tnLst>
-      <p:par>
-        <p:cTn id="1" dur="indefinite" restart="never" nodeType="tmRoot"/>
-      </p:par>
-    </p:tnLst>
-  </p:timing>
 </p:sld>
 </file>
 
@@ -11574,7 +11439,7 @@
           <a:p>
             <a:pPr algn="just"/>
             <a:r>
-              <a:rPr lang="pt-BR" sz="3200" b="1" dirty="0" smtClean="0">
+              <a:rPr lang="pt-BR" sz="3200" b="1" dirty="0">
                 <a:ln w="0"/>
                 <a:solidFill>
                   <a:schemeClr val="bg1"/>
@@ -11673,7 +11538,7 @@
           <a:p>
             <a:pPr algn="ctr"/>
             <a:r>
-              <a:rPr lang="pt-BR" sz="4400" b="1" cap="none" spc="0" dirty="0" smtClean="0">
+              <a:rPr lang="pt-BR" sz="4400" b="1" cap="none" spc="0" dirty="0">
                 <a:ln w="10160">
                   <a:solidFill>
                     <a:schemeClr val="accent1">
@@ -11697,28 +11562,6 @@
               </a:rPr>
               <a:t>MATHEUS</a:t>
             </a:r>
-            <a:endParaRPr lang="pt-BR" sz="4400" b="1" cap="none" spc="0" dirty="0">
-              <a:ln w="10160">
-                <a:solidFill>
-                  <a:schemeClr val="accent1">
-                    <a:lumMod val="75000"/>
-                  </a:schemeClr>
-                </a:solidFill>
-                <a:prstDash val="solid"/>
-              </a:ln>
-              <a:solidFill>
-                <a:schemeClr val="accent1">
-                  <a:lumMod val="75000"/>
-                </a:schemeClr>
-              </a:solidFill>
-              <a:effectLst>
-                <a:outerShdw blurRad="38100" dist="22860" dir="5400000" algn="tl" rotWithShape="0">
-                  <a:srgbClr val="000000">
-                    <a:alpha val="30000"/>
-                  </a:srgbClr>
-                </a:outerShdw>
-              </a:effectLst>
-            </a:endParaRPr>
           </a:p>
         </p:txBody>
       </p:sp>
@@ -11732,13 +11575,6 @@
   <p:clrMapOvr>
     <a:masterClrMapping/>
   </p:clrMapOvr>
-  <p:timing>
-    <p:tnLst>
-      <p:par>
-        <p:cTn id="1" dur="indefinite" restart="never" nodeType="tmRoot"/>
-      </p:par>
-    </p:tnLst>
-  </p:timing>
 </p:sld>
 </file>
 
@@ -11891,7 +11727,7 @@
           <a:p>
             <a:pPr algn="just"/>
             <a:r>
-              <a:rPr lang="pt-BR" sz="3200" b="1" dirty="0" smtClean="0">
+              <a:rPr lang="pt-BR" sz="3200" b="1" dirty="0">
                 <a:ln w="0"/>
                 <a:solidFill>
                   <a:schemeClr val="bg1"/>
@@ -12012,7 +11848,7 @@
           <a:p>
             <a:pPr algn="ctr"/>
             <a:r>
-              <a:rPr lang="pt-BR" sz="4400" b="1" cap="none" spc="0" dirty="0" smtClean="0">
+              <a:rPr lang="pt-BR" sz="4400" b="1" cap="none" spc="0" dirty="0">
                 <a:ln w="10160">
                   <a:solidFill>
                     <a:schemeClr val="accent1">
@@ -12036,28 +11872,6 @@
               </a:rPr>
               <a:t>MATHEUS</a:t>
             </a:r>
-            <a:endParaRPr lang="pt-BR" sz="4400" b="1" cap="none" spc="0" dirty="0">
-              <a:ln w="10160">
-                <a:solidFill>
-                  <a:schemeClr val="accent1">
-                    <a:lumMod val="75000"/>
-                  </a:schemeClr>
-                </a:solidFill>
-                <a:prstDash val="solid"/>
-              </a:ln>
-              <a:solidFill>
-                <a:schemeClr val="accent1">
-                  <a:lumMod val="75000"/>
-                </a:schemeClr>
-              </a:solidFill>
-              <a:effectLst>
-                <a:outerShdw blurRad="38100" dist="22860" dir="5400000" algn="tl" rotWithShape="0">
-                  <a:srgbClr val="000000">
-                    <a:alpha val="30000"/>
-                  </a:srgbClr>
-                </a:outerShdw>
-              </a:effectLst>
-            </a:endParaRPr>
           </a:p>
         </p:txBody>
       </p:sp>
@@ -12071,13 +11885,6 @@
   <p:clrMapOvr>
     <a:masterClrMapping/>
   </p:clrMapOvr>
-  <p:timing>
-    <p:tnLst>
-      <p:par>
-        <p:cTn id="1" dur="indefinite" restart="never" nodeType="tmRoot"/>
-      </p:par>
-    </p:tnLst>
-  </p:timing>
 </p:sld>
 </file>
 
@@ -12230,7 +12037,7 @@
           <a:p>
             <a:pPr algn="just"/>
             <a:r>
-              <a:rPr lang="pt-BR" sz="3200" b="1" dirty="0" smtClean="0">
+              <a:rPr lang="pt-BR" sz="3200" b="1" dirty="0">
                 <a:ln w="0"/>
                 <a:solidFill>
                   <a:schemeClr val="bg1"/>
@@ -12411,7 +12218,7 @@
           <a:p>
             <a:pPr algn="ctr"/>
             <a:r>
-              <a:rPr lang="pt-BR" sz="4400" b="1" cap="none" spc="0" dirty="0" smtClean="0">
+              <a:rPr lang="pt-BR" sz="4400" b="1" cap="none" spc="0" dirty="0">
                 <a:ln w="10160">
                   <a:solidFill>
                     <a:schemeClr val="accent1">
@@ -12435,28 +12242,6 @@
               </a:rPr>
               <a:t>MATHEUS</a:t>
             </a:r>
-            <a:endParaRPr lang="pt-BR" sz="4400" b="1" cap="none" spc="0" dirty="0">
-              <a:ln w="10160">
-                <a:solidFill>
-                  <a:schemeClr val="accent1">
-                    <a:lumMod val="75000"/>
-                  </a:schemeClr>
-                </a:solidFill>
-                <a:prstDash val="solid"/>
-              </a:ln>
-              <a:solidFill>
-                <a:schemeClr val="accent1">
-                  <a:lumMod val="75000"/>
-                </a:schemeClr>
-              </a:solidFill>
-              <a:effectLst>
-                <a:outerShdw blurRad="38100" dist="22860" dir="5400000" algn="tl" rotWithShape="0">
-                  <a:srgbClr val="000000">
-                    <a:alpha val="30000"/>
-                  </a:srgbClr>
-                </a:outerShdw>
-              </a:effectLst>
-            </a:endParaRPr>
           </a:p>
         </p:txBody>
       </p:sp>
@@ -12494,13 +12279,6 @@
   <p:clrMapOvr>
     <a:masterClrMapping/>
   </p:clrMapOvr>
-  <p:timing>
-    <p:tnLst>
-      <p:par>
-        <p:cTn id="1" dur="indefinite" restart="never" nodeType="tmRoot"/>
-      </p:par>
-    </p:tnLst>
-  </p:timing>
 </p:sld>
 </file>
 
@@ -12671,7 +12449,7 @@
           <a:p>
             <a:pPr algn="ctr"/>
             <a:r>
-              <a:rPr lang="pt-BR" sz="2400" b="1" dirty="0" smtClean="0">
+              <a:rPr lang="pt-BR" sz="2400" b="1" dirty="0">
                 <a:ln w="0"/>
                 <a:solidFill>
                   <a:schemeClr val="bg1"/>
@@ -12691,7 +12469,7 @@
           <a:p>
             <a:pPr algn="ctr"/>
             <a:r>
-              <a:rPr lang="pt-BR" sz="2400" b="1" dirty="0" smtClean="0">
+              <a:rPr lang="pt-BR" sz="2400" b="1" dirty="0">
                 <a:ln w="0"/>
                 <a:solidFill>
                   <a:schemeClr val="bg1"/>
@@ -12969,7 +12747,7 @@
           <a:p>
             <a:pPr algn="ctr"/>
             <a:r>
-              <a:rPr lang="pt-BR" sz="4400" b="1" cap="none" spc="0" dirty="0" smtClean="0">
+              <a:rPr lang="pt-BR" sz="4400" b="1" cap="none" spc="0" dirty="0">
                 <a:ln w="10160">
                   <a:solidFill>
                     <a:srgbClr val="FF0000"/>
@@ -12989,24 +12767,6 @@
               </a:rPr>
               <a:t>YUDI</a:t>
             </a:r>
-            <a:endParaRPr lang="pt-BR" sz="4400" b="1" cap="none" spc="0" dirty="0">
-              <a:ln w="10160">
-                <a:solidFill>
-                  <a:srgbClr val="FF0000"/>
-                </a:solidFill>
-                <a:prstDash val="solid"/>
-              </a:ln>
-              <a:solidFill>
-                <a:srgbClr val="FF0000"/>
-              </a:solidFill>
-              <a:effectLst>
-                <a:outerShdw blurRad="38100" dist="22860" dir="5400000" algn="tl" rotWithShape="0">
-                  <a:srgbClr val="000000">
-                    <a:alpha val="30000"/>
-                  </a:srgbClr>
-                </a:outerShdw>
-              </a:effectLst>
-            </a:endParaRPr>
           </a:p>
         </p:txBody>
       </p:sp>
@@ -13020,21 +12780,6 @@
   <p:clrMapOvr>
     <a:masterClrMapping/>
   </p:clrMapOvr>
-  <mc:AlternateContent xmlns:mc="http://schemas.openxmlformats.org/markup-compatibility/2006" xmlns:p14="http://schemas.microsoft.com/office/powerpoint/2010/main">
-    <mc:Choice Requires="p14">
-      <p:transition p14:dur="0"/>
-    </mc:Choice>
-    <mc:Fallback xmlns="">
-      <p:transition/>
-    </mc:Fallback>
-  </mc:AlternateContent>
-  <p:timing>
-    <p:tnLst>
-      <p:par>
-        <p:cTn id="1" dur="indefinite" restart="never" nodeType="tmRoot"/>
-      </p:par>
-    </p:tnLst>
-  </p:timing>
 </p:sld>
 </file>
 
@@ -13187,7 +12932,7 @@
           <a:p>
             <a:pPr algn="just"/>
             <a:r>
-              <a:rPr lang="pt-BR" sz="3200" b="1" dirty="0" smtClean="0">
+              <a:rPr lang="pt-BR" sz="3200" b="1" dirty="0">
                 <a:ln w="0"/>
                 <a:solidFill>
                   <a:schemeClr val="bg1"/>
@@ -13286,7 +13031,7 @@
           <a:p>
             <a:pPr algn="ctr"/>
             <a:r>
-              <a:rPr lang="pt-BR" sz="4400" b="1" cap="none" spc="0" dirty="0" smtClean="0">
+              <a:rPr lang="pt-BR" sz="4400" b="1" cap="none" spc="0" dirty="0">
                 <a:ln w="10160">
                   <a:solidFill>
                     <a:srgbClr val="FF0000"/>
@@ -13306,24 +13051,6 @@
               </a:rPr>
               <a:t>YUDI</a:t>
             </a:r>
-            <a:endParaRPr lang="pt-BR" sz="4400" b="1" cap="none" spc="0" dirty="0">
-              <a:ln w="10160">
-                <a:solidFill>
-                  <a:srgbClr val="FF0000"/>
-                </a:solidFill>
-                <a:prstDash val="solid"/>
-              </a:ln>
-              <a:solidFill>
-                <a:srgbClr val="FF0000"/>
-              </a:solidFill>
-              <a:effectLst>
-                <a:outerShdw blurRad="38100" dist="22860" dir="5400000" algn="tl" rotWithShape="0">
-                  <a:srgbClr val="000000">
-                    <a:alpha val="30000"/>
-                  </a:srgbClr>
-                </a:outerShdw>
-              </a:effectLst>
-            </a:endParaRPr>
           </a:p>
         </p:txBody>
       </p:sp>
@@ -13337,13 +13064,6 @@
   <p:clrMapOvr>
     <a:masterClrMapping/>
   </p:clrMapOvr>
-  <p:timing>
-    <p:tnLst>
-      <p:par>
-        <p:cTn id="1" dur="indefinite" restart="never" nodeType="tmRoot"/>
-      </p:par>
-    </p:tnLst>
-  </p:timing>
 </p:sld>
 </file>
 
@@ -13496,7 +13216,7 @@
           <a:p>
             <a:pPr algn="just"/>
             <a:r>
-              <a:rPr lang="pt-BR" sz="3200" b="1" dirty="0" smtClean="0">
+              <a:rPr lang="pt-BR" sz="3200" b="1" dirty="0">
                 <a:ln w="0"/>
                 <a:solidFill>
                   <a:schemeClr val="bg1"/>
@@ -13595,7 +13315,7 @@
           <a:p>
             <a:pPr algn="ctr"/>
             <a:r>
-              <a:rPr lang="pt-BR" sz="4400" b="1" cap="none" spc="0" dirty="0" smtClean="0">
+              <a:rPr lang="pt-BR" sz="4400" b="1" cap="none" spc="0" dirty="0">
                 <a:ln w="10160">
                   <a:solidFill>
                     <a:srgbClr val="FF0000"/>
@@ -13615,24 +13335,6 @@
               </a:rPr>
               <a:t>YUDI</a:t>
             </a:r>
-            <a:endParaRPr lang="pt-BR" sz="4400" b="1" cap="none" spc="0" dirty="0">
-              <a:ln w="10160">
-                <a:solidFill>
-                  <a:srgbClr val="FF0000"/>
-                </a:solidFill>
-                <a:prstDash val="solid"/>
-              </a:ln>
-              <a:solidFill>
-                <a:srgbClr val="FF0000"/>
-              </a:solidFill>
-              <a:effectLst>
-                <a:outerShdw blurRad="38100" dist="22860" dir="5400000" algn="tl" rotWithShape="0">
-                  <a:srgbClr val="000000">
-                    <a:alpha val="30000"/>
-                  </a:srgbClr>
-                </a:outerShdw>
-              </a:effectLst>
-            </a:endParaRPr>
           </a:p>
         </p:txBody>
       </p:sp>
@@ -13660,7 +13362,7 @@
           <a:p>
             <a:pPr algn="ctr"/>
             <a:r>
-              <a:rPr lang="pt-BR" sz="4400" b="1" cap="none" spc="0" dirty="0" smtClean="0">
+              <a:rPr lang="pt-BR" sz="4400" b="1" cap="none" spc="0" dirty="0">
                 <a:ln w="10160">
                   <a:solidFill>
                     <a:schemeClr val="accent6"/>
@@ -13680,24 +13382,6 @@
               </a:rPr>
               <a:t>LUCAS</a:t>
             </a:r>
-            <a:endParaRPr lang="pt-BR" sz="4400" b="1" cap="none" spc="0" dirty="0">
-              <a:ln w="10160">
-                <a:solidFill>
-                  <a:schemeClr val="accent6"/>
-                </a:solidFill>
-                <a:prstDash val="solid"/>
-              </a:ln>
-              <a:solidFill>
-                <a:schemeClr val="accent6"/>
-              </a:solidFill>
-              <a:effectLst>
-                <a:outerShdw blurRad="38100" dist="22860" dir="5400000" algn="tl" rotWithShape="0">
-                  <a:srgbClr val="000000">
-                    <a:alpha val="30000"/>
-                  </a:srgbClr>
-                </a:outerShdw>
-              </a:effectLst>
-            </a:endParaRPr>
           </a:p>
         </p:txBody>
       </p:sp>
@@ -13725,7 +13409,7 @@
           <a:p>
             <a:pPr algn="ctr"/>
             <a:r>
-              <a:rPr lang="pt-BR" sz="4400" b="1" cap="none" spc="0" dirty="0" smtClean="0">
+              <a:rPr lang="pt-BR" sz="4400" b="1" cap="none" spc="0" dirty="0">
                 <a:ln w="10160">
                   <a:solidFill>
                     <a:schemeClr val="accent4">
@@ -13751,30 +13435,6 @@
               </a:rPr>
               <a:t>RODOLFO</a:t>
             </a:r>
-            <a:endParaRPr lang="pt-BR" sz="4400" b="1" cap="none" spc="0" dirty="0">
-              <a:ln w="10160">
-                <a:solidFill>
-                  <a:schemeClr val="accent4">
-                    <a:lumMod val="60000"/>
-                    <a:lumOff val="40000"/>
-                  </a:schemeClr>
-                </a:solidFill>
-                <a:prstDash val="solid"/>
-              </a:ln>
-              <a:solidFill>
-                <a:schemeClr val="accent4">
-                  <a:lumMod val="60000"/>
-                  <a:lumOff val="40000"/>
-                </a:schemeClr>
-              </a:solidFill>
-              <a:effectLst>
-                <a:outerShdw blurRad="38100" dist="22860" dir="5400000" algn="tl" rotWithShape="0">
-                  <a:srgbClr val="000000">
-                    <a:alpha val="30000"/>
-                  </a:srgbClr>
-                </a:outerShdw>
-              </a:effectLst>
-            </a:endParaRPr>
           </a:p>
         </p:txBody>
       </p:sp>
@@ -13802,7 +13462,7 @@
           <a:p>
             <a:pPr algn="ctr"/>
             <a:r>
-              <a:rPr lang="pt-BR" sz="4400" b="1" cap="none" spc="0" dirty="0" smtClean="0">
+              <a:rPr lang="pt-BR" sz="4400" b="1" cap="none" spc="0" dirty="0">
                 <a:ln w="10160">
                   <a:solidFill>
                     <a:schemeClr val="accent1">
@@ -13826,28 +13486,6 @@
               </a:rPr>
               <a:t>MATHEUS</a:t>
             </a:r>
-            <a:endParaRPr lang="pt-BR" sz="4400" b="1" cap="none" spc="0" dirty="0">
-              <a:ln w="10160">
-                <a:solidFill>
-                  <a:schemeClr val="accent1">
-                    <a:lumMod val="75000"/>
-                  </a:schemeClr>
-                </a:solidFill>
-                <a:prstDash val="solid"/>
-              </a:ln>
-              <a:solidFill>
-                <a:schemeClr val="accent1">
-                  <a:lumMod val="75000"/>
-                </a:schemeClr>
-              </a:solidFill>
-              <a:effectLst>
-                <a:outerShdw blurRad="38100" dist="22860" dir="5400000" algn="tl" rotWithShape="0">
-                  <a:srgbClr val="000000">
-                    <a:alpha val="30000"/>
-                  </a:srgbClr>
-                </a:outerShdw>
-              </a:effectLst>
-            </a:endParaRPr>
           </a:p>
         </p:txBody>
       </p:sp>
@@ -13861,13 +13499,6 @@
   <p:clrMapOvr>
     <a:masterClrMapping/>
   </p:clrMapOvr>
-  <p:timing>
-    <p:tnLst>
-      <p:par>
-        <p:cTn id="1" dur="indefinite" restart="never" nodeType="tmRoot"/>
-      </p:par>
-    </p:tnLst>
-  </p:timing>
 </p:sld>
 </file>
 
@@ -14057,7 +13688,7 @@
           <a:p>
             <a:pPr algn="just"/>
             <a:r>
-              <a:rPr lang="pt-BR" sz="11500" b="1" dirty="0" smtClean="0">
+              <a:rPr lang="pt-BR" sz="11500" b="1" dirty="0">
                 <a:ln w="0"/>
                 <a:solidFill>
                   <a:schemeClr val="bg1"/>
@@ -14182,7 +13813,7 @@
           <a:p>
             <a:pPr algn="ctr"/>
             <a:r>
-              <a:rPr lang="pt-BR" sz="4400" b="1" cap="none" spc="0" dirty="0" smtClean="0">
+              <a:rPr lang="pt-BR" sz="4400" b="1" cap="none" spc="0" dirty="0">
                 <a:ln w="10160">
                   <a:solidFill>
                     <a:srgbClr val="FF0000"/>
@@ -14202,24 +13833,6 @@
               </a:rPr>
               <a:t>YUDI</a:t>
             </a:r>
-            <a:endParaRPr lang="pt-BR" sz="4400" b="1" cap="none" spc="0" dirty="0">
-              <a:ln w="10160">
-                <a:solidFill>
-                  <a:srgbClr val="FF0000"/>
-                </a:solidFill>
-                <a:prstDash val="solid"/>
-              </a:ln>
-              <a:solidFill>
-                <a:srgbClr val="FF0000"/>
-              </a:solidFill>
-              <a:effectLst>
-                <a:outerShdw blurRad="38100" dist="22860" dir="5400000" algn="tl" rotWithShape="0">
-                  <a:srgbClr val="000000">
-                    <a:alpha val="30000"/>
-                  </a:srgbClr>
-                </a:outerShdw>
-              </a:effectLst>
-            </a:endParaRPr>
           </a:p>
         </p:txBody>
       </p:sp>
@@ -14247,7 +13860,7 @@
           <a:p>
             <a:pPr algn="ctr"/>
             <a:r>
-              <a:rPr lang="pt-BR" sz="4400" b="1" cap="none" spc="0" dirty="0" smtClean="0">
+              <a:rPr lang="pt-BR" sz="4400" b="1" cap="none" spc="0" dirty="0">
                 <a:ln w="10160">
                   <a:solidFill>
                     <a:schemeClr val="accent6"/>
@@ -14267,24 +13880,6 @@
               </a:rPr>
               <a:t>LUCAS</a:t>
             </a:r>
-            <a:endParaRPr lang="pt-BR" sz="4400" b="1" cap="none" spc="0" dirty="0">
-              <a:ln w="10160">
-                <a:solidFill>
-                  <a:schemeClr val="accent6"/>
-                </a:solidFill>
-                <a:prstDash val="solid"/>
-              </a:ln>
-              <a:solidFill>
-                <a:schemeClr val="accent6"/>
-              </a:solidFill>
-              <a:effectLst>
-                <a:outerShdw blurRad="38100" dist="22860" dir="5400000" algn="tl" rotWithShape="0">
-                  <a:srgbClr val="000000">
-                    <a:alpha val="30000"/>
-                  </a:srgbClr>
-                </a:outerShdw>
-              </a:effectLst>
-            </a:endParaRPr>
           </a:p>
         </p:txBody>
       </p:sp>
@@ -14312,7 +13907,7 @@
           <a:p>
             <a:pPr algn="ctr"/>
             <a:r>
-              <a:rPr lang="pt-BR" sz="4400" b="1" cap="none" spc="0" dirty="0" smtClean="0">
+              <a:rPr lang="pt-BR" sz="4400" b="1" cap="none" spc="0" dirty="0">
                 <a:ln w="10160">
                   <a:solidFill>
                     <a:schemeClr val="accent4">
@@ -14338,30 +13933,6 @@
               </a:rPr>
               <a:t>RODOLFO</a:t>
             </a:r>
-            <a:endParaRPr lang="pt-BR" sz="4400" b="1" cap="none" spc="0" dirty="0">
-              <a:ln w="10160">
-                <a:solidFill>
-                  <a:schemeClr val="accent4">
-                    <a:lumMod val="60000"/>
-                    <a:lumOff val="40000"/>
-                  </a:schemeClr>
-                </a:solidFill>
-                <a:prstDash val="solid"/>
-              </a:ln>
-              <a:solidFill>
-                <a:schemeClr val="accent4">
-                  <a:lumMod val="60000"/>
-                  <a:lumOff val="40000"/>
-                </a:schemeClr>
-              </a:solidFill>
-              <a:effectLst>
-                <a:outerShdw blurRad="38100" dist="22860" dir="5400000" algn="tl" rotWithShape="0">
-                  <a:srgbClr val="000000">
-                    <a:alpha val="30000"/>
-                  </a:srgbClr>
-                </a:outerShdw>
-              </a:effectLst>
-            </a:endParaRPr>
           </a:p>
         </p:txBody>
       </p:sp>
@@ -14389,7 +13960,7 @@
           <a:p>
             <a:pPr algn="ctr"/>
             <a:r>
-              <a:rPr lang="pt-BR" sz="4400" b="1" cap="none" spc="0" dirty="0" smtClean="0">
+              <a:rPr lang="pt-BR" sz="4400" b="1" cap="none" spc="0" dirty="0">
                 <a:ln w="10160">
                   <a:solidFill>
                     <a:schemeClr val="accent1">
@@ -14413,28 +13984,6 @@
               </a:rPr>
               <a:t>MATHEUS</a:t>
             </a:r>
-            <a:endParaRPr lang="pt-BR" sz="4400" b="1" cap="none" spc="0" dirty="0">
-              <a:ln w="10160">
-                <a:solidFill>
-                  <a:schemeClr val="accent1">
-                    <a:lumMod val="75000"/>
-                  </a:schemeClr>
-                </a:solidFill>
-                <a:prstDash val="solid"/>
-              </a:ln>
-              <a:solidFill>
-                <a:schemeClr val="accent1">
-                  <a:lumMod val="75000"/>
-                </a:schemeClr>
-              </a:solidFill>
-              <a:effectLst>
-                <a:outerShdw blurRad="38100" dist="22860" dir="5400000" algn="tl" rotWithShape="0">
-                  <a:srgbClr val="000000">
-                    <a:alpha val="30000"/>
-                  </a:srgbClr>
-                </a:outerShdw>
-              </a:effectLst>
-            </a:endParaRPr>
           </a:p>
         </p:txBody>
       </p:sp>
@@ -14448,13 +13997,6 @@
   <p:clrMapOvr>
     <a:masterClrMapping/>
   </p:clrMapOvr>
-  <p:timing>
-    <p:tnLst>
-      <p:par>
-        <p:cTn id="1" dur="indefinite" restart="never" nodeType="tmRoot"/>
-      </p:par>
-    </p:tnLst>
-  </p:timing>
 </p:sld>
 </file>
 
@@ -14737,7 +14279,7 @@
           <a:p>
             <a:pPr algn="just"/>
             <a:r>
-              <a:rPr lang="pt-BR" sz="3200" b="1" dirty="0" smtClean="0">
+              <a:rPr lang="pt-BR" sz="3200" b="1" dirty="0">
                 <a:ln w="0"/>
                 <a:solidFill>
                   <a:schemeClr val="bg1"/>
@@ -14836,7 +14378,7 @@
           <a:p>
             <a:pPr algn="ctr"/>
             <a:r>
-              <a:rPr lang="pt-BR" sz="4400" b="1" cap="none" spc="0" dirty="0" smtClean="0">
+              <a:rPr lang="pt-BR" sz="4400" b="1" cap="none" spc="0" dirty="0">
                 <a:ln w="10160">
                   <a:solidFill>
                     <a:schemeClr val="accent6"/>
@@ -14856,24 +14398,6 @@
               </a:rPr>
               <a:t>LUCAS</a:t>
             </a:r>
-            <a:endParaRPr lang="pt-BR" sz="4400" b="1" cap="none" spc="0" dirty="0">
-              <a:ln w="10160">
-                <a:solidFill>
-                  <a:schemeClr val="accent6"/>
-                </a:solidFill>
-                <a:prstDash val="solid"/>
-              </a:ln>
-              <a:solidFill>
-                <a:schemeClr val="accent6"/>
-              </a:solidFill>
-              <a:effectLst>
-                <a:outerShdw blurRad="38100" dist="22860" dir="5400000" algn="tl" rotWithShape="0">
-                  <a:srgbClr val="000000">
-                    <a:alpha val="30000"/>
-                  </a:srgbClr>
-                </a:outerShdw>
-              </a:effectLst>
-            </a:endParaRPr>
           </a:p>
         </p:txBody>
       </p:sp>
@@ -14887,21 +14411,6 @@
   <p:clrMapOvr>
     <a:masterClrMapping/>
   </p:clrMapOvr>
-  <mc:AlternateContent xmlns:mc="http://schemas.openxmlformats.org/markup-compatibility/2006" xmlns:p14="http://schemas.microsoft.com/office/powerpoint/2010/main">
-    <mc:Choice Requires="p14">
-      <p:transition p14:dur="0"/>
-    </mc:Choice>
-    <mc:Fallback xmlns="">
-      <p:transition/>
-    </mc:Fallback>
-  </mc:AlternateContent>
-  <p:timing>
-    <p:tnLst>
-      <p:par>
-        <p:cTn id="1" dur="indefinite" restart="never" nodeType="tmRoot"/>
-      </p:par>
-    </p:tnLst>
-  </p:timing>
 </p:sld>
 </file>
 
@@ -15039,7 +14548,7 @@
           <a:p>
             <a:pPr algn="just"/>
             <a:r>
-              <a:rPr lang="pt-BR" sz="3200" b="1" cap="none" spc="0" dirty="0" smtClean="0">
+              <a:rPr lang="pt-BR" sz="3200" b="1" cap="none" spc="0" dirty="0">
                 <a:ln w="0"/>
                 <a:solidFill>
                   <a:schemeClr val="bg1"/>
@@ -15055,20 +14564,6 @@
               </a:rPr>
               <a:t>JUSTIFICATIVA</a:t>
             </a:r>
-            <a:endParaRPr lang="pt-BR" sz="3200" b="1" cap="none" spc="0" dirty="0">
-              <a:ln w="0"/>
-              <a:solidFill>
-                <a:schemeClr val="bg1"/>
-              </a:solidFill>
-              <a:effectLst>
-                <a:outerShdw blurRad="38100" dist="19050" dir="2700000" algn="tl" rotWithShape="0">
-                  <a:schemeClr val="dk1">
-                    <a:alpha val="40000"/>
-                  </a:schemeClr>
-                </a:outerShdw>
-              </a:effectLst>
-              <a:latin typeface="Exo 2 Medium" panose="00000600000000000000" pitchFamily="50" charset="0"/>
-            </a:endParaRPr>
           </a:p>
         </p:txBody>
       </p:sp>
@@ -15247,7 +14742,7 @@
           <a:p>
             <a:pPr algn="ctr"/>
             <a:r>
-              <a:rPr lang="pt-BR" sz="4400" b="1" cap="none" spc="0" dirty="0" smtClean="0">
+              <a:rPr lang="pt-BR" sz="4400" b="1" cap="none" spc="0" dirty="0">
                 <a:ln w="10160">
                   <a:solidFill>
                     <a:schemeClr val="accent4">
@@ -15273,33 +14768,337 @@
               </a:rPr>
               <a:t>RODOLFO</a:t>
             </a:r>
-            <a:endParaRPr lang="pt-BR" sz="4400" b="1" cap="none" spc="0" dirty="0">
-              <a:ln w="10160">
-                <a:solidFill>
-                  <a:schemeClr val="accent4">
-                    <a:lumMod val="60000"/>
-                    <a:lumOff val="40000"/>
-                  </a:schemeClr>
-                </a:solidFill>
-                <a:prstDash val="solid"/>
-              </a:ln>
-              <a:solidFill>
-                <a:schemeClr val="accent4">
-                  <a:lumMod val="60000"/>
-                  <a:lumOff val="40000"/>
-                </a:schemeClr>
-              </a:solidFill>
-              <a:effectLst>
-                <a:outerShdw blurRad="38100" dist="22860" dir="5400000" algn="tl" rotWithShape="0">
-                  <a:srgbClr val="000000">
-                    <a:alpha val="30000"/>
-                  </a:srgbClr>
-                </a:outerShdw>
-              </a:effectLst>
-            </a:endParaRPr>
           </a:p>
         </p:txBody>
       </p:sp>
+      <p:grpSp>
+        <p:nvGrpSpPr>
+          <p:cNvPr id="14" name="Agrupar 13">
+            <a:extLst>
+              <a:ext uri="{FF2B5EF4-FFF2-40B4-BE49-F238E27FC236}">
+                <a16:creationId xmlns:a16="http://schemas.microsoft.com/office/drawing/2014/main" id="{456D9A76-5F22-4559-8295-EB71E94956C6}"/>
+              </a:ext>
+            </a:extLst>
+          </p:cNvPr>
+          <p:cNvGrpSpPr/>
+          <p:nvPr/>
+        </p:nvGrpSpPr>
+        <p:grpSpPr>
+          <a:xfrm>
+            <a:off x="5894376" y="2517614"/>
+            <a:ext cx="3327952" cy="2587609"/>
+            <a:chOff x="2997752" y="1577931"/>
+            <a:chExt cx="5769106" cy="4485699"/>
+          </a:xfrm>
+        </p:grpSpPr>
+        <p:pic>
+          <p:nvPicPr>
+            <p:cNvPr id="15" name="Picture 6" descr="Resultado de imagem para MONITOR VECTOR">
+              <a:extLst>
+                <a:ext uri="{FF2B5EF4-FFF2-40B4-BE49-F238E27FC236}">
+                  <a16:creationId xmlns:a16="http://schemas.microsoft.com/office/drawing/2014/main" id="{6BE240E2-7FFB-4263-8B9A-0EB81A70A648}"/>
+                </a:ext>
+              </a:extLst>
+            </p:cNvPr>
+            <p:cNvPicPr>
+              <a:picLocks noChangeAspect="1" noChangeArrowheads="1"/>
+            </p:cNvPicPr>
+            <p:nvPr/>
+          </p:nvPicPr>
+          <p:blipFill>
+            <a:blip r:embed="rId5" cstate="print">
+              <a:extLst>
+                <a:ext uri="{28A0092B-C50C-407E-A947-70E740481C1C}">
+                  <a14:useLocalDpi xmlns:a14="http://schemas.microsoft.com/office/drawing/2010/main" val="0"/>
+                </a:ext>
+              </a:extLst>
+            </a:blip>
+            <a:srcRect/>
+            <a:stretch>
+              <a:fillRect/>
+            </a:stretch>
+          </p:blipFill>
+          <p:spPr bwMode="auto">
+            <a:xfrm>
+              <a:off x="2997752" y="1577931"/>
+              <a:ext cx="5769106" cy="4485699"/>
+            </a:xfrm>
+            <a:prstGeom prst="rect">
+              <a:avLst/>
+            </a:prstGeom>
+            <a:noFill/>
+            <a:extLst>
+              <a:ext uri="{909E8E84-426E-40DD-AFC4-6F175D3DCCD1}">
+                <a14:hiddenFill xmlns:a14="http://schemas.microsoft.com/office/drawing/2010/main">
+                  <a:solidFill>
+                    <a:srgbClr val="FFFFFF"/>
+                  </a:solidFill>
+                </a14:hiddenFill>
+              </a:ext>
+            </a:extLst>
+          </p:spPr>
+        </p:pic>
+        <p:pic>
+          <p:nvPicPr>
+            <p:cNvPr id="16" name="Imagem 15">
+              <a:extLst>
+                <a:ext uri="{FF2B5EF4-FFF2-40B4-BE49-F238E27FC236}">
+                  <a16:creationId xmlns:a16="http://schemas.microsoft.com/office/drawing/2014/main" id="{6CCA4E70-293F-43F2-875A-5EAFE5F3EAC1}"/>
+                </a:ext>
+              </a:extLst>
+            </p:cNvPr>
+            <p:cNvPicPr>
+              <a:picLocks noChangeAspect="1"/>
+            </p:cNvPicPr>
+            <p:nvPr/>
+          </p:nvPicPr>
+          <p:blipFill>
+            <a:blip r:embed="rId6">
+              <a:extLst>
+                <a:ext uri="{BEBA8EAE-BF5A-486C-A8C5-ECC9F3942E4B}">
+                  <a14:imgProps xmlns:a14="http://schemas.microsoft.com/office/drawing/2010/main">
+                    <a14:imgLayer r:embed="rId7">
+                      <a14:imgEffect>
+                        <a14:brightnessContrast bright="-7000"/>
+                      </a14:imgEffect>
+                    </a14:imgLayer>
+                  </a14:imgProps>
+                </a:ext>
+              </a:extLst>
+            </a:blip>
+            <a:stretch>
+              <a:fillRect/>
+            </a:stretch>
+          </p:blipFill>
+          <p:spPr>
+            <a:xfrm>
+              <a:off x="3207847" y="1818167"/>
+              <a:ext cx="5351362" cy="2604976"/>
+            </a:xfrm>
+            <a:prstGeom prst="rect">
+              <a:avLst/>
+            </a:prstGeom>
+          </p:spPr>
+        </p:pic>
+      </p:grpSp>
+      <p:grpSp>
+        <p:nvGrpSpPr>
+          <p:cNvPr id="17" name="Agrupar 16">
+            <a:extLst>
+              <a:ext uri="{FF2B5EF4-FFF2-40B4-BE49-F238E27FC236}">
+                <a16:creationId xmlns:a16="http://schemas.microsoft.com/office/drawing/2014/main" id="{8B58EDC4-BF0F-418B-B71A-C837ABBC1988}"/>
+              </a:ext>
+            </a:extLst>
+          </p:cNvPr>
+          <p:cNvGrpSpPr/>
+          <p:nvPr/>
+        </p:nvGrpSpPr>
+        <p:grpSpPr>
+          <a:xfrm>
+            <a:off x="8894777" y="3214050"/>
+            <a:ext cx="1423150" cy="1889692"/>
+            <a:chOff x="7534960" y="2912193"/>
+            <a:chExt cx="2467074" cy="3275839"/>
+          </a:xfrm>
+        </p:grpSpPr>
+        <p:pic>
+          <p:nvPicPr>
+            <p:cNvPr id="18" name="Picture 8" descr="Resultado de imagem para TABLET VECTOR">
+              <a:extLst>
+                <a:ext uri="{FF2B5EF4-FFF2-40B4-BE49-F238E27FC236}">
+                  <a16:creationId xmlns:a16="http://schemas.microsoft.com/office/drawing/2014/main" id="{32ACD9F4-E204-40AC-868A-852688735544}"/>
+                </a:ext>
+              </a:extLst>
+            </p:cNvPr>
+            <p:cNvPicPr>
+              <a:picLocks noChangeAspect="1" noChangeArrowheads="1"/>
+            </p:cNvPicPr>
+            <p:nvPr/>
+          </p:nvPicPr>
+          <p:blipFill rotWithShape="1">
+            <a:blip r:embed="rId8" cstate="print">
+              <a:extLst>
+                <a:ext uri="{28A0092B-C50C-407E-A947-70E740481C1C}">
+                  <a14:useLocalDpi xmlns:a14="http://schemas.microsoft.com/office/drawing/2010/main" val="0"/>
+                </a:ext>
+              </a:extLst>
+            </a:blip>
+            <a:srcRect l="16150" t="5208" r="16628" b="5533"/>
+            <a:stretch/>
+          </p:blipFill>
+          <p:spPr bwMode="auto">
+            <a:xfrm>
+              <a:off x="7534960" y="2912193"/>
+              <a:ext cx="2467074" cy="3275839"/>
+            </a:xfrm>
+            <a:prstGeom prst="rect">
+              <a:avLst/>
+            </a:prstGeom>
+            <a:noFill/>
+            <a:extLst>
+              <a:ext uri="{909E8E84-426E-40DD-AFC4-6F175D3DCCD1}">
+                <a14:hiddenFill xmlns:a14="http://schemas.microsoft.com/office/drawing/2010/main">
+                  <a:solidFill>
+                    <a:srgbClr val="FFFFFF"/>
+                  </a:solidFill>
+                </a14:hiddenFill>
+              </a:ext>
+            </a:extLst>
+          </p:spPr>
+        </p:pic>
+        <p:pic>
+          <p:nvPicPr>
+            <p:cNvPr id="19" name="Imagem 18">
+              <a:extLst>
+                <a:ext uri="{FF2B5EF4-FFF2-40B4-BE49-F238E27FC236}">
+                  <a16:creationId xmlns:a16="http://schemas.microsoft.com/office/drawing/2014/main" id="{13AC957E-6055-4665-806D-6E3B015CCF7D}"/>
+                </a:ext>
+              </a:extLst>
+            </p:cNvPr>
+            <p:cNvPicPr>
+              <a:picLocks noChangeAspect="1"/>
+            </p:cNvPicPr>
+            <p:nvPr/>
+          </p:nvPicPr>
+          <p:blipFill>
+            <a:blip r:embed="rId9">
+              <a:extLst>
+                <a:ext uri="{BEBA8EAE-BF5A-486C-A8C5-ECC9F3942E4B}">
+                  <a14:imgProps xmlns:a14="http://schemas.microsoft.com/office/drawing/2010/main">
+                    <a14:imgLayer r:embed="rId10">
+                      <a14:imgEffect>
+                        <a14:brightnessContrast bright="-6000"/>
+                      </a14:imgEffect>
+                    </a14:imgLayer>
+                  </a14:imgProps>
+                </a:ext>
+              </a:extLst>
+            </a:blip>
+            <a:stretch>
+              <a:fillRect/>
+            </a:stretch>
+          </p:blipFill>
+          <p:spPr>
+            <a:xfrm>
+              <a:off x="7697969" y="3170848"/>
+              <a:ext cx="2158408" cy="2746863"/>
+            </a:xfrm>
+            <a:prstGeom prst="rect">
+              <a:avLst/>
+            </a:prstGeom>
+          </p:spPr>
+        </p:pic>
+      </p:grpSp>
+      <p:grpSp>
+        <p:nvGrpSpPr>
+          <p:cNvPr id="20" name="Agrupar 19">
+            <a:extLst>
+              <a:ext uri="{FF2B5EF4-FFF2-40B4-BE49-F238E27FC236}">
+                <a16:creationId xmlns:a16="http://schemas.microsoft.com/office/drawing/2014/main" id="{C35848B9-63A1-4F69-AF1A-954920296EAF}"/>
+              </a:ext>
+            </a:extLst>
+          </p:cNvPr>
+          <p:cNvGrpSpPr/>
+          <p:nvPr/>
+        </p:nvGrpSpPr>
+        <p:grpSpPr>
+          <a:xfrm>
+            <a:off x="10132230" y="3851695"/>
+            <a:ext cx="599124" cy="1252047"/>
+            <a:chOff x="2633244" y="4025899"/>
+            <a:chExt cx="1038599" cy="2170461"/>
+          </a:xfrm>
+        </p:grpSpPr>
+        <p:pic>
+          <p:nvPicPr>
+            <p:cNvPr id="21" name="Picture 10" descr="Resultado de imagem para IPHONE VECTOR">
+              <a:extLst>
+                <a:ext uri="{FF2B5EF4-FFF2-40B4-BE49-F238E27FC236}">
+                  <a16:creationId xmlns:a16="http://schemas.microsoft.com/office/drawing/2014/main" id="{37317431-C7B8-46C9-8C39-19879373A5AD}"/>
+                </a:ext>
+              </a:extLst>
+            </p:cNvPr>
+            <p:cNvPicPr>
+              <a:picLocks noChangeAspect="1" noChangeArrowheads="1"/>
+            </p:cNvPicPr>
+            <p:nvPr/>
+          </p:nvPicPr>
+          <p:blipFill>
+            <a:blip r:embed="rId11" cstate="print">
+              <a:extLst>
+                <a:ext uri="{28A0092B-C50C-407E-A947-70E740481C1C}">
+                  <a14:useLocalDpi xmlns:a14="http://schemas.microsoft.com/office/drawing/2010/main" val="0"/>
+                </a:ext>
+              </a:extLst>
+            </a:blip>
+            <a:srcRect/>
+            <a:stretch>
+              <a:fillRect/>
+            </a:stretch>
+          </p:blipFill>
+          <p:spPr bwMode="auto">
+            <a:xfrm>
+              <a:off x="2633244" y="4025899"/>
+              <a:ext cx="1038599" cy="2170461"/>
+            </a:xfrm>
+            <a:prstGeom prst="rect">
+              <a:avLst/>
+            </a:prstGeom>
+            <a:noFill/>
+            <a:extLst>
+              <a:ext uri="{909E8E84-426E-40DD-AFC4-6F175D3DCCD1}">
+                <a14:hiddenFill xmlns:a14="http://schemas.microsoft.com/office/drawing/2010/main">
+                  <a:solidFill>
+                    <a:srgbClr val="FFFFFF"/>
+                  </a:solidFill>
+                </a14:hiddenFill>
+              </a:ext>
+            </a:extLst>
+          </p:spPr>
+        </p:pic>
+        <p:pic>
+          <p:nvPicPr>
+            <p:cNvPr id="22" name="Imagem 21">
+              <a:extLst>
+                <a:ext uri="{FF2B5EF4-FFF2-40B4-BE49-F238E27FC236}">
+                  <a16:creationId xmlns:a16="http://schemas.microsoft.com/office/drawing/2014/main" id="{AAB66BDC-8F59-4C76-A4C2-96819C0C2B1E}"/>
+                </a:ext>
+              </a:extLst>
+            </p:cNvPr>
+            <p:cNvPicPr>
+              <a:picLocks noChangeAspect="1"/>
+            </p:cNvPicPr>
+            <p:nvPr/>
+          </p:nvPicPr>
+          <p:blipFill>
+            <a:blip r:embed="rId12">
+              <a:extLst>
+                <a:ext uri="{BEBA8EAE-BF5A-486C-A8C5-ECC9F3942E4B}">
+                  <a14:imgProps xmlns:a14="http://schemas.microsoft.com/office/drawing/2010/main">
+                    <a14:imgLayer r:embed="rId13">
+                      <a14:imgEffect>
+                        <a14:brightnessContrast bright="-9000"/>
+                      </a14:imgEffect>
+                    </a14:imgLayer>
+                  </a14:imgProps>
+                </a:ext>
+              </a:extLst>
+            </a:blip>
+            <a:stretch>
+              <a:fillRect/>
+            </a:stretch>
+          </p:blipFill>
+          <p:spPr>
+            <a:xfrm>
+              <a:off x="2684773" y="4282105"/>
+              <a:ext cx="934727" cy="1655394"/>
+            </a:xfrm>
+            <a:prstGeom prst="rect">
+              <a:avLst/>
+            </a:prstGeom>
+          </p:spPr>
+        </p:pic>
+      </p:grpSp>
     </p:spTree>
     <p:extLst>
       <p:ext uri="{BB962C8B-B14F-4D97-AF65-F5344CB8AC3E}">
@@ -15310,18 +15109,330 @@
   <p:clrMapOvr>
     <a:masterClrMapping/>
   </p:clrMapOvr>
-  <mc:AlternateContent xmlns:mc="http://schemas.openxmlformats.org/markup-compatibility/2006" xmlns:p14="http://schemas.microsoft.com/office/powerpoint/2010/main">
-    <mc:Choice Requires="p14">
-      <p:transition p14:dur="0"/>
-    </mc:Choice>
-    <mc:Fallback xmlns="">
-      <p:transition/>
-    </mc:Fallback>
-  </mc:AlternateContent>
   <p:timing>
     <p:tnLst>
       <p:par>
-        <p:cTn id="1" dur="indefinite" restart="never" nodeType="tmRoot"/>
+        <p:cTn id="1" dur="indefinite" restart="never" nodeType="tmRoot">
+          <p:childTnLst>
+            <p:seq concurrent="1" nextAc="seek">
+              <p:cTn id="2" dur="indefinite" nodeType="mainSeq">
+                <p:childTnLst>
+                  <p:par>
+                    <p:cTn id="3" fill="hold">
+                      <p:stCondLst>
+                        <p:cond delay="indefinite"/>
+                      </p:stCondLst>
+                      <p:childTnLst>
+                        <p:par>
+                          <p:cTn id="4" fill="hold">
+                            <p:stCondLst>
+                              <p:cond delay="0"/>
+                            </p:stCondLst>
+                            <p:childTnLst>
+                              <p:par>
+                                <p:cTn id="5" presetID="42" presetClass="entr" presetSubtype="0" fill="hold" nodeType="clickEffect">
+                                  <p:stCondLst>
+                                    <p:cond delay="0"/>
+                                  </p:stCondLst>
+                                  <p:childTnLst>
+                                    <p:set>
+                                      <p:cBhvr>
+                                        <p:cTn id="6" dur="1" fill="hold">
+                                          <p:stCondLst>
+                                            <p:cond delay="0"/>
+                                          </p:stCondLst>
+                                        </p:cTn>
+                                        <p:tgtEl>
+                                          <p:spTgt spid="14"/>
+                                        </p:tgtEl>
+                                        <p:attrNameLst>
+                                          <p:attrName>style.visibility</p:attrName>
+                                        </p:attrNameLst>
+                                      </p:cBhvr>
+                                      <p:to>
+                                        <p:strVal val="visible"/>
+                                      </p:to>
+                                    </p:set>
+                                    <p:animEffect transition="in" filter="fade">
+                                      <p:cBhvr>
+                                        <p:cTn id="7" dur="500"/>
+                                        <p:tgtEl>
+                                          <p:spTgt spid="14"/>
+                                        </p:tgtEl>
+                                      </p:cBhvr>
+                                    </p:animEffect>
+                                    <p:anim calcmode="lin" valueType="num">
+                                      <p:cBhvr>
+                                        <p:cTn id="8" dur="500" fill="hold"/>
+                                        <p:tgtEl>
+                                          <p:spTgt spid="14"/>
+                                        </p:tgtEl>
+                                        <p:attrNameLst>
+                                          <p:attrName>ppt_x</p:attrName>
+                                        </p:attrNameLst>
+                                      </p:cBhvr>
+                                      <p:tavLst>
+                                        <p:tav tm="0">
+                                          <p:val>
+                                            <p:strVal val="#ppt_x"/>
+                                          </p:val>
+                                        </p:tav>
+                                        <p:tav tm="100000">
+                                          <p:val>
+                                            <p:strVal val="#ppt_x"/>
+                                          </p:val>
+                                        </p:tav>
+                                      </p:tavLst>
+                                    </p:anim>
+                                    <p:anim calcmode="lin" valueType="num">
+                                      <p:cBhvr>
+                                        <p:cTn id="9" dur="500" fill="hold"/>
+                                        <p:tgtEl>
+                                          <p:spTgt spid="14"/>
+                                        </p:tgtEl>
+                                        <p:attrNameLst>
+                                          <p:attrName>ppt_y</p:attrName>
+                                        </p:attrNameLst>
+                                      </p:cBhvr>
+                                      <p:tavLst>
+                                        <p:tav tm="0">
+                                          <p:val>
+                                            <p:strVal val="#ppt_y+.1"/>
+                                          </p:val>
+                                        </p:tav>
+                                        <p:tav tm="100000">
+                                          <p:val>
+                                            <p:strVal val="#ppt_y"/>
+                                          </p:val>
+                                        </p:tav>
+                                      </p:tavLst>
+                                    </p:anim>
+                                  </p:childTnLst>
+                                </p:cTn>
+                              </p:par>
+                            </p:childTnLst>
+                          </p:cTn>
+                        </p:par>
+                      </p:childTnLst>
+                    </p:cTn>
+                  </p:par>
+                  <p:par>
+                    <p:cTn id="10" fill="hold">
+                      <p:stCondLst>
+                        <p:cond delay="indefinite"/>
+                      </p:stCondLst>
+                      <p:childTnLst>
+                        <p:par>
+                          <p:cTn id="11" fill="hold">
+                            <p:stCondLst>
+                              <p:cond delay="0"/>
+                            </p:stCondLst>
+                            <p:childTnLst>
+                              <p:par>
+                                <p:cTn id="12" presetID="42" presetClass="entr" presetSubtype="0" fill="hold" nodeType="clickEffect">
+                                  <p:stCondLst>
+                                    <p:cond delay="0"/>
+                                  </p:stCondLst>
+                                  <p:childTnLst>
+                                    <p:set>
+                                      <p:cBhvr>
+                                        <p:cTn id="13" dur="1" fill="hold">
+                                          <p:stCondLst>
+                                            <p:cond delay="0"/>
+                                          </p:stCondLst>
+                                        </p:cTn>
+                                        <p:tgtEl>
+                                          <p:spTgt spid="17"/>
+                                        </p:tgtEl>
+                                        <p:attrNameLst>
+                                          <p:attrName>style.visibility</p:attrName>
+                                        </p:attrNameLst>
+                                      </p:cBhvr>
+                                      <p:to>
+                                        <p:strVal val="visible"/>
+                                      </p:to>
+                                    </p:set>
+                                    <p:animEffect transition="in" filter="fade">
+                                      <p:cBhvr>
+                                        <p:cTn id="14" dur="500"/>
+                                        <p:tgtEl>
+                                          <p:spTgt spid="17"/>
+                                        </p:tgtEl>
+                                      </p:cBhvr>
+                                    </p:animEffect>
+                                    <p:anim calcmode="lin" valueType="num">
+                                      <p:cBhvr>
+                                        <p:cTn id="15" dur="500" fill="hold"/>
+                                        <p:tgtEl>
+                                          <p:spTgt spid="17"/>
+                                        </p:tgtEl>
+                                        <p:attrNameLst>
+                                          <p:attrName>ppt_x</p:attrName>
+                                        </p:attrNameLst>
+                                      </p:cBhvr>
+                                      <p:tavLst>
+                                        <p:tav tm="0">
+                                          <p:val>
+                                            <p:strVal val="#ppt_x"/>
+                                          </p:val>
+                                        </p:tav>
+                                        <p:tav tm="100000">
+                                          <p:val>
+                                            <p:strVal val="#ppt_x"/>
+                                          </p:val>
+                                        </p:tav>
+                                      </p:tavLst>
+                                    </p:anim>
+                                    <p:anim calcmode="lin" valueType="num">
+                                      <p:cBhvr>
+                                        <p:cTn id="16" dur="500" fill="hold"/>
+                                        <p:tgtEl>
+                                          <p:spTgt spid="17"/>
+                                        </p:tgtEl>
+                                        <p:attrNameLst>
+                                          <p:attrName>ppt_y</p:attrName>
+                                        </p:attrNameLst>
+                                      </p:cBhvr>
+                                      <p:tavLst>
+                                        <p:tav tm="0">
+                                          <p:val>
+                                            <p:strVal val="#ppt_y+.1"/>
+                                          </p:val>
+                                        </p:tav>
+                                        <p:tav tm="100000">
+                                          <p:val>
+                                            <p:strVal val="#ppt_y"/>
+                                          </p:val>
+                                        </p:tav>
+                                      </p:tavLst>
+                                    </p:anim>
+                                  </p:childTnLst>
+                                </p:cTn>
+                              </p:par>
+                            </p:childTnLst>
+                          </p:cTn>
+                        </p:par>
+                      </p:childTnLst>
+                    </p:cTn>
+                  </p:par>
+                  <p:par>
+                    <p:cTn id="17" fill="hold">
+                      <p:stCondLst>
+                        <p:cond delay="indefinite"/>
+                      </p:stCondLst>
+                      <p:childTnLst>
+                        <p:par>
+                          <p:cTn id="18" fill="hold">
+                            <p:stCondLst>
+                              <p:cond delay="0"/>
+                            </p:stCondLst>
+                            <p:childTnLst>
+                              <p:par>
+                                <p:cTn id="19" presetID="42" presetClass="entr" presetSubtype="0" fill="hold" nodeType="clickEffect">
+                                  <p:stCondLst>
+                                    <p:cond delay="0"/>
+                                  </p:stCondLst>
+                                  <p:childTnLst>
+                                    <p:set>
+                                      <p:cBhvr>
+                                        <p:cTn id="20" dur="1" fill="hold">
+                                          <p:stCondLst>
+                                            <p:cond delay="0"/>
+                                          </p:stCondLst>
+                                        </p:cTn>
+                                        <p:tgtEl>
+                                          <p:spTgt spid="20"/>
+                                        </p:tgtEl>
+                                        <p:attrNameLst>
+                                          <p:attrName>style.visibility</p:attrName>
+                                        </p:attrNameLst>
+                                      </p:cBhvr>
+                                      <p:to>
+                                        <p:strVal val="visible"/>
+                                      </p:to>
+                                    </p:set>
+                                    <p:animEffect transition="in" filter="fade">
+                                      <p:cBhvr>
+                                        <p:cTn id="21" dur="500"/>
+                                        <p:tgtEl>
+                                          <p:spTgt spid="20"/>
+                                        </p:tgtEl>
+                                      </p:cBhvr>
+                                    </p:animEffect>
+                                    <p:anim calcmode="lin" valueType="num">
+                                      <p:cBhvr>
+                                        <p:cTn id="22" dur="500" fill="hold"/>
+                                        <p:tgtEl>
+                                          <p:spTgt spid="20"/>
+                                        </p:tgtEl>
+                                        <p:attrNameLst>
+                                          <p:attrName>ppt_x</p:attrName>
+                                        </p:attrNameLst>
+                                      </p:cBhvr>
+                                      <p:tavLst>
+                                        <p:tav tm="0">
+                                          <p:val>
+                                            <p:strVal val="#ppt_x"/>
+                                          </p:val>
+                                        </p:tav>
+                                        <p:tav tm="100000">
+                                          <p:val>
+                                            <p:strVal val="#ppt_x"/>
+                                          </p:val>
+                                        </p:tav>
+                                      </p:tavLst>
+                                    </p:anim>
+                                    <p:anim calcmode="lin" valueType="num">
+                                      <p:cBhvr>
+                                        <p:cTn id="23" dur="500" fill="hold"/>
+                                        <p:tgtEl>
+                                          <p:spTgt spid="20"/>
+                                        </p:tgtEl>
+                                        <p:attrNameLst>
+                                          <p:attrName>ppt_y</p:attrName>
+                                        </p:attrNameLst>
+                                      </p:cBhvr>
+                                      <p:tavLst>
+                                        <p:tav tm="0">
+                                          <p:val>
+                                            <p:strVal val="#ppt_y+.1"/>
+                                          </p:val>
+                                        </p:tav>
+                                        <p:tav tm="100000">
+                                          <p:val>
+                                            <p:strVal val="#ppt_y"/>
+                                          </p:val>
+                                        </p:tav>
+                                      </p:tavLst>
+                                    </p:anim>
+                                  </p:childTnLst>
+                                </p:cTn>
+                              </p:par>
+                            </p:childTnLst>
+                          </p:cTn>
+                        </p:par>
+                      </p:childTnLst>
+                    </p:cTn>
+                  </p:par>
+                </p:childTnLst>
+              </p:cTn>
+              <p:prevCondLst>
+                <p:cond evt="onPrev" delay="0">
+                  <p:tgtEl>
+                    <p:sldTgt/>
+                  </p:tgtEl>
+                </p:cond>
+              </p:prevCondLst>
+              <p:nextCondLst>
+                <p:cond evt="onNext" delay="0">
+                  <p:tgtEl>
+                    <p:sldTgt/>
+                  </p:tgtEl>
+                </p:cond>
+              </p:nextCondLst>
+            </p:seq>
+          </p:childTnLst>
+        </p:cTn>
       </p:par>
     </p:tnLst>
   </p:timing>
@@ -15543,7 +15654,7 @@
           <a:p>
             <a:pPr algn="ctr"/>
             <a:r>
-              <a:rPr lang="pt-BR" sz="2400" b="1" dirty="0" smtClean="0">
+              <a:rPr lang="pt-BR" sz="2400" b="1" dirty="0">
                 <a:ln w="0"/>
                 <a:solidFill>
                   <a:schemeClr val="bg1"/>
@@ -15670,7 +15781,7 @@
           <a:p>
             <a:pPr algn="ctr"/>
             <a:r>
-              <a:rPr lang="pt-BR" sz="4400" b="1" cap="none" spc="0" dirty="0" smtClean="0">
+              <a:rPr lang="pt-BR" sz="4400" b="1" cap="none" spc="0" dirty="0">
                 <a:ln w="10160">
                   <a:solidFill>
                     <a:schemeClr val="accent1">
@@ -15694,28 +15805,6 @@
               </a:rPr>
               <a:t>MATHEUS</a:t>
             </a:r>
-            <a:endParaRPr lang="pt-BR" sz="4400" b="1" cap="none" spc="0" dirty="0">
-              <a:ln w="10160">
-                <a:solidFill>
-                  <a:schemeClr val="accent1">
-                    <a:lumMod val="75000"/>
-                  </a:schemeClr>
-                </a:solidFill>
-                <a:prstDash val="solid"/>
-              </a:ln>
-              <a:solidFill>
-                <a:schemeClr val="accent1">
-                  <a:lumMod val="75000"/>
-                </a:schemeClr>
-              </a:solidFill>
-              <a:effectLst>
-                <a:outerShdw blurRad="38100" dist="22860" dir="5400000" algn="tl" rotWithShape="0">
-                  <a:srgbClr val="000000">
-                    <a:alpha val="30000"/>
-                  </a:srgbClr>
-                </a:outerShdw>
-              </a:effectLst>
-            </a:endParaRPr>
           </a:p>
         </p:txBody>
       </p:sp>
@@ -15741,13 +15830,6 @@
       </p:transition>
     </mc:Fallback>
   </mc:AlternateContent>
-  <p:timing>
-    <p:tnLst>
-      <p:par>
-        <p:cTn id="1" dur="indefinite" restart="never" nodeType="tmRoot"/>
-      </p:par>
-    </p:tnLst>
-  </p:timing>
 </p:sld>
 </file>
 
@@ -15891,7 +15973,7 @@
         </p:nvGraphicFramePr>
         <p:xfrm>
           <a:off x="266700" y="1294689"/>
-          <a:ext cx="6578600" cy="5360867"/>
+          <a:ext cx="6578600" cy="5349239"/>
         </p:xfrm>
         <a:graphic>
           <a:graphicData uri="http://schemas.openxmlformats.org/drawingml/2006/table">
@@ -17668,7 +17750,7 @@
         </p:nvGraphicFramePr>
         <p:xfrm>
           <a:off x="7137676" y="1294689"/>
-          <a:ext cx="4761948" cy="5372384"/>
+          <a:ext cx="4761948" cy="5349238"/>
         </p:xfrm>
         <a:graphic>
           <a:graphicData uri="http://schemas.openxmlformats.org/drawingml/2006/table">
@@ -18778,7 +18860,7 @@
           <a:p>
             <a:pPr algn="just"/>
             <a:r>
-              <a:rPr lang="pt-BR" sz="4000" b="1" dirty="0" smtClean="0">
+              <a:rPr lang="pt-BR" sz="4000" b="1" dirty="0">
                 <a:ln w="0"/>
                 <a:solidFill>
                   <a:schemeClr val="bg1"/>
@@ -18877,7 +18959,7 @@
           <a:p>
             <a:pPr algn="ctr"/>
             <a:r>
-              <a:rPr lang="pt-BR" sz="4400" b="1" cap="none" spc="0" dirty="0" smtClean="0">
+              <a:rPr lang="pt-BR" sz="4400" b="1" cap="none" spc="0" dirty="0">
                 <a:ln w="10160">
                   <a:solidFill>
                     <a:srgbClr val="FF0000"/>
@@ -18897,24 +18979,6 @@
               </a:rPr>
               <a:t>YUDI</a:t>
             </a:r>
-            <a:endParaRPr lang="pt-BR" sz="4400" b="1" cap="none" spc="0" dirty="0">
-              <a:ln w="10160">
-                <a:solidFill>
-                  <a:srgbClr val="FF0000"/>
-                </a:solidFill>
-                <a:prstDash val="solid"/>
-              </a:ln>
-              <a:solidFill>
-                <a:srgbClr val="FF0000"/>
-              </a:solidFill>
-              <a:effectLst>
-                <a:outerShdw blurRad="38100" dist="22860" dir="5400000" algn="tl" rotWithShape="0">
-                  <a:srgbClr val="000000">
-                    <a:alpha val="30000"/>
-                  </a:srgbClr>
-                </a:outerShdw>
-              </a:effectLst>
-            </a:endParaRPr>
           </a:p>
         </p:txBody>
       </p:sp>
@@ -18928,21 +18992,6 @@
   <p:clrMapOvr>
     <a:masterClrMapping/>
   </p:clrMapOvr>
-  <mc:AlternateContent xmlns:mc="http://schemas.openxmlformats.org/markup-compatibility/2006" xmlns:p14="http://schemas.microsoft.com/office/powerpoint/2010/main">
-    <mc:Choice Requires="p14">
-      <p:transition p14:dur="0"/>
-    </mc:Choice>
-    <mc:Fallback xmlns="">
-      <p:transition/>
-    </mc:Fallback>
-  </mc:AlternateContent>
-  <p:timing>
-    <p:tnLst>
-      <p:par>
-        <p:cTn id="1" dur="indefinite" restart="never" nodeType="tmRoot"/>
-      </p:par>
-    </p:tnLst>
-  </p:timing>
 </p:sld>
 </file>
 
@@ -19095,7 +19144,7 @@
           <a:p>
             <a:pPr algn="just"/>
             <a:r>
-              <a:rPr lang="pt-BR" sz="4000" b="1" dirty="0" smtClean="0">
+              <a:rPr lang="pt-BR" sz="4000" b="1" dirty="0">
                 <a:ln w="0"/>
                 <a:solidFill>
                   <a:schemeClr val="bg1"/>
@@ -19391,7 +19440,7 @@
           <a:p>
             <a:pPr algn="ctr"/>
             <a:r>
-              <a:rPr lang="pt-BR" sz="2400" b="1" dirty="0" smtClean="0">
+              <a:rPr lang="pt-BR" sz="2400" b="1" dirty="0">
                 <a:ln w="0"/>
                 <a:solidFill>
                   <a:schemeClr val="bg1"/>
@@ -19449,7 +19498,7 @@
           <a:p>
             <a:pPr algn="ctr"/>
             <a:r>
-              <a:rPr lang="pt-BR" sz="2400" b="1" dirty="0" smtClean="0">
+              <a:rPr lang="pt-BR" sz="2400" b="1" dirty="0">
                 <a:ln w="0"/>
                 <a:solidFill>
                   <a:schemeClr val="bg1"/>
@@ -19507,7 +19556,7 @@
           <a:p>
             <a:pPr algn="ctr"/>
             <a:r>
-              <a:rPr lang="pt-BR" sz="2400" b="1" dirty="0" smtClean="0">
+              <a:rPr lang="pt-BR" sz="2400" b="1" dirty="0">
                 <a:ln w="0"/>
                 <a:solidFill>
                   <a:schemeClr val="bg1"/>
@@ -19565,7 +19614,7 @@
           <a:p>
             <a:pPr algn="ctr"/>
             <a:r>
-              <a:rPr lang="pt-BR" sz="2400" b="1" dirty="0" smtClean="0">
+              <a:rPr lang="pt-BR" sz="2400" b="1" dirty="0">
                 <a:ln w="0"/>
                 <a:solidFill>
                   <a:schemeClr val="bg1"/>
@@ -19928,7 +19977,7 @@
           <a:p>
             <a:pPr algn="just"/>
             <a:r>
-              <a:rPr lang="pt-BR" sz="2400" b="1" dirty="0" smtClean="0">
+              <a:rPr lang="pt-BR" sz="2400" b="1" dirty="0">
                 <a:ln w="0"/>
                 <a:solidFill>
                   <a:schemeClr val="bg1"/>
@@ -19986,7 +20035,7 @@
           <a:p>
             <a:pPr algn="just"/>
             <a:r>
-              <a:rPr lang="pt-BR" sz="2400" b="1" dirty="0" smtClean="0">
+              <a:rPr lang="pt-BR" sz="2400" b="1" dirty="0">
                 <a:ln w="0"/>
                 <a:solidFill>
                   <a:schemeClr val="bg1"/>
@@ -20043,7 +20092,7 @@
           <a:p>
             <a:pPr algn="ctr"/>
             <a:r>
-              <a:rPr lang="pt-BR" sz="4400" b="1" cap="none" spc="0" dirty="0" smtClean="0">
+              <a:rPr lang="pt-BR" sz="4400" b="1" cap="none" spc="0" dirty="0">
                 <a:ln w="10160">
                   <a:solidFill>
                     <a:srgbClr val="FF0000"/>
@@ -20063,24 +20112,6 @@
               </a:rPr>
               <a:t>YUDI</a:t>
             </a:r>
-            <a:endParaRPr lang="pt-BR" sz="4400" b="1" cap="none" spc="0" dirty="0">
-              <a:ln w="10160">
-                <a:solidFill>
-                  <a:srgbClr val="FF0000"/>
-                </a:solidFill>
-                <a:prstDash val="solid"/>
-              </a:ln>
-              <a:solidFill>
-                <a:srgbClr val="FF0000"/>
-              </a:solidFill>
-              <a:effectLst>
-                <a:outerShdw blurRad="38100" dist="22860" dir="5400000" algn="tl" rotWithShape="0">
-                  <a:srgbClr val="000000">
-                    <a:alpha val="30000"/>
-                  </a:srgbClr>
-                </a:outerShdw>
-              </a:effectLst>
-            </a:endParaRPr>
           </a:p>
         </p:txBody>
       </p:sp>
@@ -21097,7 +21128,7 @@
           <a:lstStyle/>
           <a:p>
             <a:r>
-              <a:rPr lang="pt-BR" sz="2400" b="1" dirty="0" smtClean="0">
+              <a:rPr lang="pt-BR" sz="2400" b="1" dirty="0">
                 <a:ln w="0"/>
                 <a:solidFill>
                   <a:schemeClr val="bg1"/>
@@ -21649,7 +21680,7 @@
           <a:p>
             <a:pPr algn="ctr"/>
             <a:r>
-              <a:rPr lang="pt-BR" sz="2400" b="1" dirty="0" smtClean="0">
+              <a:rPr lang="pt-BR" sz="2400" b="1" dirty="0">
                 <a:ln w="0"/>
                 <a:solidFill>
                   <a:schemeClr val="bg1"/>
@@ -21707,7 +21738,7 @@
           <a:p>
             <a:pPr algn="ctr"/>
             <a:r>
-              <a:rPr lang="pt-BR" sz="2400" b="1" dirty="0" smtClean="0">
+              <a:rPr lang="pt-BR" sz="2400" b="1" dirty="0">
                 <a:ln w="0"/>
                 <a:solidFill>
                   <a:schemeClr val="bg1"/>
@@ -21765,7 +21796,7 @@
           <a:p>
             <a:pPr algn="ctr"/>
             <a:r>
-              <a:rPr lang="pt-BR" sz="2400" b="1" dirty="0" smtClean="0">
+              <a:rPr lang="pt-BR" sz="2400" b="1" dirty="0">
                 <a:ln w="0"/>
                 <a:solidFill>
                   <a:schemeClr val="bg1"/>
@@ -21822,7 +21853,7 @@
           <a:lstStyle/>
           <a:p>
             <a:r>
-              <a:rPr lang="pt-BR" b="1" cap="none" spc="0" dirty="0" smtClean="0">
+              <a:rPr lang="pt-BR" b="1" cap="none" spc="0" dirty="0">
                 <a:ln w="0"/>
                 <a:solidFill>
                   <a:schemeClr val="bg1"/>
@@ -21841,7 +21872,7 @@
           </a:p>
           <a:p>
             <a:r>
-              <a:rPr lang="pt-BR" b="1" dirty="0" smtClean="0">
+              <a:rPr lang="pt-BR" b="1" dirty="0">
                 <a:ln w="0"/>
                 <a:solidFill>
                   <a:schemeClr val="bg1"/>
@@ -21855,8 +21886,24 @@
                 </a:effectLst>
                 <a:latin typeface="Exo 2 Extra Light" panose="00000300000000000000" pitchFamily="50" charset="0"/>
               </a:rPr>
-              <a:t>Planejamento </a:t>
+              <a:t>Planejamento do projeto </a:t>
             </a:r>
+            <a:endParaRPr lang="pt-BR" b="1" cap="none" spc="0" dirty="0">
+              <a:ln w="0"/>
+              <a:solidFill>
+                <a:schemeClr val="bg1"/>
+              </a:solidFill>
+              <a:effectLst>
+                <a:outerShdw blurRad="38100" dist="19050" dir="2700000" algn="tl" rotWithShape="0">
+                  <a:schemeClr val="dk1">
+                    <a:alpha val="40000"/>
+                  </a:schemeClr>
+                </a:outerShdw>
+              </a:effectLst>
+              <a:latin typeface="Exo 2 Extra Light" panose="00000300000000000000" pitchFamily="50" charset="0"/>
+            </a:endParaRPr>
+          </a:p>
+          <a:p>
             <a:r>
               <a:rPr lang="pt-BR" b="1" dirty="0">
                 <a:ln w="0"/>
@@ -21872,10 +21919,51 @@
                 </a:effectLst>
                 <a:latin typeface="Exo 2 Extra Light" panose="00000300000000000000" pitchFamily="50" charset="0"/>
               </a:rPr>
-              <a:t>do </a:t>
+              <a:t>Documentação do projeto    </a:t>
             </a:r>
+            <a:endParaRPr lang="pt-BR" b="1" cap="none" spc="0" dirty="0">
+              <a:ln w="0"/>
+              <a:solidFill>
+                <a:schemeClr val="bg1"/>
+              </a:solidFill>
+              <a:effectLst>
+                <a:outerShdw blurRad="38100" dist="19050" dir="2700000" algn="tl" rotWithShape="0">
+                  <a:schemeClr val="dk1">
+                    <a:alpha val="40000"/>
+                  </a:schemeClr>
+                </a:outerShdw>
+              </a:effectLst>
+              <a:latin typeface="Exo 2 Extra Light" panose="00000300000000000000" pitchFamily="50" charset="0"/>
+            </a:endParaRPr>
+          </a:p>
+        </p:txBody>
+      </p:sp>
+      <p:sp>
+        <p:nvSpPr>
+          <p:cNvPr id="51" name="Retângulo 50"/>
+          <p:cNvSpPr/>
+          <p:nvPr/>
+        </p:nvSpPr>
+        <p:spPr>
+          <a:xfrm>
+            <a:off x="3260035" y="2339232"/>
+            <a:ext cx="6361182" cy="923330"/>
+          </a:xfrm>
+          <a:prstGeom prst="rect">
+            <a:avLst/>
+          </a:prstGeom>
+          <a:noFill/>
+          <a:effectLst/>
+        </p:spPr>
+        <p:txBody>
+          <a:bodyPr wrap="square" lIns="91440" tIns="45720" rIns="91440" bIns="45720">
+            <a:spAutoFit/>
+          </a:bodyPr>
+          <a:lstStyle/>
+          <a:p>
+            <a:pPr algn="r"/>
             <a:r>
-              <a:rPr lang="pt-BR" b="1" dirty="0" smtClean="0">
+              <a:rPr lang="pt-BR" b="1" cap="none" spc="0" dirty="0">
                 <a:ln w="0"/>
                 <a:solidFill>
                   <a:schemeClr val="bg1"/>
@@ -21889,24 +21977,11 @@
                 </a:effectLst>
                 <a:latin typeface="Exo 2 Extra Light" panose="00000300000000000000" pitchFamily="50" charset="0"/>
               </a:rPr>
-              <a:t>projeto </a:t>
+              <a:t>Desenvolvimento back-end</a:t>
             </a:r>
-            <a:endParaRPr lang="pt-BR" b="1" cap="none" spc="0" dirty="0" smtClean="0">
-              <a:ln w="0"/>
-              <a:solidFill>
-                <a:schemeClr val="bg1"/>
-              </a:solidFill>
-              <a:effectLst>
-                <a:outerShdw blurRad="38100" dist="19050" dir="2700000" algn="tl" rotWithShape="0">
-                  <a:schemeClr val="dk1">
-                    <a:alpha val="40000"/>
-                  </a:schemeClr>
-                </a:outerShdw>
-              </a:effectLst>
-              <a:latin typeface="Exo 2 Extra Light" panose="00000300000000000000" pitchFamily="50" charset="0"/>
-            </a:endParaRPr>
-          </a:p>
-          <a:p>
+          </a:p>
+          <a:p>
+            <a:pPr algn="r"/>
             <a:r>
               <a:rPr lang="pt-BR" b="1" dirty="0">
                 <a:ln w="0"/>
@@ -21922,26 +21997,9 @@
                 </a:effectLst>
                 <a:latin typeface="Exo 2 Extra Light" panose="00000300000000000000" pitchFamily="50" charset="0"/>
               </a:rPr>
-              <a:t>D</a:t>
+              <a:t>Auxílio no planejamento do projeto</a:t>
             </a:r>
-            <a:r>
-              <a:rPr lang="pt-BR" b="1" dirty="0" smtClean="0">
-                <a:ln w="0"/>
-                <a:solidFill>
-                  <a:schemeClr val="bg1"/>
-                </a:solidFill>
-                <a:effectLst>
-                  <a:outerShdw blurRad="38100" dist="19050" dir="2700000" algn="tl" rotWithShape="0">
-                    <a:schemeClr val="dk1">
-                      <a:alpha val="40000"/>
-                    </a:schemeClr>
-                  </a:outerShdw>
-                </a:effectLst>
-                <a:latin typeface="Exo 2 Extra Light" panose="00000300000000000000" pitchFamily="50" charset="0"/>
-              </a:rPr>
-              <a:t>ocumentação do projeto    </a:t>
-            </a:r>
-            <a:endParaRPr lang="pt-BR" b="1" cap="none" spc="0" dirty="0" smtClean="0">
+            <a:endParaRPr lang="pt-BR" b="1" cap="none" spc="0" dirty="0">
               <a:ln w="0"/>
               <a:solidFill>
                 <a:schemeClr val="bg1"/>
@@ -21956,88 +22014,10 @@
               <a:latin typeface="Exo 2 Extra Light" panose="00000300000000000000" pitchFamily="50" charset="0"/>
             </a:endParaRPr>
           </a:p>
-        </p:txBody>
-      </p:sp>
-      <p:sp>
-        <p:nvSpPr>
-          <p:cNvPr id="51" name="Retângulo 50"/>
-          <p:cNvSpPr/>
-          <p:nvPr/>
-        </p:nvSpPr>
-        <p:spPr>
-          <a:xfrm>
-            <a:off x="3260035" y="2339232"/>
-            <a:ext cx="6361182" cy="923330"/>
-          </a:xfrm>
-          <a:prstGeom prst="rect">
-            <a:avLst/>
-          </a:prstGeom>
-          <a:noFill/>
-          <a:effectLst/>
-        </p:spPr>
-        <p:txBody>
-          <a:bodyPr wrap="square" lIns="91440" tIns="45720" rIns="91440" bIns="45720">
-            <a:spAutoFit/>
-          </a:bodyPr>
-          <a:lstStyle/>
           <a:p>
             <a:pPr algn="r"/>
             <a:r>
-              <a:rPr lang="pt-BR" b="1" cap="none" spc="0" dirty="0" smtClean="0">
-                <a:ln w="0"/>
-                <a:solidFill>
-                  <a:schemeClr val="bg1"/>
-                </a:solidFill>
-                <a:effectLst>
-                  <a:outerShdw blurRad="38100" dist="19050" dir="2700000" algn="tl" rotWithShape="0">
-                    <a:schemeClr val="dk1">
-                      <a:alpha val="40000"/>
-                    </a:schemeClr>
-                  </a:outerShdw>
-                </a:effectLst>
-                <a:latin typeface="Exo 2 Extra Light" panose="00000300000000000000" pitchFamily="50" charset="0"/>
-              </a:rPr>
-              <a:t>Desenvolvimento back-end</a:t>
-            </a:r>
-          </a:p>
-          <a:p>
-            <a:pPr algn="r"/>
-            <a:r>
-              <a:rPr lang="pt-BR" b="1" dirty="0" smtClean="0">
-                <a:ln w="0"/>
-                <a:solidFill>
-                  <a:schemeClr val="bg1"/>
-                </a:solidFill>
-                <a:effectLst>
-                  <a:outerShdw blurRad="38100" dist="19050" dir="2700000" algn="tl" rotWithShape="0">
-                    <a:schemeClr val="dk1">
-                      <a:alpha val="40000"/>
-                    </a:schemeClr>
-                  </a:outerShdw>
-                </a:effectLst>
-                <a:latin typeface="Exo 2 Extra Light" panose="00000300000000000000" pitchFamily="50" charset="0"/>
-              </a:rPr>
-              <a:t>Auxílio no planejamento do projeto</a:t>
-            </a:r>
-            <a:endParaRPr lang="pt-BR" b="1" cap="none" spc="0" dirty="0" smtClean="0">
-              <a:ln w="0"/>
-              <a:solidFill>
-                <a:schemeClr val="bg1"/>
-              </a:solidFill>
-              <a:effectLst>
-                <a:outerShdw blurRad="38100" dist="19050" dir="2700000" algn="tl" rotWithShape="0">
-                  <a:schemeClr val="dk1">
-                    <a:alpha val="40000"/>
-                  </a:schemeClr>
-                </a:outerShdw>
-              </a:effectLst>
-              <a:latin typeface="Exo 2 Extra Light" panose="00000300000000000000" pitchFamily="50" charset="0"/>
-            </a:endParaRPr>
-          </a:p>
-          <a:p>
-            <a:pPr algn="r"/>
-            <a:r>
-              <a:rPr lang="pt-BR" b="1" dirty="0" smtClean="0">
+              <a:rPr lang="pt-BR" b="1" dirty="0">
                 <a:ln w="0"/>
                 <a:solidFill>
                   <a:schemeClr val="bg1"/>
@@ -22054,7 +22034,7 @@
               <a:t>Auxílio na d</a:t>
             </a:r>
             <a:r>
-              <a:rPr lang="pt-BR" b="1" cap="none" spc="0" dirty="0" smtClean="0">
+              <a:rPr lang="pt-BR" b="1" cap="none" spc="0" dirty="0">
                 <a:ln w="0"/>
                 <a:solidFill>
                   <a:schemeClr val="bg1"/>
@@ -22097,7 +22077,7 @@
           <a:lstStyle/>
           <a:p>
             <a:r>
-              <a:rPr lang="pt-BR" b="1" dirty="0" smtClean="0">
+              <a:rPr lang="pt-BR" b="1" dirty="0">
                 <a:ln w="0"/>
                 <a:solidFill>
                   <a:schemeClr val="bg1"/>
@@ -22116,7 +22096,7 @@
           </a:p>
           <a:p>
             <a:r>
-              <a:rPr lang="pt-BR" b="1" dirty="0" smtClean="0">
+              <a:rPr lang="pt-BR" b="1" dirty="0">
                 <a:ln w="0"/>
                 <a:solidFill>
                   <a:schemeClr val="bg1"/>
@@ -22135,7 +22115,7 @@
           </a:p>
           <a:p>
             <a:r>
-              <a:rPr lang="pt-BR" b="1" dirty="0" smtClean="0">
+              <a:rPr lang="pt-BR" b="1" dirty="0">
                 <a:ln w="0"/>
                 <a:solidFill>
                   <a:schemeClr val="bg1"/>
@@ -22179,7 +22159,7 @@
           <a:p>
             <a:pPr algn="r"/>
             <a:r>
-              <a:rPr lang="pt-BR" b="1" dirty="0" smtClean="0">
+              <a:rPr lang="pt-BR" b="1" dirty="0">
                 <a:ln w="0"/>
                 <a:solidFill>
                   <a:schemeClr val="bg1"/>
@@ -22199,7 +22179,7 @@
           <a:p>
             <a:pPr algn="r"/>
             <a:r>
-              <a:rPr lang="pt-BR" b="1" dirty="0" smtClean="0">
+              <a:rPr lang="pt-BR" b="1" dirty="0">
                 <a:ln w="0"/>
                 <a:solidFill>
                   <a:schemeClr val="bg1"/>
@@ -22219,7 +22199,7 @@
           <a:p>
             <a:pPr algn="r"/>
             <a:r>
-              <a:rPr lang="pt-BR" b="1" dirty="0" smtClean="0">
+              <a:rPr lang="pt-BR" b="1" dirty="0">
                 <a:ln w="0"/>
                 <a:solidFill>
                   <a:schemeClr val="bg1"/>
@@ -22262,7 +22242,7 @@
           <a:p>
             <a:pPr algn="ctr"/>
             <a:r>
-              <a:rPr lang="pt-BR" sz="4400" b="1" cap="none" spc="0" dirty="0" smtClean="0">
+              <a:rPr lang="pt-BR" sz="4400" b="1" cap="none" spc="0" dirty="0">
                 <a:ln w="10160">
                   <a:solidFill>
                     <a:srgbClr val="FF0000"/>
@@ -22282,24 +22262,6 @@
               </a:rPr>
               <a:t>YUDI</a:t>
             </a:r>
-            <a:endParaRPr lang="pt-BR" sz="4400" b="1" cap="none" spc="0" dirty="0">
-              <a:ln w="10160">
-                <a:solidFill>
-                  <a:srgbClr val="FF0000"/>
-                </a:solidFill>
-                <a:prstDash val="solid"/>
-              </a:ln>
-              <a:solidFill>
-                <a:srgbClr val="FF0000"/>
-              </a:solidFill>
-              <a:effectLst>
-                <a:outerShdw blurRad="38100" dist="22860" dir="5400000" algn="tl" rotWithShape="0">
-                  <a:srgbClr val="000000">
-                    <a:alpha val="30000"/>
-                  </a:srgbClr>
-                </a:outerShdw>
-              </a:effectLst>
-            </a:endParaRPr>
           </a:p>
         </p:txBody>
       </p:sp>
@@ -22325,13 +22287,6 @@
       </p:transition>
     </mc:Fallback>
   </mc:AlternateContent>
-  <p:timing>
-    <p:tnLst>
-      <p:par>
-        <p:cTn id="1" dur="indefinite" restart="never" nodeType="tmRoot"/>
-      </p:par>
-    </p:tnLst>
-  </p:timing>
 </p:sld>
 </file>
 
@@ -22484,7 +22439,7 @@
           <a:p>
             <a:pPr algn="just"/>
             <a:r>
-              <a:rPr lang="pt-BR" sz="4000" b="1" dirty="0" smtClean="0">
+              <a:rPr lang="pt-BR" sz="4000" b="1" dirty="0">
                 <a:ln w="0"/>
                 <a:solidFill>
                   <a:schemeClr val="bg1"/>
@@ -22695,7 +22650,7 @@
           <a:p>
             <a:pPr algn="ctr"/>
             <a:r>
-              <a:rPr lang="pt-BR" sz="4400" b="1" cap="none" spc="0" dirty="0" smtClean="0">
+              <a:rPr lang="pt-BR" sz="4400" b="1" cap="none" spc="0" dirty="0">
                 <a:ln w="10160">
                   <a:solidFill>
                     <a:srgbClr val="FF0000"/>
@@ -22715,24 +22670,6 @@
               </a:rPr>
               <a:t>YUDI</a:t>
             </a:r>
-            <a:endParaRPr lang="pt-BR" sz="4400" b="1" cap="none" spc="0" dirty="0">
-              <a:ln w="10160">
-                <a:solidFill>
-                  <a:srgbClr val="FF0000"/>
-                </a:solidFill>
-                <a:prstDash val="solid"/>
-              </a:ln>
-              <a:solidFill>
-                <a:srgbClr val="FF0000"/>
-              </a:solidFill>
-              <a:effectLst>
-                <a:outerShdw blurRad="38100" dist="22860" dir="5400000" algn="tl" rotWithShape="0">
-                  <a:srgbClr val="000000">
-                    <a:alpha val="30000"/>
-                  </a:srgbClr>
-                </a:outerShdw>
-              </a:effectLst>
-            </a:endParaRPr>
           </a:p>
         </p:txBody>
       </p:sp>
@@ -22746,13 +22683,6 @@
   <p:clrMapOvr>
     <a:masterClrMapping/>
   </p:clrMapOvr>
-  <p:timing>
-    <p:tnLst>
-      <p:par>
-        <p:cTn id="1" dur="indefinite" restart="never" nodeType="tmRoot"/>
-      </p:par>
-    </p:tnLst>
-  </p:timing>
 </p:sld>
 </file>
 

</xml_diff>

<commit_message>
apre fix e doc att
</commit_message>
<xml_diff>
--- a/Apresentação/inSensor.pptx
+++ b/Apresentação/inSensor.pptx
@@ -262,7 +262,7 @@
           <a:p>
             <a:fld id="{1A9BD4CD-1A6A-4953-94B0-D07B000D9A03}" type="datetimeFigureOut">
               <a:rPr lang="pt-BR" smtClean="0"/>
-              <a:t>01/12/2018</a:t>
+              <a:t>04/12/2018</a:t>
             </a:fld>
             <a:endParaRPr lang="pt-BR" dirty="0"/>
           </a:p>
@@ -430,7 +430,7 @@
           <a:p>
             <a:fld id="{1A9BD4CD-1A6A-4953-94B0-D07B000D9A03}" type="datetimeFigureOut">
               <a:rPr lang="pt-BR" smtClean="0"/>
-              <a:t>01/12/2018</a:t>
+              <a:t>04/12/2018</a:t>
             </a:fld>
             <a:endParaRPr lang="pt-BR" dirty="0"/>
           </a:p>
@@ -608,7 +608,7 @@
           <a:p>
             <a:fld id="{1A9BD4CD-1A6A-4953-94B0-D07B000D9A03}" type="datetimeFigureOut">
               <a:rPr lang="pt-BR" smtClean="0"/>
-              <a:t>01/12/2018</a:t>
+              <a:t>04/12/2018</a:t>
             </a:fld>
             <a:endParaRPr lang="pt-BR" dirty="0"/>
           </a:p>
@@ -776,7 +776,7 @@
           <a:p>
             <a:fld id="{1A9BD4CD-1A6A-4953-94B0-D07B000D9A03}" type="datetimeFigureOut">
               <a:rPr lang="pt-BR" smtClean="0"/>
-              <a:t>01/12/2018</a:t>
+              <a:t>04/12/2018</a:t>
             </a:fld>
             <a:endParaRPr lang="pt-BR" dirty="0"/>
           </a:p>
@@ -1021,7 +1021,7 @@
           <a:p>
             <a:fld id="{1A9BD4CD-1A6A-4953-94B0-D07B000D9A03}" type="datetimeFigureOut">
               <a:rPr lang="pt-BR" smtClean="0"/>
-              <a:t>01/12/2018</a:t>
+              <a:t>04/12/2018</a:t>
             </a:fld>
             <a:endParaRPr lang="pt-BR" dirty="0"/>
           </a:p>
@@ -1250,7 +1250,7 @@
           <a:p>
             <a:fld id="{1A9BD4CD-1A6A-4953-94B0-D07B000D9A03}" type="datetimeFigureOut">
               <a:rPr lang="pt-BR" smtClean="0"/>
-              <a:t>01/12/2018</a:t>
+              <a:t>04/12/2018</a:t>
             </a:fld>
             <a:endParaRPr lang="pt-BR" dirty="0"/>
           </a:p>
@@ -1614,7 +1614,7 @@
           <a:p>
             <a:fld id="{1A9BD4CD-1A6A-4953-94B0-D07B000D9A03}" type="datetimeFigureOut">
               <a:rPr lang="pt-BR" smtClean="0"/>
-              <a:t>01/12/2018</a:t>
+              <a:t>04/12/2018</a:t>
             </a:fld>
             <a:endParaRPr lang="pt-BR" dirty="0"/>
           </a:p>
@@ -1731,7 +1731,7 @@
           <a:p>
             <a:fld id="{1A9BD4CD-1A6A-4953-94B0-D07B000D9A03}" type="datetimeFigureOut">
               <a:rPr lang="pt-BR" smtClean="0"/>
-              <a:t>01/12/2018</a:t>
+              <a:t>04/12/2018</a:t>
             </a:fld>
             <a:endParaRPr lang="pt-BR" dirty="0"/>
           </a:p>
@@ -1826,7 +1826,7 @@
           <a:p>
             <a:fld id="{1A9BD4CD-1A6A-4953-94B0-D07B000D9A03}" type="datetimeFigureOut">
               <a:rPr lang="pt-BR" smtClean="0"/>
-              <a:t>01/12/2018</a:t>
+              <a:t>04/12/2018</a:t>
             </a:fld>
             <a:endParaRPr lang="pt-BR" dirty="0"/>
           </a:p>
@@ -2101,7 +2101,7 @@
           <a:p>
             <a:fld id="{1A9BD4CD-1A6A-4953-94B0-D07B000D9A03}" type="datetimeFigureOut">
               <a:rPr lang="pt-BR" smtClean="0"/>
-              <a:t>01/12/2018</a:t>
+              <a:t>04/12/2018</a:t>
             </a:fld>
             <a:endParaRPr lang="pt-BR" dirty="0"/>
           </a:p>
@@ -2353,7 +2353,7 @@
           <a:p>
             <a:fld id="{1A9BD4CD-1A6A-4953-94B0-D07B000D9A03}" type="datetimeFigureOut">
               <a:rPr lang="pt-BR" smtClean="0"/>
-              <a:t>01/12/2018</a:t>
+              <a:t>04/12/2018</a:t>
             </a:fld>
             <a:endParaRPr lang="pt-BR" dirty="0"/>
           </a:p>
@@ -2570,7 +2570,7 @@
           <a:p>
             <a:fld id="{1A9BD4CD-1A6A-4953-94B0-D07B000D9A03}" type="datetimeFigureOut">
               <a:rPr lang="pt-BR" smtClean="0"/>
-              <a:t>01/12/2018</a:t>
+              <a:t>04/12/2018</a:t>
             </a:fld>
             <a:endParaRPr lang="pt-BR" dirty="0"/>
           </a:p>
@@ -5638,6 +5638,13 @@
   <p:clrMapOvr>
     <a:masterClrMapping/>
   </p:clrMapOvr>
+  <p:timing>
+    <p:tnLst>
+      <p:par>
+        <p:cTn id="1" dur="indefinite" restart="never" nodeType="tmRoot"/>
+      </p:par>
+    </p:tnLst>
+  </p:timing>
 </p:sld>
 </file>
 
@@ -6056,6 +6063,13 @@
   <p:clrMapOvr>
     <a:masterClrMapping/>
   </p:clrMapOvr>
+  <p:timing>
+    <p:tnLst>
+      <p:par>
+        <p:cTn id="1" dur="indefinite" restart="never" nodeType="tmRoot"/>
+      </p:par>
+    </p:tnLst>
+  </p:timing>
 </p:sld>
 </file>
 
@@ -6355,6 +6369,13 @@
   <p:clrMapOvr>
     <a:masterClrMapping/>
   </p:clrMapOvr>
+  <p:timing>
+    <p:tnLst>
+      <p:par>
+        <p:cTn id="1" dur="indefinite" restart="never" nodeType="tmRoot"/>
+      </p:par>
+    </p:tnLst>
+  </p:timing>
 </p:sld>
 </file>
 
@@ -8294,6 +8315,13 @@
   <p:clrMapOvr>
     <a:masterClrMapping/>
   </p:clrMapOvr>
+  <p:timing>
+    <p:tnLst>
+      <p:par>
+        <p:cTn id="1" dur="indefinite" restart="never" nodeType="tmRoot"/>
+      </p:par>
+    </p:tnLst>
+  </p:timing>
 </p:sld>
 </file>
 
@@ -10303,6 +10331,13 @@
   <p:clrMapOvr>
     <a:masterClrMapping/>
   </p:clrMapOvr>
+  <p:timing>
+    <p:tnLst>
+      <p:par>
+        <p:cTn id="1" dur="indefinite" restart="never" nodeType="tmRoot"/>
+      </p:par>
+    </p:tnLst>
+  </p:timing>
 </p:sld>
 </file>
 
@@ -10903,6 +10938,13 @@
   <p:clrMapOvr>
     <a:masterClrMapping/>
   </p:clrMapOvr>
+  <p:timing>
+    <p:tnLst>
+      <p:par>
+        <p:cTn id="1" dur="indefinite" restart="never" nodeType="tmRoot"/>
+      </p:par>
+    </p:tnLst>
+  </p:timing>
 </p:sld>
 </file>
 
@@ -11287,6 +11329,13 @@
   <p:clrMapOvr>
     <a:masterClrMapping/>
   </p:clrMapOvr>
+  <p:timing>
+    <p:tnLst>
+      <p:par>
+        <p:cTn id="1" dur="indefinite" restart="never" nodeType="tmRoot"/>
+      </p:par>
+    </p:tnLst>
+  </p:timing>
 </p:sld>
 </file>
 
@@ -11575,6 +11624,13 @@
   <p:clrMapOvr>
     <a:masterClrMapping/>
   </p:clrMapOvr>
+  <p:timing>
+    <p:tnLst>
+      <p:par>
+        <p:cTn id="1" dur="indefinite" restart="never" nodeType="tmRoot"/>
+      </p:par>
+    </p:tnLst>
+  </p:timing>
 </p:sld>
 </file>
 
@@ -11885,6 +11941,13 @@
   <p:clrMapOvr>
     <a:masterClrMapping/>
   </p:clrMapOvr>
+  <p:timing>
+    <p:tnLst>
+      <p:par>
+        <p:cTn id="1" dur="indefinite" restart="never" nodeType="tmRoot"/>
+      </p:par>
+    </p:tnLst>
+  </p:timing>
 </p:sld>
 </file>
 
@@ -12279,6 +12342,13 @@
   <p:clrMapOvr>
     <a:masterClrMapping/>
   </p:clrMapOvr>
+  <p:timing>
+    <p:tnLst>
+      <p:par>
+        <p:cTn id="1" dur="indefinite" restart="never" nodeType="tmRoot"/>
+      </p:par>
+    </p:tnLst>
+  </p:timing>
 </p:sld>
 </file>
 
@@ -12780,6 +12850,13 @@
   <p:clrMapOvr>
     <a:masterClrMapping/>
   </p:clrMapOvr>
+  <p:timing>
+    <p:tnLst>
+      <p:par>
+        <p:cTn id="1" dur="indefinite" restart="never" nodeType="tmRoot"/>
+      </p:par>
+    </p:tnLst>
+  </p:timing>
 </p:sld>
 </file>
 
@@ -13064,6 +13141,13 @@
   <p:clrMapOvr>
     <a:masterClrMapping/>
   </p:clrMapOvr>
+  <p:timing>
+    <p:tnLst>
+      <p:par>
+        <p:cTn id="1" dur="indefinite" restart="never" nodeType="tmRoot"/>
+      </p:par>
+    </p:tnLst>
+  </p:timing>
 </p:sld>
 </file>
 
@@ -13499,6 +13583,13 @@
   <p:clrMapOvr>
     <a:masterClrMapping/>
   </p:clrMapOvr>
+  <p:timing>
+    <p:tnLst>
+      <p:par>
+        <p:cTn id="1" dur="indefinite" restart="never" nodeType="tmRoot"/>
+      </p:par>
+    </p:tnLst>
+  </p:timing>
 </p:sld>
 </file>
 
@@ -14411,6 +14502,13 @@
   <p:clrMapOvr>
     <a:masterClrMapping/>
   </p:clrMapOvr>
+  <p:timing>
+    <p:tnLst>
+      <p:par>
+        <p:cTn id="1" dur="indefinite" restart="never" nodeType="tmRoot"/>
+      </p:par>
+    </p:tnLst>
+  </p:timing>
 </p:sld>
 </file>
 
@@ -14872,8 +14970,8 @@
           </p:blipFill>
           <p:spPr>
             <a:xfrm>
-              <a:off x="3207847" y="1818167"/>
-              <a:ext cx="5351362" cy="2604976"/>
+              <a:off x="3207847" y="1812127"/>
+              <a:ext cx="5351362" cy="2633030"/>
             </a:xfrm>
             <a:prstGeom prst="rect">
               <a:avLst/>
@@ -15830,6 +15928,13 @@
       </p:transition>
     </mc:Fallback>
   </mc:AlternateContent>
+  <p:timing>
+    <p:tnLst>
+      <p:par>
+        <p:cTn id="1" dur="indefinite" restart="never" nodeType="tmRoot"/>
+      </p:par>
+    </p:tnLst>
+  </p:timing>
 </p:sld>
 </file>
 
@@ -15973,7 +16078,7 @@
         </p:nvGraphicFramePr>
         <p:xfrm>
           <a:off x="266700" y="1294689"/>
-          <a:ext cx="6578600" cy="5349239"/>
+          <a:ext cx="6578600" cy="5360867"/>
         </p:xfrm>
         <a:graphic>
           <a:graphicData uri="http://schemas.openxmlformats.org/drawingml/2006/table">
@@ -17750,7 +17855,7 @@
         </p:nvGraphicFramePr>
         <p:xfrm>
           <a:off x="7137676" y="1294689"/>
-          <a:ext cx="4761948" cy="5349238"/>
+          <a:ext cx="4761948" cy="5372384"/>
         </p:xfrm>
         <a:graphic>
           <a:graphicData uri="http://schemas.openxmlformats.org/drawingml/2006/table">
@@ -18992,6 +19097,13 @@
   <p:clrMapOvr>
     <a:masterClrMapping/>
   </p:clrMapOvr>
+  <p:timing>
+    <p:tnLst>
+      <p:par>
+        <p:cTn id="1" dur="indefinite" restart="never" nodeType="tmRoot"/>
+      </p:par>
+    </p:tnLst>
+  </p:timing>
 </p:sld>
 </file>
 
@@ -22287,6 +22399,13 @@
       </p:transition>
     </mc:Fallback>
   </mc:AlternateContent>
+  <p:timing>
+    <p:tnLst>
+      <p:par>
+        <p:cTn id="1" dur="indefinite" restart="never" nodeType="tmRoot"/>
+      </p:par>
+    </p:tnLst>
+  </p:timing>
 </p:sld>
 </file>
 
@@ -22683,6 +22802,13 @@
   <p:clrMapOvr>
     <a:masterClrMapping/>
   </p:clrMapOvr>
+  <p:timing>
+    <p:tnLst>
+      <p:par>
+        <p:cTn id="1" dur="indefinite" restart="never" nodeType="tmRoot"/>
+      </p:par>
+    </p:tnLst>
+  </p:timing>
 </p:sld>
 </file>
 

</xml_diff>